<commit_message>
codigo praticamente feito, jsons feitos e conexao feita, falta fazer debug
</commit_message>
<xml_diff>
--- a/Diagramas/Apresentação do Projeto.pptx
+++ b/Diagramas/Apresentação do Projeto.pptx
@@ -10,12 +10,13 @@
     <p:sldId id="258" r:id="rId4"/>
     <p:sldId id="259" r:id="rId5"/>
     <p:sldId id="260" r:id="rId6"/>
-    <p:sldId id="265" r:id="rId7"/>
-    <p:sldId id="261" r:id="rId8"/>
-    <p:sldId id="262" r:id="rId9"/>
-    <p:sldId id="266" r:id="rId10"/>
-    <p:sldId id="263" r:id="rId11"/>
-    <p:sldId id="264" r:id="rId12"/>
+    <p:sldId id="267" r:id="rId7"/>
+    <p:sldId id="265" r:id="rId8"/>
+    <p:sldId id="261" r:id="rId9"/>
+    <p:sldId id="262" r:id="rId10"/>
+    <p:sldId id="266" r:id="rId11"/>
+    <p:sldId id="263" r:id="rId12"/>
+    <p:sldId id="264" r:id="rId13"/>
   </p:sldIdLst>
   <p:sldSz cx="12192000" cy="6858000"/>
   <p:notesSz cx="6858000" cy="9144000"/>
@@ -4800,7 +4801,7 @@
           <p:cNvPr id="2" name="Title 1">
             <a:extLst>
               <a:ext uri="{FF2B5EF4-FFF2-40B4-BE49-F238E27FC236}">
-                <a16:creationId xmlns:a16="http://schemas.microsoft.com/office/drawing/2014/main" id="{E07039AD-CF1F-9047-89E6-D581567C49DD}"/>
+                <a16:creationId xmlns:a16="http://schemas.microsoft.com/office/drawing/2014/main" id="{ED294E78-F880-C8C1-4672-C2C86416B6A9}"/>
               </a:ext>
             </a:extLst>
           </p:cNvPr>
@@ -4811,12 +4812,7 @@
             <p:ph type="title"/>
           </p:nvPr>
         </p:nvSpPr>
-        <p:spPr>
-          <a:xfrm>
-            <a:off x="1143000" y="0"/>
-            <a:ext cx="9905999" cy="1360898"/>
-          </a:xfrm>
-        </p:spPr>
+        <p:spPr/>
         <p:txBody>
           <a:bodyPr/>
           <a:lstStyle/>
@@ -4826,55 +4822,101 @@
                 <a:latin typeface="Times New Roman" panose="02020603050405020304" pitchFamily="18" charset="0"/>
                 <a:cs typeface="Times New Roman" panose="02020603050405020304" pitchFamily="18" charset="0"/>
               </a:rPr>
-              <a:t>ER </a:t>
-            </a:r>
-            <a:r>
-              <a:rPr lang="pt-PT" dirty="0" err="1">
-                <a:latin typeface="Times New Roman" panose="02020603050405020304" pitchFamily="18" charset="0"/>
-                <a:cs typeface="Times New Roman" panose="02020603050405020304" pitchFamily="18" charset="0"/>
-              </a:rPr>
-              <a:t>Diagram</a:t>
-            </a:r>
-            <a:endParaRPr lang="pt-PT" dirty="0">
-              <a:latin typeface="Times New Roman" panose="02020603050405020304" pitchFamily="18" charset="0"/>
-              <a:cs typeface="Times New Roman" panose="02020603050405020304" pitchFamily="18" charset="0"/>
-            </a:endParaRPr>
-          </a:p>
-        </p:txBody>
-      </p:sp>
-      <p:pic>
-        <p:nvPicPr>
-          <p:cNvPr id="6" name="Content Placeholder 5">
-            <a:extLst>
-              <a:ext uri="{FF2B5EF4-FFF2-40B4-BE49-F238E27FC236}">
-                <a16:creationId xmlns:a16="http://schemas.microsoft.com/office/drawing/2014/main" id="{4285C871-F1C0-3444-82C2-65FD4B29EE5D}"/>
-              </a:ext>
-            </a:extLst>
-          </p:cNvPr>
-          <p:cNvPicPr>
-            <a:picLocks noGrp="1" noChangeAspect="1"/>
-          </p:cNvPicPr>
+              <a:t>Retrospetiva</a:t>
+            </a:r>
+          </a:p>
+        </p:txBody>
+      </p:sp>
+      <p:sp>
+        <p:nvSpPr>
+          <p:cNvPr id="3" name="Content Placeholder 2">
+            <a:extLst>
+              <a:ext uri="{FF2B5EF4-FFF2-40B4-BE49-F238E27FC236}">
+                <a16:creationId xmlns:a16="http://schemas.microsoft.com/office/drawing/2014/main" id="{6E73D821-F9F1-3169-7E2E-6DA3F5033270}"/>
+              </a:ext>
+            </a:extLst>
+          </p:cNvPr>
+          <p:cNvSpPr>
+            <a:spLocks noGrp="1"/>
+          </p:cNvSpPr>
           <p:nvPr>
             <p:ph idx="1"/>
           </p:nvPr>
-        </p:nvPicPr>
-        <p:blipFill>
-          <a:blip r:embed="rId2"/>
-          <a:stretch>
-            <a:fillRect/>
-          </a:stretch>
-        </p:blipFill>
-        <p:spPr>
-          <a:xfrm>
-            <a:off x="991774" y="1008992"/>
-            <a:ext cx="10208449" cy="5075341"/>
-          </a:xfrm>
-        </p:spPr>
-      </p:pic>
+        </p:nvSpPr>
+        <p:spPr/>
+        <p:txBody>
+          <a:bodyPr/>
+          <a:lstStyle/>
+          <a:p>
+            <a:r>
+              <a:rPr lang="pt-PT" dirty="0">
+                <a:latin typeface="Times New Roman" panose="02020603050405020304" pitchFamily="18" charset="0"/>
+                <a:cs typeface="Times New Roman" panose="02020603050405020304" pitchFamily="18" charset="0"/>
+              </a:rPr>
+              <a:t>O desenvolvimento do projeto teve um avanço bastante assimétrico em questão de tempo.</a:t>
+            </a:r>
+          </a:p>
+          <a:p>
+            <a:r>
+              <a:rPr lang="pt-PT" dirty="0">
+                <a:latin typeface="Times New Roman" panose="02020603050405020304" pitchFamily="18" charset="0"/>
+                <a:cs typeface="Times New Roman" panose="02020603050405020304" pitchFamily="18" charset="0"/>
+              </a:rPr>
+              <a:t>A escrita de código demorou cerca de 8 horas cada um.</a:t>
+            </a:r>
+          </a:p>
+          <a:p>
+            <a:r>
+              <a:rPr lang="pt-PT" dirty="0">
+                <a:latin typeface="Times New Roman" panose="02020603050405020304" pitchFamily="18" charset="0"/>
+                <a:cs typeface="Times New Roman" panose="02020603050405020304" pitchFamily="18" charset="0"/>
+              </a:rPr>
+              <a:t>Porém a conexão da base de dados e da API utilizada ao </a:t>
+            </a:r>
+            <a:r>
+              <a:rPr lang="pt-PT" dirty="0" err="1">
+                <a:latin typeface="Times New Roman" panose="02020603050405020304" pitchFamily="18" charset="0"/>
+                <a:cs typeface="Times New Roman" panose="02020603050405020304" pitchFamily="18" charset="0"/>
+              </a:rPr>
+              <a:t>Postman</a:t>
+            </a:r>
+            <a:r>
+              <a:rPr lang="pt-PT" dirty="0">
+                <a:latin typeface="Times New Roman" panose="02020603050405020304" pitchFamily="18" charset="0"/>
+                <a:cs typeface="Times New Roman" panose="02020603050405020304" pitchFamily="18" charset="0"/>
+              </a:rPr>
+              <a:t> demorou bastante mais.</a:t>
+            </a:r>
+          </a:p>
+          <a:p>
+            <a:r>
+              <a:rPr lang="pt-PT" dirty="0">
+                <a:latin typeface="Times New Roman" panose="02020603050405020304" pitchFamily="18" charset="0"/>
+                <a:cs typeface="Times New Roman" panose="02020603050405020304" pitchFamily="18" charset="0"/>
+              </a:rPr>
+              <a:t>A conexão foi bastante difícil de realizar, depois de muitos erros e reinstalar e inicializar toda a base de dado mais que uma vez, finalmente obtivemos um feedback positivo do </a:t>
+            </a:r>
+            <a:r>
+              <a:rPr lang="pt-PT" dirty="0" err="1">
+                <a:latin typeface="Times New Roman" panose="02020603050405020304" pitchFamily="18" charset="0"/>
+                <a:cs typeface="Times New Roman" panose="02020603050405020304" pitchFamily="18" charset="0"/>
+              </a:rPr>
+              <a:t>Postman</a:t>
+            </a:r>
+            <a:r>
+              <a:rPr lang="pt-PT" dirty="0">
+                <a:latin typeface="Times New Roman" panose="02020603050405020304" pitchFamily="18" charset="0"/>
+                <a:cs typeface="Times New Roman" panose="02020603050405020304" pitchFamily="18" charset="0"/>
+              </a:rPr>
+              <a:t>. </a:t>
+            </a:r>
+          </a:p>
+        </p:txBody>
+      </p:sp>
     </p:spTree>
     <p:extLst>
       <p:ext uri="{BB962C8B-B14F-4D97-AF65-F5344CB8AC3E}">
-        <p14:creationId xmlns:p14="http://schemas.microsoft.com/office/powerpoint/2010/main" val="2539467338"/>
+        <p14:creationId xmlns:p14="http://schemas.microsoft.com/office/powerpoint/2010/main" val="1583969914"/>
       </p:ext>
     </p:extLst>
   </p:cSld>
@@ -4906,7 +4948,7 @@
           <p:cNvPr id="2" name="Title 1">
             <a:extLst>
               <a:ext uri="{FF2B5EF4-FFF2-40B4-BE49-F238E27FC236}">
-                <a16:creationId xmlns:a16="http://schemas.microsoft.com/office/drawing/2014/main" id="{23DE5264-6BE3-9E43-B817-EA8F55CE019A}"/>
+                <a16:creationId xmlns:a16="http://schemas.microsoft.com/office/drawing/2014/main" id="{E07039AD-CF1F-9047-89E6-D581567C49DD}"/>
               </a:ext>
             </a:extLst>
           </p:cNvPr>
@@ -4932,17 +4974,28 @@
                 <a:latin typeface="Times New Roman" panose="02020603050405020304" pitchFamily="18" charset="0"/>
                 <a:cs typeface="Times New Roman" panose="02020603050405020304" pitchFamily="18" charset="0"/>
               </a:rPr>
-              <a:t> Modelo Relacional</a:t>
-            </a:r>
+              <a:t>ER </a:t>
+            </a:r>
+            <a:r>
+              <a:rPr lang="pt-PT" dirty="0" err="1">
+                <a:latin typeface="Times New Roman" panose="02020603050405020304" pitchFamily="18" charset="0"/>
+                <a:cs typeface="Times New Roman" panose="02020603050405020304" pitchFamily="18" charset="0"/>
+              </a:rPr>
+              <a:t>Diagram</a:t>
+            </a:r>
+            <a:endParaRPr lang="pt-PT" dirty="0">
+              <a:latin typeface="Times New Roman" panose="02020603050405020304" pitchFamily="18" charset="0"/>
+              <a:cs typeface="Times New Roman" panose="02020603050405020304" pitchFamily="18" charset="0"/>
+            </a:endParaRPr>
           </a:p>
         </p:txBody>
       </p:sp>
       <p:pic>
         <p:nvPicPr>
-          <p:cNvPr id="7" name="Content Placeholder 6">
-            <a:extLst>
-              <a:ext uri="{FF2B5EF4-FFF2-40B4-BE49-F238E27FC236}">
-                <a16:creationId xmlns:a16="http://schemas.microsoft.com/office/drawing/2014/main" id="{B7058B6F-E8AA-EF48-985D-1CB6BFDFF177}"/>
+          <p:cNvPr id="5" name="Content Placeholder 4">
+            <a:extLst>
+              <a:ext uri="{FF2B5EF4-FFF2-40B4-BE49-F238E27FC236}">
+                <a16:creationId xmlns:a16="http://schemas.microsoft.com/office/drawing/2014/main" id="{69ACD881-EC29-0D74-61F7-C1FA5844BCED}"/>
               </a:ext>
             </a:extLst>
           </p:cNvPr>
@@ -4961,9 +5014,110 @@
         </p:blipFill>
         <p:spPr>
           <a:xfrm>
-            <a:off x="956440" y="1018775"/>
-            <a:ext cx="10279117" cy="5110474"/>
+            <a:off x="764699" y="942562"/>
+            <a:ext cx="10662602" cy="5173230"/>
           </a:xfrm>
+          <a:prstGeom prst="rect">
+            <a:avLst/>
+          </a:prstGeom>
+        </p:spPr>
+      </p:pic>
+    </p:spTree>
+    <p:extLst>
+      <p:ext uri="{BB962C8B-B14F-4D97-AF65-F5344CB8AC3E}">
+        <p14:creationId xmlns:p14="http://schemas.microsoft.com/office/powerpoint/2010/main" val="2539467338"/>
+      </p:ext>
+    </p:extLst>
+  </p:cSld>
+  <p:clrMapOvr>
+    <a:masterClrMapping/>
+  </p:clrMapOvr>
+</p:sld>
+</file>
+
+<file path=ppt/slides/slide12.xml><?xml version="1.0" encoding="utf-8"?>
+<p:sld xmlns:a="http://schemas.openxmlformats.org/drawingml/2006/main" xmlns:r="http://schemas.openxmlformats.org/officeDocument/2006/relationships" xmlns:p="http://schemas.openxmlformats.org/presentationml/2006/main">
+  <p:cSld>
+    <p:spTree>
+      <p:nvGrpSpPr>
+        <p:cNvPr id="1" name=""/>
+        <p:cNvGrpSpPr/>
+        <p:nvPr/>
+      </p:nvGrpSpPr>
+      <p:grpSpPr>
+        <a:xfrm>
+          <a:off x="0" y="0"/>
+          <a:ext cx="0" cy="0"/>
+          <a:chOff x="0" y="0"/>
+          <a:chExt cx="0" cy="0"/>
+        </a:xfrm>
+      </p:grpSpPr>
+      <p:sp>
+        <p:nvSpPr>
+          <p:cNvPr id="2" name="Title 1">
+            <a:extLst>
+              <a:ext uri="{FF2B5EF4-FFF2-40B4-BE49-F238E27FC236}">
+                <a16:creationId xmlns:a16="http://schemas.microsoft.com/office/drawing/2014/main" id="{23DE5264-6BE3-9E43-B817-EA8F55CE019A}"/>
+              </a:ext>
+            </a:extLst>
+          </p:cNvPr>
+          <p:cNvSpPr>
+            <a:spLocks noGrp="1"/>
+          </p:cNvSpPr>
+          <p:nvPr>
+            <p:ph type="title"/>
+          </p:nvPr>
+        </p:nvSpPr>
+        <p:spPr>
+          <a:xfrm>
+            <a:off x="1143000" y="0"/>
+            <a:ext cx="9905999" cy="1360898"/>
+          </a:xfrm>
+        </p:spPr>
+        <p:txBody>
+          <a:bodyPr/>
+          <a:lstStyle/>
+          <a:p>
+            <a:r>
+              <a:rPr lang="pt-PT" dirty="0">
+                <a:latin typeface="Times New Roman" panose="02020603050405020304" pitchFamily="18" charset="0"/>
+                <a:cs typeface="Times New Roman" panose="02020603050405020304" pitchFamily="18" charset="0"/>
+              </a:rPr>
+              <a:t> Modelo Relacional</a:t>
+            </a:r>
+          </a:p>
+        </p:txBody>
+      </p:sp>
+      <p:pic>
+        <p:nvPicPr>
+          <p:cNvPr id="10" name="Content Placeholder 9">
+            <a:extLst>
+              <a:ext uri="{FF2B5EF4-FFF2-40B4-BE49-F238E27FC236}">
+                <a16:creationId xmlns:a16="http://schemas.microsoft.com/office/drawing/2014/main" id="{A8F4F011-7371-2FEE-9FC7-AC8FB9B0F189}"/>
+              </a:ext>
+            </a:extLst>
+          </p:cNvPr>
+          <p:cNvPicPr>
+            <a:picLocks noGrp="1" noChangeAspect="1"/>
+          </p:cNvPicPr>
+          <p:nvPr>
+            <p:ph idx="1"/>
+          </p:nvPr>
+        </p:nvPicPr>
+        <p:blipFill>
+          <a:blip r:embed="rId2"/>
+          <a:stretch>
+            <a:fillRect/>
+          </a:stretch>
+        </p:blipFill>
+        <p:spPr>
+          <a:xfrm>
+            <a:off x="836714" y="1009302"/>
+            <a:ext cx="10518570" cy="5100652"/>
+          </a:xfrm>
+          <a:prstGeom prst="rect">
+            <a:avLst/>
+          </a:prstGeom>
         </p:spPr>
       </p:pic>
     </p:spTree>
@@ -5559,867 +5713,934 @@
           <a:lstStyle/>
           <a:p>
             <a:r>
-              <a:rPr lang="pt-PT" sz="1600" dirty="0"/>
+              <a:rPr lang="pt-PT" sz="1800" dirty="0"/>
               <a:t>Registo de utilizadores: </a:t>
             </a:r>
             <a:r>
-              <a:rPr lang="en-GB" sz="1600" dirty="0" err="1">
+              <a:rPr lang="en-GB" sz="1800" dirty="0" err="1">
                 <a:latin typeface="Times New Roman" panose="02020603050405020304" pitchFamily="18" charset="0"/>
                 <a:cs typeface="Times New Roman" panose="02020603050405020304" pitchFamily="18" charset="0"/>
               </a:rPr>
               <a:t>Criar</a:t>
             </a:r>
             <a:r>
-              <a:rPr lang="en-GB" sz="1600" dirty="0">
+              <a:rPr lang="en-GB" sz="1800" dirty="0">
                 <a:latin typeface="Times New Roman" panose="02020603050405020304" pitchFamily="18" charset="0"/>
                 <a:cs typeface="Times New Roman" panose="02020603050405020304" pitchFamily="18" charset="0"/>
               </a:rPr>
               <a:t> um novo </a:t>
             </a:r>
             <a:r>
-              <a:rPr lang="en-GB" sz="1600" dirty="0" err="1">
+              <a:rPr lang="en-GB" sz="1800" dirty="0" err="1">
                 <a:latin typeface="Times New Roman" panose="02020603050405020304" pitchFamily="18" charset="0"/>
                 <a:cs typeface="Times New Roman" panose="02020603050405020304" pitchFamily="18" charset="0"/>
               </a:rPr>
               <a:t>utilizador</a:t>
             </a:r>
             <a:r>
-              <a:rPr lang="en-GB" sz="1600" dirty="0">
+              <a:rPr lang="en-GB" sz="1800" dirty="0">
                 <a:latin typeface="Times New Roman" panose="02020603050405020304" pitchFamily="18" charset="0"/>
                 <a:cs typeface="Times New Roman" panose="02020603050405020304" pitchFamily="18" charset="0"/>
               </a:rPr>
               <a:t>, </a:t>
             </a:r>
             <a:r>
-              <a:rPr lang="en-GB" sz="1600" dirty="0" err="1">
+              <a:rPr lang="en-GB" sz="1800" dirty="0" err="1">
                 <a:latin typeface="Times New Roman" panose="02020603050405020304" pitchFamily="18" charset="0"/>
                 <a:cs typeface="Times New Roman" panose="02020603050405020304" pitchFamily="18" charset="0"/>
               </a:rPr>
               <a:t>inserindo</a:t>
             </a:r>
             <a:r>
-              <a:rPr lang="en-GB" sz="1600" dirty="0">
+              <a:rPr lang="en-GB" sz="1800" dirty="0">
                 <a:latin typeface="Times New Roman" panose="02020603050405020304" pitchFamily="18" charset="0"/>
                 <a:cs typeface="Times New Roman" panose="02020603050405020304" pitchFamily="18" charset="0"/>
               </a:rPr>
               <a:t> </a:t>
             </a:r>
             <a:r>
-              <a:rPr lang="en-GB" sz="1600" dirty="0" err="1">
+              <a:rPr lang="en-GB" sz="1800" dirty="0" err="1">
                 <a:latin typeface="Times New Roman" panose="02020603050405020304" pitchFamily="18" charset="0"/>
                 <a:cs typeface="Times New Roman" panose="02020603050405020304" pitchFamily="18" charset="0"/>
               </a:rPr>
               <a:t>os</a:t>
             </a:r>
             <a:r>
-              <a:rPr lang="en-GB" sz="1600" dirty="0">
+              <a:rPr lang="en-GB" sz="1800" dirty="0">
                 <a:latin typeface="Times New Roman" panose="02020603050405020304" pitchFamily="18" charset="0"/>
                 <a:cs typeface="Times New Roman" panose="02020603050405020304" pitchFamily="18" charset="0"/>
               </a:rPr>
               <a:t> dados </a:t>
             </a:r>
             <a:r>
-              <a:rPr lang="en-GB" sz="1600" dirty="0" err="1">
-                <a:latin typeface="Times New Roman" panose="02020603050405020304" pitchFamily="18" charset="0"/>
-                <a:cs typeface="Times New Roman" panose="02020603050405020304" pitchFamily="18" charset="0"/>
-              </a:rPr>
-              <a:t>requeridos</a:t>
-            </a:r>
-            <a:r>
-              <a:rPr lang="en-GB" sz="1600" dirty="0">
+              <a:rPr lang="en-GB" sz="1800" dirty="0" err="1">
+                <a:latin typeface="Times New Roman" panose="02020603050405020304" pitchFamily="18" charset="0"/>
+                <a:cs typeface="Times New Roman" panose="02020603050405020304" pitchFamily="18" charset="0"/>
+              </a:rPr>
+              <a:t>recebidos</a:t>
+            </a:r>
+            <a:r>
+              <a:rPr lang="en-GB" sz="1800" dirty="0">
                 <a:latin typeface="Times New Roman" panose="02020603050405020304" pitchFamily="18" charset="0"/>
                 <a:cs typeface="Times New Roman" panose="02020603050405020304" pitchFamily="18" charset="0"/>
               </a:rPr>
               <a:t> </a:t>
             </a:r>
             <a:r>
-              <a:rPr lang="en-GB" sz="1600" dirty="0" err="1">
-                <a:latin typeface="Times New Roman" panose="02020603050405020304" pitchFamily="18" charset="0"/>
-                <a:cs typeface="Times New Roman" panose="02020603050405020304" pitchFamily="18" charset="0"/>
-              </a:rPr>
-              <a:t>pelo</a:t>
-            </a:r>
-            <a:r>
-              <a:rPr lang="en-GB" sz="1600" dirty="0">
+              <a:rPr lang="en-GB" sz="1800" dirty="0" err="1">
+                <a:latin typeface="Times New Roman" panose="02020603050405020304" pitchFamily="18" charset="0"/>
+                <a:cs typeface="Times New Roman" panose="02020603050405020304" pitchFamily="18" charset="0"/>
+              </a:rPr>
+              <a:t>através</a:t>
+            </a:r>
+            <a:r>
+              <a:rPr lang="en-GB" sz="1800" dirty="0">
+                <a:latin typeface="Times New Roman" panose="02020603050405020304" pitchFamily="18" charset="0"/>
+                <a:cs typeface="Times New Roman" panose="02020603050405020304" pitchFamily="18" charset="0"/>
+              </a:rPr>
+              <a:t> do Postman </a:t>
+            </a:r>
+            <a:r>
+              <a:rPr lang="en-GB" sz="1800" dirty="0" err="1">
+                <a:latin typeface="Times New Roman" panose="02020603050405020304" pitchFamily="18" charset="0"/>
+                <a:cs typeface="Times New Roman" panose="02020603050405020304" pitchFamily="18" charset="0"/>
+              </a:rPr>
+              <a:t>numa</a:t>
+            </a:r>
+            <a:r>
+              <a:rPr lang="en-GB" sz="1800" dirty="0">
+                <a:latin typeface="Times New Roman" panose="02020603050405020304" pitchFamily="18" charset="0"/>
+                <a:cs typeface="Times New Roman" panose="02020603050405020304" pitchFamily="18" charset="0"/>
+              </a:rPr>
+              <a:t> nova </a:t>
+            </a:r>
+            <a:r>
+              <a:rPr lang="en-GB" sz="1800" dirty="0" err="1">
+                <a:latin typeface="Times New Roman" panose="02020603050405020304" pitchFamily="18" charset="0"/>
+                <a:cs typeface="Times New Roman" panose="02020603050405020304" pitchFamily="18" charset="0"/>
+              </a:rPr>
+              <a:t>linha</a:t>
+            </a:r>
+            <a:r>
+              <a:rPr lang="en-GB" sz="1800" dirty="0">
                 <a:latin typeface="Times New Roman" panose="02020603050405020304" pitchFamily="18" charset="0"/>
                 <a:cs typeface="Times New Roman" panose="02020603050405020304" pitchFamily="18" charset="0"/>
               </a:rPr>
               <a:t> </a:t>
             </a:r>
             <a:r>
-              <a:rPr lang="en-GB" sz="1600" dirty="0" err="1">
-                <a:latin typeface="Times New Roman" panose="02020603050405020304" pitchFamily="18" charset="0"/>
-                <a:cs typeface="Times New Roman" panose="02020603050405020304" pitchFamily="18" charset="0"/>
-              </a:rPr>
-              <a:t>modelo</a:t>
-            </a:r>
-            <a:r>
-              <a:rPr lang="en-GB" sz="1600" dirty="0">
-                <a:latin typeface="Times New Roman" panose="02020603050405020304" pitchFamily="18" charset="0"/>
-                <a:cs typeface="Times New Roman" panose="02020603050405020304" pitchFamily="18" charset="0"/>
-              </a:rPr>
-              <a:t> de dados. </a:t>
-            </a:r>
-          </a:p>
-          <a:p>
-            <a:r>
-              <a:rPr lang="en-GB" sz="1600" dirty="0" err="1">
+              <a:rPr lang="en-GB" sz="1800" dirty="0" err="1">
+                <a:latin typeface="Times New Roman" panose="02020603050405020304" pitchFamily="18" charset="0"/>
+                <a:cs typeface="Times New Roman" panose="02020603050405020304" pitchFamily="18" charset="0"/>
+              </a:rPr>
+              <a:t>na</a:t>
+            </a:r>
+            <a:r>
+              <a:rPr lang="en-GB" sz="1800" dirty="0">
+                <a:latin typeface="Times New Roman" panose="02020603050405020304" pitchFamily="18" charset="0"/>
+                <a:cs typeface="Times New Roman" panose="02020603050405020304" pitchFamily="18" charset="0"/>
+              </a:rPr>
+              <a:t> </a:t>
+            </a:r>
+            <a:r>
+              <a:rPr lang="en-GB" sz="1800" dirty="0" err="1">
+                <a:latin typeface="Times New Roman" panose="02020603050405020304" pitchFamily="18" charset="0"/>
+                <a:cs typeface="Times New Roman" panose="02020603050405020304" pitchFamily="18" charset="0"/>
+              </a:rPr>
+              <a:t>tabela</a:t>
+            </a:r>
+            <a:r>
+              <a:rPr lang="en-GB" sz="1800" dirty="0">
+                <a:latin typeface="Times New Roman" panose="02020603050405020304" pitchFamily="18" charset="0"/>
+                <a:cs typeface="Times New Roman" panose="02020603050405020304" pitchFamily="18" charset="0"/>
+              </a:rPr>
+              <a:t> </a:t>
+            </a:r>
+            <a:r>
+              <a:rPr lang="en-GB" sz="1800" dirty="0" err="1">
+                <a:latin typeface="Times New Roman" panose="02020603050405020304" pitchFamily="18" charset="0"/>
+                <a:cs typeface="Times New Roman" panose="02020603050405020304" pitchFamily="18" charset="0"/>
+              </a:rPr>
+              <a:t>Utilizadores</a:t>
+            </a:r>
+            <a:r>
+              <a:rPr lang="en-GB" sz="1800" dirty="0">
+                <a:latin typeface="Times New Roman" panose="02020603050405020304" pitchFamily="18" charset="0"/>
+                <a:cs typeface="Times New Roman" panose="02020603050405020304" pitchFamily="18" charset="0"/>
+              </a:rPr>
+              <a:t>.</a:t>
+            </a:r>
+          </a:p>
+          <a:p>
+            <a:r>
+              <a:rPr lang="en-GB" sz="1800" dirty="0" err="1">
                 <a:latin typeface="Times New Roman" panose="02020603050405020304" pitchFamily="18" charset="0"/>
                 <a:cs typeface="Times New Roman" panose="02020603050405020304" pitchFamily="18" charset="0"/>
               </a:rPr>
               <a:t>Autenticação</a:t>
             </a:r>
             <a:r>
-              <a:rPr lang="en-GB" sz="1600" dirty="0">
+              <a:rPr lang="en-GB" sz="1800" dirty="0">
                 <a:latin typeface="Times New Roman" panose="02020603050405020304" pitchFamily="18" charset="0"/>
                 <a:cs typeface="Times New Roman" panose="02020603050405020304" pitchFamily="18" charset="0"/>
               </a:rPr>
               <a:t> de </a:t>
             </a:r>
             <a:r>
-              <a:rPr lang="en-GB" sz="1600" dirty="0" err="1">
+              <a:rPr lang="en-GB" sz="1800" dirty="0" err="1">
                 <a:latin typeface="Times New Roman" panose="02020603050405020304" pitchFamily="18" charset="0"/>
                 <a:cs typeface="Times New Roman" panose="02020603050405020304" pitchFamily="18" charset="0"/>
               </a:rPr>
               <a:t>utilizadores</a:t>
             </a:r>
             <a:r>
-              <a:rPr lang="en-GB" sz="1600" dirty="0">
+              <a:rPr lang="en-GB" sz="1800" dirty="0">
                 <a:latin typeface="Times New Roman" panose="02020603050405020304" pitchFamily="18" charset="0"/>
                 <a:cs typeface="Times New Roman" panose="02020603050405020304" pitchFamily="18" charset="0"/>
               </a:rPr>
               <a:t>: Login com </a:t>
             </a:r>
             <a:r>
-              <a:rPr lang="en-GB" sz="1600" i="1" dirty="0">
+              <a:rPr lang="en-GB" sz="1800" i="1" dirty="0">
                 <a:latin typeface="Times New Roman" panose="02020603050405020304" pitchFamily="18" charset="0"/>
                 <a:cs typeface="Times New Roman" panose="02020603050405020304" pitchFamily="18" charset="0"/>
               </a:rPr>
               <a:t>username </a:t>
             </a:r>
             <a:r>
-              <a:rPr lang="en-GB" sz="1600" dirty="0">
+              <a:rPr lang="en-GB" sz="1800" dirty="0">
                 <a:latin typeface="Times New Roman" panose="02020603050405020304" pitchFamily="18" charset="0"/>
                 <a:cs typeface="Times New Roman" panose="02020603050405020304" pitchFamily="18" charset="0"/>
               </a:rPr>
               <a:t>e </a:t>
             </a:r>
             <a:r>
-              <a:rPr lang="en-GB" sz="1600" i="1" dirty="0">
-                <a:latin typeface="Times New Roman" panose="02020603050405020304" pitchFamily="18" charset="0"/>
-                <a:cs typeface="Times New Roman" panose="02020603050405020304" pitchFamily="18" charset="0"/>
-              </a:rPr>
-              <a:t>password.</a:t>
-            </a:r>
-          </a:p>
-          <a:p>
-            <a:r>
-              <a:rPr lang="en-GB" sz="1600" dirty="0" err="1">
+              <a:rPr lang="en-GB" sz="1800" i="1" dirty="0">
+                <a:latin typeface="Times New Roman" panose="02020603050405020304" pitchFamily="18" charset="0"/>
+                <a:cs typeface="Times New Roman" panose="02020603050405020304" pitchFamily="18" charset="0"/>
+              </a:rPr>
+              <a:t>password. </a:t>
+            </a:r>
+            <a:r>
+              <a:rPr lang="en-GB" sz="1800" dirty="0" err="1">
+                <a:latin typeface="Times New Roman" panose="02020603050405020304" pitchFamily="18" charset="0"/>
+                <a:cs typeface="Times New Roman" panose="02020603050405020304" pitchFamily="18" charset="0"/>
+              </a:rPr>
+              <a:t>Verifica</a:t>
+            </a:r>
+            <a:r>
+              <a:rPr lang="en-GB" sz="1800" dirty="0">
+                <a:latin typeface="Times New Roman" panose="02020603050405020304" pitchFamily="18" charset="0"/>
+                <a:cs typeface="Times New Roman" panose="02020603050405020304" pitchFamily="18" charset="0"/>
+              </a:rPr>
+              <a:t> se o username e password </a:t>
+            </a:r>
+            <a:r>
+              <a:rPr lang="en-GB" sz="1800" dirty="0" err="1">
+                <a:latin typeface="Times New Roman" panose="02020603050405020304" pitchFamily="18" charset="0"/>
+                <a:cs typeface="Times New Roman" panose="02020603050405020304" pitchFamily="18" charset="0"/>
+              </a:rPr>
+              <a:t>introduzidos</a:t>
+            </a:r>
+            <a:r>
+              <a:rPr lang="en-GB" sz="1800" dirty="0">
+                <a:latin typeface="Times New Roman" panose="02020603050405020304" pitchFamily="18" charset="0"/>
+                <a:cs typeface="Times New Roman" panose="02020603050405020304" pitchFamily="18" charset="0"/>
+              </a:rPr>
+              <a:t> </a:t>
+            </a:r>
+            <a:r>
+              <a:rPr lang="en-GB" sz="1800" dirty="0" err="1">
+                <a:latin typeface="Times New Roman" panose="02020603050405020304" pitchFamily="18" charset="0"/>
+                <a:cs typeface="Times New Roman" panose="02020603050405020304" pitchFamily="18" charset="0"/>
+              </a:rPr>
+              <a:t>estão</a:t>
+            </a:r>
+            <a:r>
+              <a:rPr lang="en-GB" sz="1800" dirty="0">
+                <a:latin typeface="Times New Roman" panose="02020603050405020304" pitchFamily="18" charset="0"/>
+                <a:cs typeface="Times New Roman" panose="02020603050405020304" pitchFamily="18" charset="0"/>
+              </a:rPr>
+              <a:t> </a:t>
+            </a:r>
+            <a:r>
+              <a:rPr lang="en-GB" sz="1800" dirty="0" err="1">
+                <a:latin typeface="Times New Roman" panose="02020603050405020304" pitchFamily="18" charset="0"/>
+                <a:cs typeface="Times New Roman" panose="02020603050405020304" pitchFamily="18" charset="0"/>
+              </a:rPr>
+              <a:t>na</a:t>
+            </a:r>
+            <a:r>
+              <a:rPr lang="en-GB" sz="1800" dirty="0">
+                <a:latin typeface="Times New Roman" panose="02020603050405020304" pitchFamily="18" charset="0"/>
+                <a:cs typeface="Times New Roman" panose="02020603050405020304" pitchFamily="18" charset="0"/>
+              </a:rPr>
+              <a:t> </a:t>
+            </a:r>
+            <a:r>
+              <a:rPr lang="en-GB" sz="1800" dirty="0" err="1">
+                <a:latin typeface="Times New Roman" panose="02020603050405020304" pitchFamily="18" charset="0"/>
+                <a:cs typeface="Times New Roman" panose="02020603050405020304" pitchFamily="18" charset="0"/>
+              </a:rPr>
+              <a:t>tabela</a:t>
+            </a:r>
+            <a:r>
+              <a:rPr lang="en-GB" sz="1800" dirty="0">
+                <a:latin typeface="Times New Roman" panose="02020603050405020304" pitchFamily="18" charset="0"/>
+                <a:cs typeface="Times New Roman" panose="02020603050405020304" pitchFamily="18" charset="0"/>
+              </a:rPr>
+              <a:t> de </a:t>
+            </a:r>
+            <a:r>
+              <a:rPr lang="en-GB" sz="1800" dirty="0" err="1">
+                <a:latin typeface="Times New Roman" panose="02020603050405020304" pitchFamily="18" charset="0"/>
+                <a:cs typeface="Times New Roman" panose="02020603050405020304" pitchFamily="18" charset="0"/>
+              </a:rPr>
+              <a:t>Utilizadores</a:t>
+            </a:r>
+            <a:r>
+              <a:rPr lang="en-GB" sz="1800" dirty="0">
+                <a:latin typeface="Times New Roman" panose="02020603050405020304" pitchFamily="18" charset="0"/>
+                <a:cs typeface="Times New Roman" panose="02020603050405020304" pitchFamily="18" charset="0"/>
+              </a:rPr>
+              <a:t>.</a:t>
+            </a:r>
+            <a:endParaRPr lang="en-GB" sz="1800" i="1" dirty="0">
+              <a:latin typeface="Times New Roman" panose="02020603050405020304" pitchFamily="18" charset="0"/>
+              <a:cs typeface="Times New Roman" panose="02020603050405020304" pitchFamily="18" charset="0"/>
+            </a:endParaRPr>
+          </a:p>
+          <a:p>
+            <a:r>
+              <a:rPr lang="en-GB" sz="1800" dirty="0" err="1">
                 <a:latin typeface="Times New Roman" panose="02020603050405020304" pitchFamily="18" charset="0"/>
                 <a:cs typeface="Times New Roman" panose="02020603050405020304" pitchFamily="18" charset="0"/>
               </a:rPr>
               <a:t>Criar</a:t>
             </a:r>
             <a:r>
-              <a:rPr lang="en-GB" sz="1600" dirty="0">
+              <a:rPr lang="en-GB" sz="1800" dirty="0">
                 <a:latin typeface="Times New Roman" panose="02020603050405020304" pitchFamily="18" charset="0"/>
                 <a:cs typeface="Times New Roman" panose="02020603050405020304" pitchFamily="18" charset="0"/>
               </a:rPr>
               <a:t> novo </a:t>
             </a:r>
             <a:r>
-              <a:rPr lang="en-GB" sz="1600" dirty="0" err="1">
+              <a:rPr lang="en-GB" sz="1800" dirty="0" err="1">
                 <a:latin typeface="Times New Roman" panose="02020603050405020304" pitchFamily="18" charset="0"/>
                 <a:cs typeface="Times New Roman" panose="02020603050405020304" pitchFamily="18" charset="0"/>
               </a:rPr>
               <a:t>produto</a:t>
             </a:r>
             <a:r>
-              <a:rPr lang="en-GB" sz="1600" dirty="0">
+              <a:rPr lang="en-GB" sz="1800" dirty="0">
                 <a:latin typeface="Times New Roman" panose="02020603050405020304" pitchFamily="18" charset="0"/>
                 <a:cs typeface="Times New Roman" panose="02020603050405020304" pitchFamily="18" charset="0"/>
               </a:rPr>
               <a:t>: </a:t>
             </a:r>
             <a:r>
-              <a:rPr lang="en-GB" sz="1600" dirty="0" err="1">
+              <a:rPr lang="en-GB" sz="1800" dirty="0" err="1">
                 <a:latin typeface="Times New Roman" panose="02020603050405020304" pitchFamily="18" charset="0"/>
                 <a:cs typeface="Times New Roman" panose="02020603050405020304" pitchFamily="18" charset="0"/>
               </a:rPr>
               <a:t>Cada</a:t>
             </a:r>
             <a:r>
-              <a:rPr lang="en-GB" sz="1600" dirty="0">
+              <a:rPr lang="en-GB" sz="1800" dirty="0">
                 <a:latin typeface="Times New Roman" panose="02020603050405020304" pitchFamily="18" charset="0"/>
                 <a:cs typeface="Times New Roman" panose="02020603050405020304" pitchFamily="18" charset="0"/>
               </a:rPr>
               <a:t> </a:t>
             </a:r>
             <a:r>
-              <a:rPr lang="en-GB" sz="1600" dirty="0" err="1">
+              <a:rPr lang="en-GB" sz="1800" dirty="0" err="1">
                 <a:latin typeface="Times New Roman" panose="02020603050405020304" pitchFamily="18" charset="0"/>
                 <a:cs typeface="Times New Roman" panose="02020603050405020304" pitchFamily="18" charset="0"/>
               </a:rPr>
               <a:t>vendedor</a:t>
             </a:r>
             <a:r>
-              <a:rPr lang="en-GB" sz="1600" dirty="0">
+              <a:rPr lang="en-GB" sz="1800" dirty="0">
                 <a:latin typeface="Times New Roman" panose="02020603050405020304" pitchFamily="18" charset="0"/>
                 <a:cs typeface="Times New Roman" panose="02020603050405020304" pitchFamily="18" charset="0"/>
               </a:rPr>
               <a:t> </a:t>
             </a:r>
             <a:r>
-              <a:rPr lang="en-GB" sz="1600" dirty="0" err="1">
+              <a:rPr lang="en-GB" sz="1800" dirty="0" err="1">
                 <a:latin typeface="Times New Roman" panose="02020603050405020304" pitchFamily="18" charset="0"/>
                 <a:cs typeface="Times New Roman" panose="02020603050405020304" pitchFamily="18" charset="0"/>
               </a:rPr>
               <a:t>deve</a:t>
             </a:r>
             <a:r>
-              <a:rPr lang="en-GB" sz="1600" dirty="0">
+              <a:rPr lang="en-GB" sz="1800" dirty="0">
                 <a:latin typeface="Times New Roman" panose="02020603050405020304" pitchFamily="18" charset="0"/>
                 <a:cs typeface="Times New Roman" panose="02020603050405020304" pitchFamily="18" charset="0"/>
               </a:rPr>
               <a:t> </a:t>
             </a:r>
             <a:r>
-              <a:rPr lang="en-GB" sz="1600" dirty="0" err="1">
+              <a:rPr lang="en-GB" sz="1800" dirty="0" err="1">
                 <a:latin typeface="Times New Roman" panose="02020603050405020304" pitchFamily="18" charset="0"/>
                 <a:cs typeface="Times New Roman" panose="02020603050405020304" pitchFamily="18" charset="0"/>
               </a:rPr>
               <a:t>poder</a:t>
             </a:r>
             <a:r>
-              <a:rPr lang="en-GB" sz="1600" dirty="0">
+              <a:rPr lang="en-GB" sz="1800" dirty="0">
                 <a:latin typeface="Times New Roman" panose="02020603050405020304" pitchFamily="18" charset="0"/>
                 <a:cs typeface="Times New Roman" panose="02020603050405020304" pitchFamily="18" charset="0"/>
               </a:rPr>
               <a:t> </a:t>
             </a:r>
             <a:r>
-              <a:rPr lang="en-GB" sz="1600" dirty="0" err="1">
+              <a:rPr lang="en-GB" sz="1800" dirty="0" err="1">
                 <a:latin typeface="Times New Roman" panose="02020603050405020304" pitchFamily="18" charset="0"/>
                 <a:cs typeface="Times New Roman" panose="02020603050405020304" pitchFamily="18" charset="0"/>
               </a:rPr>
               <a:t>criar</a:t>
             </a:r>
             <a:r>
-              <a:rPr lang="en-GB" sz="1600" dirty="0">
+              <a:rPr lang="en-GB" sz="1800" dirty="0">
                 <a:latin typeface="Times New Roman" panose="02020603050405020304" pitchFamily="18" charset="0"/>
                 <a:cs typeface="Times New Roman" panose="02020603050405020304" pitchFamily="18" charset="0"/>
               </a:rPr>
               <a:t> </a:t>
             </a:r>
             <a:r>
-              <a:rPr lang="en-GB" sz="1600" dirty="0" err="1">
+              <a:rPr lang="en-GB" sz="1800" dirty="0" err="1">
                 <a:latin typeface="Times New Roman" panose="02020603050405020304" pitchFamily="18" charset="0"/>
                 <a:cs typeface="Times New Roman" panose="02020603050405020304" pitchFamily="18" charset="0"/>
               </a:rPr>
               <a:t>novos</a:t>
             </a:r>
             <a:r>
-              <a:rPr lang="en-GB" sz="1600" dirty="0">
+              <a:rPr lang="en-GB" sz="1800" dirty="0">
                 <a:latin typeface="Times New Roman" panose="02020603050405020304" pitchFamily="18" charset="0"/>
                 <a:cs typeface="Times New Roman" panose="02020603050405020304" pitchFamily="18" charset="0"/>
               </a:rPr>
               <a:t> </a:t>
             </a:r>
             <a:r>
-              <a:rPr lang="en-GB" sz="1600" dirty="0" err="1">
+              <a:rPr lang="en-GB" sz="1800" dirty="0" err="1">
                 <a:latin typeface="Times New Roman" panose="02020603050405020304" pitchFamily="18" charset="0"/>
                 <a:cs typeface="Times New Roman" panose="02020603050405020304" pitchFamily="18" charset="0"/>
               </a:rPr>
               <a:t>produtos</a:t>
             </a:r>
             <a:r>
-              <a:rPr lang="en-GB" sz="1600" dirty="0">
+              <a:rPr lang="en-GB" sz="1800" dirty="0">
                 <a:latin typeface="Times New Roman" panose="02020603050405020304" pitchFamily="18" charset="0"/>
                 <a:cs typeface="Times New Roman" panose="02020603050405020304" pitchFamily="18" charset="0"/>
               </a:rPr>
               <a:t> para </a:t>
             </a:r>
             <a:r>
-              <a:rPr lang="en-GB" sz="1600" dirty="0" err="1">
+              <a:rPr lang="en-GB" sz="1800" dirty="0" err="1">
                 <a:latin typeface="Times New Roman" panose="02020603050405020304" pitchFamily="18" charset="0"/>
                 <a:cs typeface="Times New Roman" panose="02020603050405020304" pitchFamily="18" charset="0"/>
               </a:rPr>
               <a:t>comercializar</a:t>
             </a:r>
             <a:r>
-              <a:rPr lang="en-GB" sz="1600" dirty="0">
+              <a:rPr lang="en-GB" sz="1800" dirty="0">
+                <a:latin typeface="Times New Roman" panose="02020603050405020304" pitchFamily="18" charset="0"/>
+                <a:cs typeface="Times New Roman" panose="02020603050405020304" pitchFamily="18" charset="0"/>
+              </a:rPr>
+              <a:t>. O </a:t>
+            </a:r>
+            <a:r>
+              <a:rPr lang="en-GB" sz="1800" dirty="0" err="1">
+                <a:latin typeface="Times New Roman" panose="02020603050405020304" pitchFamily="18" charset="0"/>
+                <a:cs typeface="Times New Roman" panose="02020603050405020304" pitchFamily="18" charset="0"/>
+              </a:rPr>
+              <a:t>programa</a:t>
+            </a:r>
+            <a:r>
+              <a:rPr lang="en-GB" sz="1800" dirty="0">
+                <a:latin typeface="Times New Roman" panose="02020603050405020304" pitchFamily="18" charset="0"/>
+                <a:cs typeface="Times New Roman" panose="02020603050405020304" pitchFamily="18" charset="0"/>
+              </a:rPr>
+              <a:t> </a:t>
+            </a:r>
+            <a:r>
+              <a:rPr lang="en-GB" sz="1800" dirty="0" err="1">
+                <a:latin typeface="Times New Roman" panose="02020603050405020304" pitchFamily="18" charset="0"/>
+                <a:cs typeface="Times New Roman" panose="02020603050405020304" pitchFamily="18" charset="0"/>
+              </a:rPr>
+              <a:t>recebe</a:t>
+            </a:r>
+            <a:r>
+              <a:rPr lang="en-GB" sz="1800" dirty="0">
+                <a:latin typeface="Times New Roman" panose="02020603050405020304" pitchFamily="18" charset="0"/>
+                <a:cs typeface="Times New Roman" panose="02020603050405020304" pitchFamily="18" charset="0"/>
+              </a:rPr>
+              <a:t> </a:t>
+            </a:r>
+            <a:r>
+              <a:rPr lang="en-GB" sz="1800" dirty="0" err="1">
+                <a:latin typeface="Times New Roman" panose="02020603050405020304" pitchFamily="18" charset="0"/>
+                <a:cs typeface="Times New Roman" panose="02020603050405020304" pitchFamily="18" charset="0"/>
+              </a:rPr>
+              <a:t>os</a:t>
+            </a:r>
+            <a:r>
+              <a:rPr lang="en-GB" sz="1800" dirty="0">
+                <a:latin typeface="Times New Roman" panose="02020603050405020304" pitchFamily="18" charset="0"/>
+                <a:cs typeface="Times New Roman" panose="02020603050405020304" pitchFamily="18" charset="0"/>
+              </a:rPr>
+              <a:t> </a:t>
+            </a:r>
+            <a:r>
+              <a:rPr lang="en-GB" sz="1800" dirty="0" err="1">
+                <a:latin typeface="Times New Roman" panose="02020603050405020304" pitchFamily="18" charset="0"/>
+                <a:cs typeface="Times New Roman" panose="02020603050405020304" pitchFamily="18" charset="0"/>
+              </a:rPr>
+              <a:t>valores</a:t>
+            </a:r>
+            <a:r>
+              <a:rPr lang="en-GB" sz="1800" dirty="0">
+                <a:latin typeface="Times New Roman" panose="02020603050405020304" pitchFamily="18" charset="0"/>
+                <a:cs typeface="Times New Roman" panose="02020603050405020304" pitchFamily="18" charset="0"/>
+              </a:rPr>
+              <a:t> do novo </a:t>
+            </a:r>
+            <a:r>
+              <a:rPr lang="en-GB" sz="1800" dirty="0" err="1">
+                <a:latin typeface="Times New Roman" panose="02020603050405020304" pitchFamily="18" charset="0"/>
+                <a:cs typeface="Times New Roman" panose="02020603050405020304" pitchFamily="18" charset="0"/>
+              </a:rPr>
+              <a:t>produto</a:t>
+            </a:r>
+            <a:r>
+              <a:rPr lang="en-GB" sz="1800" dirty="0">
+                <a:latin typeface="Times New Roman" panose="02020603050405020304" pitchFamily="18" charset="0"/>
+                <a:cs typeface="Times New Roman" panose="02020603050405020304" pitchFamily="18" charset="0"/>
+              </a:rPr>
+              <a:t> e </a:t>
+            </a:r>
+            <a:r>
+              <a:rPr lang="en-GB" sz="1800" dirty="0" err="1">
+                <a:latin typeface="Times New Roman" panose="02020603050405020304" pitchFamily="18" charset="0"/>
+                <a:cs typeface="Times New Roman" panose="02020603050405020304" pitchFamily="18" charset="0"/>
+              </a:rPr>
+              <a:t>insere-os</a:t>
+            </a:r>
+            <a:r>
+              <a:rPr lang="en-GB" sz="1800" dirty="0">
+                <a:latin typeface="Times New Roman" panose="02020603050405020304" pitchFamily="18" charset="0"/>
+                <a:cs typeface="Times New Roman" panose="02020603050405020304" pitchFamily="18" charset="0"/>
+              </a:rPr>
+              <a:t> </a:t>
+            </a:r>
+            <a:r>
+              <a:rPr lang="en-GB" sz="1800" dirty="0" err="1">
+                <a:latin typeface="Times New Roman" panose="02020603050405020304" pitchFamily="18" charset="0"/>
+                <a:cs typeface="Times New Roman" panose="02020603050405020304" pitchFamily="18" charset="0"/>
+              </a:rPr>
+              <a:t>na</a:t>
+            </a:r>
+            <a:r>
+              <a:rPr lang="en-GB" sz="1800" dirty="0">
+                <a:latin typeface="Times New Roman" panose="02020603050405020304" pitchFamily="18" charset="0"/>
+                <a:cs typeface="Times New Roman" panose="02020603050405020304" pitchFamily="18" charset="0"/>
+              </a:rPr>
+              <a:t> </a:t>
+            </a:r>
+            <a:r>
+              <a:rPr lang="en-GB" sz="1800" dirty="0" err="1">
+                <a:latin typeface="Times New Roman" panose="02020603050405020304" pitchFamily="18" charset="0"/>
+                <a:cs typeface="Times New Roman" panose="02020603050405020304" pitchFamily="18" charset="0"/>
+              </a:rPr>
+              <a:t>tabela</a:t>
+            </a:r>
+            <a:r>
+              <a:rPr lang="en-GB" sz="1800" dirty="0">
+                <a:latin typeface="Times New Roman" panose="02020603050405020304" pitchFamily="18" charset="0"/>
+                <a:cs typeface="Times New Roman" panose="02020603050405020304" pitchFamily="18" charset="0"/>
+              </a:rPr>
+              <a:t> de </a:t>
+            </a:r>
+            <a:r>
+              <a:rPr lang="en-GB" sz="1800" dirty="0" err="1">
+                <a:latin typeface="Times New Roman" panose="02020603050405020304" pitchFamily="18" charset="0"/>
+                <a:cs typeface="Times New Roman" panose="02020603050405020304" pitchFamily="18" charset="0"/>
+              </a:rPr>
+              <a:t>Produtos</a:t>
+            </a:r>
+            <a:r>
+              <a:rPr lang="en-GB" sz="1800" dirty="0">
+                <a:latin typeface="Times New Roman" panose="02020603050405020304" pitchFamily="18" charset="0"/>
+                <a:cs typeface="Times New Roman" panose="02020603050405020304" pitchFamily="18" charset="0"/>
+              </a:rPr>
+              <a:t> </a:t>
+            </a:r>
+            <a:r>
+              <a:rPr lang="en-GB" sz="1800" dirty="0" err="1">
+                <a:latin typeface="Times New Roman" panose="02020603050405020304" pitchFamily="18" charset="0"/>
+                <a:cs typeface="Times New Roman" panose="02020603050405020304" pitchFamily="18" charset="0"/>
+              </a:rPr>
+              <a:t>como</a:t>
+            </a:r>
+            <a:r>
+              <a:rPr lang="en-GB" sz="1800" dirty="0">
+                <a:latin typeface="Times New Roman" panose="02020603050405020304" pitchFamily="18" charset="0"/>
+                <a:cs typeface="Times New Roman" panose="02020603050405020304" pitchFamily="18" charset="0"/>
+              </a:rPr>
+              <a:t> </a:t>
+            </a:r>
+            <a:r>
+              <a:rPr lang="en-GB" sz="1800" dirty="0" err="1">
+                <a:latin typeface="Times New Roman" panose="02020603050405020304" pitchFamily="18" charset="0"/>
+                <a:cs typeface="Times New Roman" panose="02020603050405020304" pitchFamily="18" charset="0"/>
+              </a:rPr>
+              <a:t>uma</a:t>
+            </a:r>
+            <a:r>
+              <a:rPr lang="en-GB" sz="1800" dirty="0">
+                <a:latin typeface="Times New Roman" panose="02020603050405020304" pitchFamily="18" charset="0"/>
+                <a:cs typeface="Times New Roman" panose="02020603050405020304" pitchFamily="18" charset="0"/>
+              </a:rPr>
+              <a:t> nova </a:t>
+            </a:r>
+            <a:r>
+              <a:rPr lang="en-GB" sz="1800" dirty="0" err="1">
+                <a:latin typeface="Times New Roman" panose="02020603050405020304" pitchFamily="18" charset="0"/>
+                <a:cs typeface="Times New Roman" panose="02020603050405020304" pitchFamily="18" charset="0"/>
+              </a:rPr>
+              <a:t>linha</a:t>
+            </a:r>
+            <a:r>
+              <a:rPr lang="en-GB" sz="1800" dirty="0">
+                <a:latin typeface="Times New Roman" panose="02020603050405020304" pitchFamily="18" charset="0"/>
+                <a:cs typeface="Times New Roman" panose="02020603050405020304" pitchFamily="18" charset="0"/>
+              </a:rPr>
+              <a:t>.</a:t>
+            </a:r>
+          </a:p>
+          <a:p>
+            <a:r>
+              <a:rPr lang="en-GB" sz="1800" dirty="0" err="1">
+                <a:latin typeface="Times New Roman" panose="02020603050405020304" pitchFamily="18" charset="0"/>
+                <a:cs typeface="Times New Roman" panose="02020603050405020304" pitchFamily="18" charset="0"/>
+              </a:rPr>
+              <a:t>Atualizar</a:t>
+            </a:r>
+            <a:r>
+              <a:rPr lang="en-GB" sz="1800" dirty="0">
+                <a:latin typeface="Times New Roman" panose="02020603050405020304" pitchFamily="18" charset="0"/>
+                <a:cs typeface="Times New Roman" panose="02020603050405020304" pitchFamily="18" charset="0"/>
+              </a:rPr>
+              <a:t> </a:t>
+            </a:r>
+            <a:r>
+              <a:rPr lang="en-GB" sz="1800" dirty="0" err="1">
+                <a:latin typeface="Times New Roman" panose="02020603050405020304" pitchFamily="18" charset="0"/>
+                <a:cs typeface="Times New Roman" panose="02020603050405020304" pitchFamily="18" charset="0"/>
+              </a:rPr>
+              <a:t>detalhes</a:t>
+            </a:r>
+            <a:r>
+              <a:rPr lang="en-GB" sz="1800" dirty="0">
+                <a:latin typeface="Times New Roman" panose="02020603050405020304" pitchFamily="18" charset="0"/>
+                <a:cs typeface="Times New Roman" panose="02020603050405020304" pitchFamily="18" charset="0"/>
+              </a:rPr>
+              <a:t> </a:t>
+            </a:r>
+            <a:r>
+              <a:rPr lang="en-GB" sz="1800" dirty="0" err="1">
+                <a:latin typeface="Times New Roman" panose="02020603050405020304" pitchFamily="18" charset="0"/>
+                <a:cs typeface="Times New Roman" panose="02020603050405020304" pitchFamily="18" charset="0"/>
+              </a:rPr>
+              <a:t>produto</a:t>
+            </a:r>
+            <a:r>
+              <a:rPr lang="en-GB" sz="1800" dirty="0">
+                <a:latin typeface="Times New Roman" panose="02020603050405020304" pitchFamily="18" charset="0"/>
+                <a:cs typeface="Times New Roman" panose="02020603050405020304" pitchFamily="18" charset="0"/>
+              </a:rPr>
+              <a:t>: </a:t>
+            </a:r>
+            <a:r>
+              <a:rPr lang="en-GB" sz="1800" dirty="0" err="1">
+                <a:latin typeface="Times New Roman" panose="02020603050405020304" pitchFamily="18" charset="0"/>
+                <a:cs typeface="Times New Roman" panose="02020603050405020304" pitchFamily="18" charset="0"/>
+              </a:rPr>
+              <a:t>Cada</a:t>
+            </a:r>
+            <a:r>
+              <a:rPr lang="en-GB" sz="1800" dirty="0">
+                <a:latin typeface="Times New Roman" panose="02020603050405020304" pitchFamily="18" charset="0"/>
+                <a:cs typeface="Times New Roman" panose="02020603050405020304" pitchFamily="18" charset="0"/>
+              </a:rPr>
+              <a:t> </a:t>
+            </a:r>
+            <a:r>
+              <a:rPr lang="en-GB" sz="1800" dirty="0" err="1">
+                <a:latin typeface="Times New Roman" panose="02020603050405020304" pitchFamily="18" charset="0"/>
+                <a:cs typeface="Times New Roman" panose="02020603050405020304" pitchFamily="18" charset="0"/>
+              </a:rPr>
+              <a:t>vendedor</a:t>
+            </a:r>
+            <a:r>
+              <a:rPr lang="en-GB" sz="1800" dirty="0">
+                <a:latin typeface="Times New Roman" panose="02020603050405020304" pitchFamily="18" charset="0"/>
+                <a:cs typeface="Times New Roman" panose="02020603050405020304" pitchFamily="18" charset="0"/>
+              </a:rPr>
+              <a:t> </a:t>
+            </a:r>
+            <a:r>
+              <a:rPr lang="en-GB" sz="1800" dirty="0" err="1">
+                <a:latin typeface="Times New Roman" panose="02020603050405020304" pitchFamily="18" charset="0"/>
+                <a:cs typeface="Times New Roman" panose="02020603050405020304" pitchFamily="18" charset="0"/>
+              </a:rPr>
+              <a:t>pode</a:t>
+            </a:r>
+            <a:r>
+              <a:rPr lang="en-GB" sz="1800" dirty="0">
+                <a:latin typeface="Times New Roman" panose="02020603050405020304" pitchFamily="18" charset="0"/>
+                <a:cs typeface="Times New Roman" panose="02020603050405020304" pitchFamily="18" charset="0"/>
+              </a:rPr>
+              <a:t> </a:t>
+            </a:r>
+            <a:r>
+              <a:rPr lang="en-GB" sz="1800" dirty="0" err="1">
+                <a:latin typeface="Times New Roman" panose="02020603050405020304" pitchFamily="18" charset="0"/>
+                <a:cs typeface="Times New Roman" panose="02020603050405020304" pitchFamily="18" charset="0"/>
+              </a:rPr>
+              <a:t>alterar</a:t>
+            </a:r>
+            <a:r>
+              <a:rPr lang="en-GB" sz="1800" dirty="0">
+                <a:latin typeface="Times New Roman" panose="02020603050405020304" pitchFamily="18" charset="0"/>
+                <a:cs typeface="Times New Roman" panose="02020603050405020304" pitchFamily="18" charset="0"/>
+              </a:rPr>
+              <a:t> </a:t>
+            </a:r>
+            <a:r>
+              <a:rPr lang="en-GB" sz="1800" dirty="0" err="1">
+                <a:latin typeface="Times New Roman" panose="02020603050405020304" pitchFamily="18" charset="0"/>
+                <a:cs typeface="Times New Roman" panose="02020603050405020304" pitchFamily="18" charset="0"/>
+              </a:rPr>
+              <a:t>detalhes</a:t>
+            </a:r>
+            <a:r>
+              <a:rPr lang="en-GB" sz="1800" dirty="0">
+                <a:latin typeface="Times New Roman" panose="02020603050405020304" pitchFamily="18" charset="0"/>
+                <a:cs typeface="Times New Roman" panose="02020603050405020304" pitchFamily="18" charset="0"/>
+              </a:rPr>
+              <a:t> dos </a:t>
+            </a:r>
+            <a:r>
+              <a:rPr lang="en-GB" sz="1800" dirty="0" err="1">
+                <a:latin typeface="Times New Roman" panose="02020603050405020304" pitchFamily="18" charset="0"/>
+                <a:cs typeface="Times New Roman" panose="02020603050405020304" pitchFamily="18" charset="0"/>
+              </a:rPr>
+              <a:t>seus</a:t>
+            </a:r>
+            <a:r>
+              <a:rPr lang="en-GB" sz="1800" dirty="0">
+                <a:latin typeface="Times New Roman" panose="02020603050405020304" pitchFamily="18" charset="0"/>
+                <a:cs typeface="Times New Roman" panose="02020603050405020304" pitchFamily="18" charset="0"/>
+              </a:rPr>
+              <a:t> </a:t>
+            </a:r>
+            <a:r>
+              <a:rPr lang="en-GB" sz="1800" dirty="0" err="1">
+                <a:latin typeface="Times New Roman" panose="02020603050405020304" pitchFamily="18" charset="0"/>
+                <a:cs typeface="Times New Roman" panose="02020603050405020304" pitchFamily="18" charset="0"/>
+              </a:rPr>
+              <a:t>produtos</a:t>
+            </a:r>
+            <a:r>
+              <a:rPr lang="en-GB" sz="1800" dirty="0">
+                <a:latin typeface="Times New Roman" panose="02020603050405020304" pitchFamily="18" charset="0"/>
+                <a:cs typeface="Times New Roman" panose="02020603050405020304" pitchFamily="18" charset="0"/>
+              </a:rPr>
+              <a:t>, </a:t>
+            </a:r>
+            <a:r>
+              <a:rPr lang="en-GB" sz="1800" dirty="0" err="1">
+                <a:latin typeface="Times New Roman" panose="02020603050405020304" pitchFamily="18" charset="0"/>
+                <a:cs typeface="Times New Roman" panose="02020603050405020304" pitchFamily="18" charset="0"/>
+              </a:rPr>
+              <a:t>inserindo</a:t>
+            </a:r>
+            <a:r>
+              <a:rPr lang="en-GB" sz="1800" dirty="0">
+                <a:latin typeface="Times New Roman" panose="02020603050405020304" pitchFamily="18" charset="0"/>
+                <a:cs typeface="Times New Roman" panose="02020603050405020304" pitchFamily="18" charset="0"/>
+              </a:rPr>
+              <a:t> </a:t>
+            </a:r>
+            <a:r>
+              <a:rPr lang="en-GB" sz="1800" dirty="0" err="1">
+                <a:latin typeface="Times New Roman" panose="02020603050405020304" pitchFamily="18" charset="0"/>
+                <a:cs typeface="Times New Roman" panose="02020603050405020304" pitchFamily="18" charset="0"/>
+              </a:rPr>
+              <a:t>novos</a:t>
+            </a:r>
+            <a:r>
+              <a:rPr lang="en-GB" sz="1800" dirty="0">
+                <a:latin typeface="Times New Roman" panose="02020603050405020304" pitchFamily="18" charset="0"/>
+                <a:cs typeface="Times New Roman" panose="02020603050405020304" pitchFamily="18" charset="0"/>
+              </a:rPr>
+              <a:t> dados que </a:t>
+            </a:r>
+            <a:r>
+              <a:rPr lang="en-GB" sz="1800" dirty="0" err="1">
+                <a:latin typeface="Times New Roman" panose="02020603050405020304" pitchFamily="18" charset="0"/>
+                <a:cs typeface="Times New Roman" panose="02020603050405020304" pitchFamily="18" charset="0"/>
+              </a:rPr>
+              <a:t>seram</a:t>
+            </a:r>
+            <a:r>
+              <a:rPr lang="en-GB" sz="1800" dirty="0">
+                <a:latin typeface="Times New Roman" panose="02020603050405020304" pitchFamily="18" charset="0"/>
+                <a:cs typeface="Times New Roman" panose="02020603050405020304" pitchFamily="18" charset="0"/>
+              </a:rPr>
+              <a:t> </a:t>
+            </a:r>
+            <a:r>
+              <a:rPr lang="en-GB" sz="1800" dirty="0" err="1">
+                <a:latin typeface="Times New Roman" panose="02020603050405020304" pitchFamily="18" charset="0"/>
+                <a:cs typeface="Times New Roman" panose="02020603050405020304" pitchFamily="18" charset="0"/>
+              </a:rPr>
+              <a:t>atualizados</a:t>
+            </a:r>
+            <a:r>
+              <a:rPr lang="en-GB" sz="1800" dirty="0">
+                <a:latin typeface="Times New Roman" panose="02020603050405020304" pitchFamily="18" charset="0"/>
+                <a:cs typeface="Times New Roman" panose="02020603050405020304" pitchFamily="18" charset="0"/>
+              </a:rPr>
+              <a:t> </a:t>
+            </a:r>
+            <a:r>
+              <a:rPr lang="en-GB" sz="1800" dirty="0" err="1">
+                <a:latin typeface="Times New Roman" panose="02020603050405020304" pitchFamily="18" charset="0"/>
+                <a:cs typeface="Times New Roman" panose="02020603050405020304" pitchFamily="18" charset="0"/>
+              </a:rPr>
+              <a:t>na</a:t>
+            </a:r>
+            <a:r>
+              <a:rPr lang="en-GB" sz="1800" dirty="0">
+                <a:latin typeface="Times New Roman" panose="02020603050405020304" pitchFamily="18" charset="0"/>
+                <a:cs typeface="Times New Roman" panose="02020603050405020304" pitchFamily="18" charset="0"/>
+              </a:rPr>
+              <a:t> </a:t>
+            </a:r>
+            <a:r>
+              <a:rPr lang="en-GB" sz="1800" dirty="0" err="1">
+                <a:latin typeface="Times New Roman" panose="02020603050405020304" pitchFamily="18" charset="0"/>
+                <a:cs typeface="Times New Roman" panose="02020603050405020304" pitchFamily="18" charset="0"/>
+              </a:rPr>
+              <a:t>tabela</a:t>
+            </a:r>
+            <a:endParaRPr lang="en-GB" sz="1800" dirty="0">
+              <a:latin typeface="Times New Roman" panose="02020603050405020304" pitchFamily="18" charset="0"/>
+              <a:cs typeface="Times New Roman" panose="02020603050405020304" pitchFamily="18" charset="0"/>
+            </a:endParaRPr>
+          </a:p>
+          <a:p>
+            <a:r>
+              <a:rPr lang="en-GB" sz="1800" dirty="0" err="1">
+                <a:latin typeface="Times New Roman" panose="02020603050405020304" pitchFamily="18" charset="0"/>
+                <a:cs typeface="Times New Roman" panose="02020603050405020304" pitchFamily="18" charset="0"/>
+              </a:rPr>
+              <a:t>Deixar</a:t>
+            </a:r>
+            <a:r>
+              <a:rPr lang="en-GB" sz="1800" dirty="0">
+                <a:latin typeface="Times New Roman" panose="02020603050405020304" pitchFamily="18" charset="0"/>
+                <a:cs typeface="Times New Roman" panose="02020603050405020304" pitchFamily="18" charset="0"/>
+              </a:rPr>
+              <a:t> rating/feedback: O </a:t>
+            </a:r>
+            <a:r>
+              <a:rPr lang="en-GB" sz="1800" dirty="0" err="1">
+                <a:latin typeface="Times New Roman" panose="02020603050405020304" pitchFamily="18" charset="0"/>
+                <a:cs typeface="Times New Roman" panose="02020603050405020304" pitchFamily="18" charset="0"/>
+              </a:rPr>
+              <a:t>utilizador</a:t>
+            </a:r>
+            <a:r>
+              <a:rPr lang="en-GB" sz="1800" dirty="0">
+                <a:latin typeface="Times New Roman" panose="02020603050405020304" pitchFamily="18" charset="0"/>
+                <a:cs typeface="Times New Roman" panose="02020603050405020304" pitchFamily="18" charset="0"/>
+              </a:rPr>
+              <a:t> </a:t>
+            </a:r>
+            <a:r>
+              <a:rPr lang="en-GB" sz="1800" dirty="0" err="1">
+                <a:latin typeface="Times New Roman" panose="02020603050405020304" pitchFamily="18" charset="0"/>
+                <a:cs typeface="Times New Roman" panose="02020603050405020304" pitchFamily="18" charset="0"/>
+              </a:rPr>
+              <a:t>pode</a:t>
+            </a:r>
+            <a:r>
+              <a:rPr lang="en-GB" sz="1800" dirty="0">
+                <a:latin typeface="Times New Roman" panose="02020603050405020304" pitchFamily="18" charset="0"/>
+                <a:cs typeface="Times New Roman" panose="02020603050405020304" pitchFamily="18" charset="0"/>
+              </a:rPr>
+              <a:t> </a:t>
+            </a:r>
+            <a:r>
+              <a:rPr lang="en-GB" sz="1800" dirty="0" err="1">
+                <a:latin typeface="Times New Roman" panose="02020603050405020304" pitchFamily="18" charset="0"/>
+                <a:cs typeface="Times New Roman" panose="02020603050405020304" pitchFamily="18" charset="0"/>
+              </a:rPr>
+              <a:t>deixar</a:t>
+            </a:r>
+            <a:r>
+              <a:rPr lang="en-GB" sz="1800" dirty="0">
+                <a:latin typeface="Times New Roman" panose="02020603050405020304" pitchFamily="18" charset="0"/>
+                <a:cs typeface="Times New Roman" panose="02020603050405020304" pitchFamily="18" charset="0"/>
+              </a:rPr>
+              <a:t> um rating </a:t>
+            </a:r>
+            <a:r>
+              <a:rPr lang="en-GB" sz="1800" dirty="0" err="1">
+                <a:latin typeface="Times New Roman" panose="02020603050405020304" pitchFamily="18" charset="0"/>
+                <a:cs typeface="Times New Roman" panose="02020603050405020304" pitchFamily="18" charset="0"/>
+              </a:rPr>
+              <a:t>num</a:t>
+            </a:r>
+            <a:r>
+              <a:rPr lang="en-GB" sz="1800" dirty="0">
+                <a:latin typeface="Times New Roman" panose="02020603050405020304" pitchFamily="18" charset="0"/>
+                <a:cs typeface="Times New Roman" panose="02020603050405020304" pitchFamily="18" charset="0"/>
+              </a:rPr>
+              <a:t> </a:t>
+            </a:r>
+            <a:r>
+              <a:rPr lang="en-GB" sz="1800" dirty="0" err="1">
+                <a:latin typeface="Times New Roman" panose="02020603050405020304" pitchFamily="18" charset="0"/>
+                <a:cs typeface="Times New Roman" panose="02020603050405020304" pitchFamily="18" charset="0"/>
+              </a:rPr>
+              <a:t>produto</a:t>
+            </a:r>
+            <a:r>
+              <a:rPr lang="en-GB" sz="1800" dirty="0">
+                <a:latin typeface="Times New Roman" panose="02020603050405020304" pitchFamily="18" charset="0"/>
+                <a:cs typeface="Times New Roman" panose="02020603050405020304" pitchFamily="18" charset="0"/>
+              </a:rPr>
+              <a:t> </a:t>
+            </a:r>
+            <a:r>
+              <a:rPr lang="en-GB" sz="1800" dirty="0" err="1">
+                <a:latin typeface="Times New Roman" panose="02020603050405020304" pitchFamily="18" charset="0"/>
+                <a:cs typeface="Times New Roman" panose="02020603050405020304" pitchFamily="18" charset="0"/>
+              </a:rPr>
+              <a:t>comprado</a:t>
+            </a:r>
+            <a:r>
+              <a:rPr lang="en-GB" sz="1800" dirty="0">
                 <a:latin typeface="Times New Roman" panose="02020603050405020304" pitchFamily="18" charset="0"/>
                 <a:cs typeface="Times New Roman" panose="02020603050405020304" pitchFamily="18" charset="0"/>
               </a:rPr>
               <a:t>. </a:t>
-            </a:r>
-          </a:p>
-          <a:p>
-            <a:r>
-              <a:rPr lang="en-GB" sz="1600" dirty="0" err="1">
-                <a:latin typeface="Times New Roman" panose="02020603050405020304" pitchFamily="18" charset="0"/>
-                <a:cs typeface="Times New Roman" panose="02020603050405020304" pitchFamily="18" charset="0"/>
-              </a:rPr>
-              <a:t>Atualizar</a:t>
-            </a:r>
-            <a:r>
-              <a:rPr lang="en-GB" sz="1600" dirty="0">
-                <a:latin typeface="Times New Roman" panose="02020603050405020304" pitchFamily="18" charset="0"/>
-                <a:cs typeface="Times New Roman" panose="02020603050405020304" pitchFamily="18" charset="0"/>
-              </a:rPr>
-              <a:t> </a:t>
-            </a:r>
-            <a:r>
-              <a:rPr lang="en-GB" sz="1600" dirty="0" err="1">
-                <a:latin typeface="Times New Roman" panose="02020603050405020304" pitchFamily="18" charset="0"/>
-                <a:cs typeface="Times New Roman" panose="02020603050405020304" pitchFamily="18" charset="0"/>
-              </a:rPr>
-              <a:t>detalhes</a:t>
-            </a:r>
-            <a:r>
-              <a:rPr lang="en-GB" sz="1600" dirty="0">
-                <a:latin typeface="Times New Roman" panose="02020603050405020304" pitchFamily="18" charset="0"/>
-                <a:cs typeface="Times New Roman" panose="02020603050405020304" pitchFamily="18" charset="0"/>
-              </a:rPr>
-              <a:t> </a:t>
-            </a:r>
-            <a:r>
-              <a:rPr lang="en-GB" sz="1600" dirty="0" err="1">
-                <a:latin typeface="Times New Roman" panose="02020603050405020304" pitchFamily="18" charset="0"/>
-                <a:cs typeface="Times New Roman" panose="02020603050405020304" pitchFamily="18" charset="0"/>
-              </a:rPr>
-              <a:t>produto</a:t>
-            </a:r>
-            <a:r>
-              <a:rPr lang="en-GB" sz="1600" dirty="0">
-                <a:latin typeface="Times New Roman" panose="02020603050405020304" pitchFamily="18" charset="0"/>
-                <a:cs typeface="Times New Roman" panose="02020603050405020304" pitchFamily="18" charset="0"/>
-              </a:rPr>
-              <a:t>: </a:t>
-            </a:r>
-            <a:r>
-              <a:rPr lang="en-GB" sz="1600" dirty="0" err="1">
-                <a:latin typeface="Times New Roman" panose="02020603050405020304" pitchFamily="18" charset="0"/>
-                <a:cs typeface="Times New Roman" panose="02020603050405020304" pitchFamily="18" charset="0"/>
-              </a:rPr>
-              <a:t>Deve</a:t>
-            </a:r>
-            <a:r>
-              <a:rPr lang="en-GB" sz="1600" dirty="0">
-                <a:latin typeface="Times New Roman" panose="02020603050405020304" pitchFamily="18" charset="0"/>
-                <a:cs typeface="Times New Roman" panose="02020603050405020304" pitchFamily="18" charset="0"/>
-              </a:rPr>
-              <a:t> ser </a:t>
-            </a:r>
-            <a:r>
-              <a:rPr lang="en-GB" sz="1600" dirty="0" err="1">
-                <a:latin typeface="Times New Roman" panose="02020603050405020304" pitchFamily="18" charset="0"/>
-                <a:cs typeface="Times New Roman" panose="02020603050405020304" pitchFamily="18" charset="0"/>
-              </a:rPr>
-              <a:t>possível</a:t>
-            </a:r>
-            <a:r>
-              <a:rPr lang="en-GB" sz="1600" dirty="0">
-                <a:latin typeface="Times New Roman" panose="02020603050405020304" pitchFamily="18" charset="0"/>
-                <a:cs typeface="Times New Roman" panose="02020603050405020304" pitchFamily="18" charset="0"/>
-              </a:rPr>
-              <a:t> </a:t>
-            </a:r>
-            <a:r>
-              <a:rPr lang="en-GB" sz="1600" dirty="0" err="1">
-                <a:latin typeface="Times New Roman" panose="02020603050405020304" pitchFamily="18" charset="0"/>
-                <a:cs typeface="Times New Roman" panose="02020603050405020304" pitchFamily="18" charset="0"/>
-              </a:rPr>
-              <a:t>atualizar</a:t>
-            </a:r>
-            <a:r>
-              <a:rPr lang="en-GB" sz="1600" dirty="0">
-                <a:latin typeface="Times New Roman" panose="02020603050405020304" pitchFamily="18" charset="0"/>
-                <a:cs typeface="Times New Roman" panose="02020603050405020304" pitchFamily="18" charset="0"/>
-              </a:rPr>
-              <a:t> </a:t>
-            </a:r>
-            <a:r>
-              <a:rPr lang="en-GB" sz="1600" dirty="0" err="1">
-                <a:latin typeface="Times New Roman" panose="02020603050405020304" pitchFamily="18" charset="0"/>
-                <a:cs typeface="Times New Roman" panose="02020603050405020304" pitchFamily="18" charset="0"/>
-              </a:rPr>
-              <a:t>os</a:t>
-            </a:r>
-            <a:r>
-              <a:rPr lang="en-GB" sz="1600" dirty="0">
-                <a:latin typeface="Times New Roman" panose="02020603050405020304" pitchFamily="18" charset="0"/>
-                <a:cs typeface="Times New Roman" panose="02020603050405020304" pitchFamily="18" charset="0"/>
-              </a:rPr>
-              <a:t> </a:t>
-            </a:r>
-            <a:r>
-              <a:rPr lang="en-GB" sz="1600" dirty="0" err="1">
-                <a:latin typeface="Times New Roman" panose="02020603050405020304" pitchFamily="18" charset="0"/>
-                <a:cs typeface="Times New Roman" panose="02020603050405020304" pitchFamily="18" charset="0"/>
-              </a:rPr>
-              <a:t>detalhes</a:t>
-            </a:r>
-            <a:r>
-              <a:rPr lang="en-GB" sz="1600" dirty="0">
-                <a:latin typeface="Times New Roman" panose="02020603050405020304" pitchFamily="18" charset="0"/>
-                <a:cs typeface="Times New Roman" panose="02020603050405020304" pitchFamily="18" charset="0"/>
-              </a:rPr>
-              <a:t> de um </a:t>
-            </a:r>
-            <a:r>
-              <a:rPr lang="en-GB" sz="1600" dirty="0" err="1">
-                <a:latin typeface="Times New Roman" panose="02020603050405020304" pitchFamily="18" charset="0"/>
-                <a:cs typeface="Times New Roman" panose="02020603050405020304" pitchFamily="18" charset="0"/>
-              </a:rPr>
-              <a:t>produto</a:t>
-            </a:r>
-            <a:r>
-              <a:rPr lang="en-GB" sz="1600" dirty="0">
-                <a:latin typeface="Times New Roman" panose="02020603050405020304" pitchFamily="18" charset="0"/>
-                <a:cs typeface="Times New Roman" panose="02020603050405020304" pitchFamily="18" charset="0"/>
-              </a:rPr>
-              <a:t>. </a:t>
-            </a:r>
-          </a:p>
-          <a:p>
-            <a:r>
-              <a:rPr lang="en-GB" sz="1600" dirty="0" err="1">
-                <a:latin typeface="Times New Roman" panose="02020603050405020304" pitchFamily="18" charset="0"/>
-                <a:cs typeface="Times New Roman" panose="02020603050405020304" pitchFamily="18" charset="0"/>
-              </a:rPr>
-              <a:t>Deixar</a:t>
-            </a:r>
-            <a:r>
-              <a:rPr lang="en-GB" sz="1600" dirty="0">
-                <a:latin typeface="Times New Roman" panose="02020603050405020304" pitchFamily="18" charset="0"/>
-                <a:cs typeface="Times New Roman" panose="02020603050405020304" pitchFamily="18" charset="0"/>
-              </a:rPr>
-              <a:t> rating/feedback: </a:t>
-            </a:r>
-            <a:r>
-              <a:rPr lang="en-GB" sz="1600" dirty="0" err="1">
-                <a:latin typeface="Times New Roman" panose="02020603050405020304" pitchFamily="18" charset="0"/>
-                <a:cs typeface="Times New Roman" panose="02020603050405020304" pitchFamily="18" charset="0"/>
-              </a:rPr>
-              <a:t>Deve</a:t>
-            </a:r>
-            <a:r>
-              <a:rPr lang="en-GB" sz="1600" dirty="0">
-                <a:latin typeface="Times New Roman" panose="02020603050405020304" pitchFamily="18" charset="0"/>
-                <a:cs typeface="Times New Roman" panose="02020603050405020304" pitchFamily="18" charset="0"/>
-              </a:rPr>
-              <a:t> ser </a:t>
-            </a:r>
-            <a:r>
-              <a:rPr lang="en-GB" sz="1600" dirty="0" err="1">
-                <a:latin typeface="Times New Roman" panose="02020603050405020304" pitchFamily="18" charset="0"/>
-                <a:cs typeface="Times New Roman" panose="02020603050405020304" pitchFamily="18" charset="0"/>
-              </a:rPr>
-              <a:t>possível</a:t>
-            </a:r>
-            <a:r>
-              <a:rPr lang="en-GB" sz="1600" dirty="0">
-                <a:latin typeface="Times New Roman" panose="02020603050405020304" pitchFamily="18" charset="0"/>
-                <a:cs typeface="Times New Roman" panose="02020603050405020304" pitchFamily="18" charset="0"/>
-              </a:rPr>
-              <a:t> </a:t>
-            </a:r>
-            <a:r>
-              <a:rPr lang="en-GB" sz="1600" dirty="0" err="1">
-                <a:latin typeface="Times New Roman" panose="02020603050405020304" pitchFamily="18" charset="0"/>
-                <a:cs typeface="Times New Roman" panose="02020603050405020304" pitchFamily="18" charset="0"/>
-              </a:rPr>
-              <a:t>deixar</a:t>
-            </a:r>
-            <a:r>
-              <a:rPr lang="en-GB" sz="1600" dirty="0">
-                <a:latin typeface="Times New Roman" panose="02020603050405020304" pitchFamily="18" charset="0"/>
-                <a:cs typeface="Times New Roman" panose="02020603050405020304" pitchFamily="18" charset="0"/>
-              </a:rPr>
-              <a:t> um rating a um </a:t>
-            </a:r>
-            <a:r>
-              <a:rPr lang="en-GB" sz="1600" dirty="0" err="1">
-                <a:latin typeface="Times New Roman" panose="02020603050405020304" pitchFamily="18" charset="0"/>
-                <a:cs typeface="Times New Roman" panose="02020603050405020304" pitchFamily="18" charset="0"/>
-              </a:rPr>
-              <a:t>produto</a:t>
-            </a:r>
-            <a:r>
-              <a:rPr lang="en-GB" sz="1600" dirty="0">
-                <a:latin typeface="Times New Roman" panose="02020603050405020304" pitchFamily="18" charset="0"/>
-                <a:cs typeface="Times New Roman" panose="02020603050405020304" pitchFamily="18" charset="0"/>
-              </a:rPr>
-              <a:t> </a:t>
-            </a:r>
-            <a:r>
-              <a:rPr lang="en-GB" sz="1600" dirty="0" err="1">
-                <a:latin typeface="Times New Roman" panose="02020603050405020304" pitchFamily="18" charset="0"/>
-                <a:cs typeface="Times New Roman" panose="02020603050405020304" pitchFamily="18" charset="0"/>
-              </a:rPr>
-              <a:t>comprado</a:t>
-            </a:r>
-            <a:r>
-              <a:rPr lang="en-GB" sz="1600" dirty="0">
-                <a:latin typeface="Times New Roman" panose="02020603050405020304" pitchFamily="18" charset="0"/>
-                <a:cs typeface="Times New Roman" panose="02020603050405020304" pitchFamily="18" charset="0"/>
-              </a:rPr>
-              <a:t>. </a:t>
-            </a:r>
-          </a:p>
-          <a:p>
-            <a:r>
-              <a:rPr lang="en-GB" sz="1600" dirty="0" err="1">
-                <a:latin typeface="Times New Roman" panose="02020603050405020304" pitchFamily="18" charset="0"/>
-                <a:cs typeface="Times New Roman" panose="02020603050405020304" pitchFamily="18" charset="0"/>
-              </a:rPr>
-              <a:t>Consultar</a:t>
-            </a:r>
-            <a:r>
-              <a:rPr lang="en-GB" sz="1600" dirty="0">
-                <a:latin typeface="Times New Roman" panose="02020603050405020304" pitchFamily="18" charset="0"/>
-                <a:cs typeface="Times New Roman" panose="02020603050405020304" pitchFamily="18" charset="0"/>
-              </a:rPr>
-              <a:t> </a:t>
-            </a:r>
-            <a:r>
-              <a:rPr lang="en-GB" sz="1600" dirty="0" err="1">
-                <a:latin typeface="Times New Roman" panose="02020603050405020304" pitchFamily="18" charset="0"/>
-                <a:cs typeface="Times New Roman" panose="02020603050405020304" pitchFamily="18" charset="0"/>
-              </a:rPr>
-              <a:t>informações</a:t>
-            </a:r>
-            <a:r>
-              <a:rPr lang="en-GB" sz="1600" dirty="0">
-                <a:latin typeface="Times New Roman" panose="02020603050405020304" pitchFamily="18" charset="0"/>
-                <a:cs typeface="Times New Roman" panose="02020603050405020304" pitchFamily="18" charset="0"/>
-              </a:rPr>
-              <a:t> </a:t>
-            </a:r>
-            <a:r>
-              <a:rPr lang="en-GB" sz="1600" dirty="0" err="1">
-                <a:latin typeface="Times New Roman" panose="02020603050405020304" pitchFamily="18" charset="0"/>
-                <a:cs typeface="Times New Roman" panose="02020603050405020304" pitchFamily="18" charset="0"/>
-              </a:rPr>
-              <a:t>genéricas</a:t>
-            </a:r>
-            <a:r>
-              <a:rPr lang="en-GB" sz="1600" dirty="0">
-                <a:latin typeface="Times New Roman" panose="02020603050405020304" pitchFamily="18" charset="0"/>
-                <a:cs typeface="Times New Roman" panose="02020603050405020304" pitchFamily="18" charset="0"/>
-              </a:rPr>
-              <a:t> de um </a:t>
-            </a:r>
-            <a:r>
-              <a:rPr lang="en-GB" sz="1600" dirty="0" err="1">
-                <a:latin typeface="Times New Roman" panose="02020603050405020304" pitchFamily="18" charset="0"/>
-                <a:cs typeface="Times New Roman" panose="02020603050405020304" pitchFamily="18" charset="0"/>
-              </a:rPr>
-              <a:t>produto</a:t>
-            </a:r>
-            <a:r>
-              <a:rPr lang="en-GB" sz="1600" dirty="0">
-                <a:latin typeface="Times New Roman" panose="02020603050405020304" pitchFamily="18" charset="0"/>
-                <a:cs typeface="Times New Roman" panose="02020603050405020304" pitchFamily="18" charset="0"/>
-              </a:rPr>
-              <a:t>: </a:t>
-            </a:r>
-            <a:r>
-              <a:rPr lang="en-GB" sz="1600" dirty="0" err="1">
-                <a:latin typeface="Times New Roman" panose="02020603050405020304" pitchFamily="18" charset="0"/>
-                <a:cs typeface="Times New Roman" panose="02020603050405020304" pitchFamily="18" charset="0"/>
-              </a:rPr>
-              <a:t>Deve</a:t>
-            </a:r>
-            <a:r>
-              <a:rPr lang="en-GB" sz="1600" dirty="0">
-                <a:latin typeface="Times New Roman" panose="02020603050405020304" pitchFamily="18" charset="0"/>
-                <a:cs typeface="Times New Roman" panose="02020603050405020304" pitchFamily="18" charset="0"/>
-              </a:rPr>
-              <a:t> ser </a:t>
-            </a:r>
-            <a:r>
-              <a:rPr lang="en-GB" sz="1600" dirty="0" err="1">
-                <a:latin typeface="Times New Roman" panose="02020603050405020304" pitchFamily="18" charset="0"/>
-                <a:cs typeface="Times New Roman" panose="02020603050405020304" pitchFamily="18" charset="0"/>
-              </a:rPr>
-              <a:t>possível</a:t>
-            </a:r>
-            <a:r>
-              <a:rPr lang="en-GB" sz="1600" dirty="0">
-                <a:latin typeface="Times New Roman" panose="02020603050405020304" pitchFamily="18" charset="0"/>
-                <a:cs typeface="Times New Roman" panose="02020603050405020304" pitchFamily="18" charset="0"/>
-              </a:rPr>
-              <a:t> </a:t>
-            </a:r>
-            <a:r>
-              <a:rPr lang="en-GB" sz="1600" dirty="0" err="1">
-                <a:latin typeface="Times New Roman" panose="02020603050405020304" pitchFamily="18" charset="0"/>
-                <a:cs typeface="Times New Roman" panose="02020603050405020304" pitchFamily="18" charset="0"/>
-              </a:rPr>
-              <a:t>obter</a:t>
-            </a:r>
-            <a:r>
-              <a:rPr lang="en-GB" sz="1600" dirty="0">
-                <a:latin typeface="Times New Roman" panose="02020603050405020304" pitchFamily="18" charset="0"/>
-                <a:cs typeface="Times New Roman" panose="02020603050405020304" pitchFamily="18" charset="0"/>
-              </a:rPr>
-              <a:t> </a:t>
-            </a:r>
-            <a:r>
-              <a:rPr lang="en-GB" sz="1600" dirty="0" err="1">
-                <a:latin typeface="Times New Roman" panose="02020603050405020304" pitchFamily="18" charset="0"/>
-                <a:cs typeface="Times New Roman" panose="02020603050405020304" pitchFamily="18" charset="0"/>
-              </a:rPr>
-              <a:t>os</a:t>
-            </a:r>
-            <a:r>
-              <a:rPr lang="en-GB" sz="1600" dirty="0">
-                <a:latin typeface="Times New Roman" panose="02020603050405020304" pitchFamily="18" charset="0"/>
-                <a:cs typeface="Times New Roman" panose="02020603050405020304" pitchFamily="18" charset="0"/>
-              </a:rPr>
-              <a:t> </a:t>
-            </a:r>
-            <a:r>
-              <a:rPr lang="en-GB" sz="1600" dirty="0" err="1">
-                <a:latin typeface="Times New Roman" panose="02020603050405020304" pitchFamily="18" charset="0"/>
-                <a:cs typeface="Times New Roman" panose="02020603050405020304" pitchFamily="18" charset="0"/>
-              </a:rPr>
-              <a:t>detalhes</a:t>
-            </a:r>
-            <a:r>
-              <a:rPr lang="en-GB" sz="1600" dirty="0">
-                <a:latin typeface="Times New Roman" panose="02020603050405020304" pitchFamily="18" charset="0"/>
-                <a:cs typeface="Times New Roman" panose="02020603050405020304" pitchFamily="18" charset="0"/>
-              </a:rPr>
-              <a:t> </a:t>
-            </a:r>
-            <a:r>
-              <a:rPr lang="en-GB" sz="1600" dirty="0" err="1">
-                <a:latin typeface="Times New Roman" panose="02020603050405020304" pitchFamily="18" charset="0"/>
-                <a:cs typeface="Times New Roman" panose="02020603050405020304" pitchFamily="18" charset="0"/>
-              </a:rPr>
-              <a:t>genéricos</a:t>
-            </a:r>
-            <a:r>
-              <a:rPr lang="en-GB" sz="1600" dirty="0">
-                <a:latin typeface="Times New Roman" panose="02020603050405020304" pitchFamily="18" charset="0"/>
-                <a:cs typeface="Times New Roman" panose="02020603050405020304" pitchFamily="18" charset="0"/>
-              </a:rPr>
-              <a:t> de um </a:t>
-            </a:r>
-            <a:r>
-              <a:rPr lang="en-GB" sz="1600" dirty="0" err="1">
-                <a:latin typeface="Times New Roman" panose="02020603050405020304" pitchFamily="18" charset="0"/>
-                <a:cs typeface="Times New Roman" panose="02020603050405020304" pitchFamily="18" charset="0"/>
-              </a:rPr>
-              <a:t>produto</a:t>
-            </a:r>
-            <a:r>
-              <a:rPr lang="en-GB" sz="1600" dirty="0">
-                <a:latin typeface="Times New Roman" panose="02020603050405020304" pitchFamily="18" charset="0"/>
-                <a:cs typeface="Times New Roman" panose="02020603050405020304" pitchFamily="18" charset="0"/>
-              </a:rPr>
-              <a:t>, o </a:t>
-            </a:r>
-            <a:r>
-              <a:rPr lang="en-GB" sz="1600" dirty="0" err="1">
-                <a:latin typeface="Times New Roman" panose="02020603050405020304" pitchFamily="18" charset="0"/>
-                <a:cs typeface="Times New Roman" panose="02020603050405020304" pitchFamily="18" charset="0"/>
-              </a:rPr>
-              <a:t>histórico</a:t>
-            </a:r>
-            <a:r>
-              <a:rPr lang="en-GB" sz="1600" dirty="0">
-                <a:latin typeface="Times New Roman" panose="02020603050405020304" pitchFamily="18" charset="0"/>
-                <a:cs typeface="Times New Roman" panose="02020603050405020304" pitchFamily="18" charset="0"/>
-              </a:rPr>
-              <a:t> de </a:t>
-            </a:r>
-            <a:r>
-              <a:rPr lang="en-GB" sz="1600" dirty="0" err="1">
-                <a:latin typeface="Times New Roman" panose="02020603050405020304" pitchFamily="18" charset="0"/>
-                <a:cs typeface="Times New Roman" panose="02020603050405020304" pitchFamily="18" charset="0"/>
-              </a:rPr>
-              <a:t>preços</a:t>
-            </a:r>
-            <a:r>
-              <a:rPr lang="en-GB" sz="1600" dirty="0">
-                <a:latin typeface="Times New Roman" panose="02020603050405020304" pitchFamily="18" charset="0"/>
-                <a:cs typeface="Times New Roman" panose="02020603050405020304" pitchFamily="18" charset="0"/>
-              </a:rPr>
-              <a:t>, rating </a:t>
-            </a:r>
-            <a:r>
-              <a:rPr lang="en-GB" sz="1600" dirty="0" err="1">
-                <a:latin typeface="Times New Roman" panose="02020603050405020304" pitchFamily="18" charset="0"/>
-                <a:cs typeface="Times New Roman" panose="02020603050405020304" pitchFamily="18" charset="0"/>
-              </a:rPr>
-              <a:t>médio</a:t>
-            </a:r>
-            <a:r>
-              <a:rPr lang="en-GB" sz="1600" dirty="0">
-                <a:latin typeface="Times New Roman" panose="02020603050405020304" pitchFamily="18" charset="0"/>
-                <a:cs typeface="Times New Roman" panose="02020603050405020304" pitchFamily="18" charset="0"/>
-              </a:rPr>
-              <a:t>, e </a:t>
-            </a:r>
-            <a:r>
-              <a:rPr lang="en-GB" sz="1600" dirty="0" err="1">
-                <a:latin typeface="Times New Roman" panose="02020603050405020304" pitchFamily="18" charset="0"/>
-                <a:cs typeface="Times New Roman" panose="02020603050405020304" pitchFamily="18" charset="0"/>
-              </a:rPr>
-              <a:t>comentários</a:t>
-            </a:r>
-            <a:r>
-              <a:rPr lang="en-GB" sz="1600" dirty="0">
-                <a:latin typeface="Times New Roman" panose="02020603050405020304" pitchFamily="18" charset="0"/>
-                <a:cs typeface="Times New Roman" panose="02020603050405020304" pitchFamily="18" charset="0"/>
-              </a:rPr>
-              <a:t>. </a:t>
-            </a:r>
-          </a:p>
-          <a:p>
-            <a:r>
-              <a:rPr lang="en-GB" sz="1600" dirty="0" err="1">
-                <a:latin typeface="Times New Roman" panose="02020603050405020304" pitchFamily="18" charset="0"/>
-                <a:cs typeface="Times New Roman" panose="02020603050405020304" pitchFamily="18" charset="0"/>
-              </a:rPr>
-              <a:t>Atualização</a:t>
-            </a:r>
-            <a:r>
-              <a:rPr lang="en-GB" sz="1600" dirty="0">
-                <a:latin typeface="Times New Roman" panose="02020603050405020304" pitchFamily="18" charset="0"/>
-                <a:cs typeface="Times New Roman" panose="02020603050405020304" pitchFamily="18" charset="0"/>
-              </a:rPr>
-              <a:t> do </a:t>
-            </a:r>
-            <a:r>
-              <a:rPr lang="en-GB" sz="1600" dirty="0" err="1">
-                <a:latin typeface="Times New Roman" panose="02020603050405020304" pitchFamily="18" charset="0"/>
-                <a:cs typeface="Times New Roman" panose="02020603050405020304" pitchFamily="18" charset="0"/>
-              </a:rPr>
-              <a:t>histórico</a:t>
-            </a:r>
-            <a:r>
-              <a:rPr lang="en-GB" sz="1600" dirty="0">
-                <a:latin typeface="Times New Roman" panose="02020603050405020304" pitchFamily="18" charset="0"/>
-                <a:cs typeface="Times New Roman" panose="02020603050405020304" pitchFamily="18" charset="0"/>
-              </a:rPr>
-              <a:t> de </a:t>
-            </a:r>
-            <a:r>
-              <a:rPr lang="en-GB" sz="1600" dirty="0" err="1">
-                <a:latin typeface="Times New Roman" panose="02020603050405020304" pitchFamily="18" charset="0"/>
-                <a:cs typeface="Times New Roman" panose="02020603050405020304" pitchFamily="18" charset="0"/>
-              </a:rPr>
-              <a:t>compras</a:t>
-            </a:r>
-            <a:r>
-              <a:rPr lang="en-GB" sz="1600" dirty="0">
-                <a:latin typeface="Times New Roman" panose="02020603050405020304" pitchFamily="18" charset="0"/>
-                <a:cs typeface="Times New Roman" panose="02020603050405020304" pitchFamily="18" charset="0"/>
-              </a:rPr>
-              <a:t>: O </a:t>
-            </a:r>
-            <a:r>
-              <a:rPr lang="en-GB" sz="1600" dirty="0" err="1">
-                <a:latin typeface="Times New Roman" panose="02020603050405020304" pitchFamily="18" charset="0"/>
-                <a:cs typeface="Times New Roman" panose="02020603050405020304" pitchFamily="18" charset="0"/>
-              </a:rPr>
-              <a:t>histórico</a:t>
-            </a:r>
-            <a:r>
-              <a:rPr lang="en-GB" sz="1600" dirty="0">
-                <a:latin typeface="Times New Roman" panose="02020603050405020304" pitchFamily="18" charset="0"/>
-                <a:cs typeface="Times New Roman" panose="02020603050405020304" pitchFamily="18" charset="0"/>
-              </a:rPr>
-              <a:t> de </a:t>
-            </a:r>
-            <a:r>
-              <a:rPr lang="en-GB" sz="1600" dirty="0" err="1">
-                <a:latin typeface="Times New Roman" panose="02020603050405020304" pitchFamily="18" charset="0"/>
-                <a:cs typeface="Times New Roman" panose="02020603050405020304" pitchFamily="18" charset="0"/>
-              </a:rPr>
-              <a:t>compras</a:t>
-            </a:r>
-            <a:r>
-              <a:rPr lang="en-GB" sz="1600" dirty="0">
-                <a:latin typeface="Times New Roman" panose="02020603050405020304" pitchFamily="18" charset="0"/>
-                <a:cs typeface="Times New Roman" panose="02020603050405020304" pitchFamily="18" charset="0"/>
-              </a:rPr>
-              <a:t> e </a:t>
-            </a:r>
-            <a:r>
-              <a:rPr lang="en-GB" sz="1600" dirty="0" err="1">
-                <a:latin typeface="Times New Roman" panose="02020603050405020304" pitchFamily="18" charset="0"/>
-                <a:cs typeface="Times New Roman" panose="02020603050405020304" pitchFamily="18" charset="0"/>
-              </a:rPr>
-              <a:t>atualizado</a:t>
-            </a:r>
-            <a:r>
-              <a:rPr lang="en-GB" sz="1600" dirty="0">
-                <a:latin typeface="Times New Roman" panose="02020603050405020304" pitchFamily="18" charset="0"/>
-                <a:cs typeface="Times New Roman" panose="02020603050405020304" pitchFamily="18" charset="0"/>
-              </a:rPr>
-              <a:t> </a:t>
-            </a:r>
-            <a:r>
-              <a:rPr lang="en-GB" sz="1600" dirty="0" err="1">
-                <a:latin typeface="Times New Roman" panose="02020603050405020304" pitchFamily="18" charset="0"/>
-                <a:cs typeface="Times New Roman" panose="02020603050405020304" pitchFamily="18" charset="0"/>
-              </a:rPr>
-              <a:t>automaticamente</a:t>
-            </a:r>
-            <a:r>
-              <a:rPr lang="en-GB" sz="1600" dirty="0">
-                <a:latin typeface="Times New Roman" panose="02020603050405020304" pitchFamily="18" charset="0"/>
-                <a:cs typeface="Times New Roman" panose="02020603050405020304" pitchFamily="18" charset="0"/>
-              </a:rPr>
-              <a:t> a </a:t>
-            </a:r>
-            <a:r>
-              <a:rPr lang="en-GB" sz="1600" dirty="0" err="1">
-                <a:latin typeface="Times New Roman" panose="02020603050405020304" pitchFamily="18" charset="0"/>
-                <a:cs typeface="Times New Roman" panose="02020603050405020304" pitchFamily="18" charset="0"/>
-              </a:rPr>
-              <a:t>cada</a:t>
-            </a:r>
-            <a:r>
-              <a:rPr lang="en-GB" sz="1600" dirty="0">
-                <a:latin typeface="Times New Roman" panose="02020603050405020304" pitchFamily="18" charset="0"/>
-                <a:cs typeface="Times New Roman" panose="02020603050405020304" pitchFamily="18" charset="0"/>
-              </a:rPr>
-              <a:t> </a:t>
-            </a:r>
-            <a:r>
-              <a:rPr lang="en-GB" sz="1600" dirty="0" err="1">
-                <a:latin typeface="Times New Roman" panose="02020603050405020304" pitchFamily="18" charset="0"/>
-                <a:cs typeface="Times New Roman" panose="02020603050405020304" pitchFamily="18" charset="0"/>
-              </a:rPr>
-              <a:t>compra</a:t>
-            </a:r>
-            <a:r>
-              <a:rPr lang="en-GB" sz="1600" dirty="0">
-                <a:latin typeface="Times New Roman" panose="02020603050405020304" pitchFamily="18" charset="0"/>
-                <a:cs typeface="Times New Roman" panose="02020603050405020304" pitchFamily="18" charset="0"/>
-              </a:rPr>
-              <a:t> </a:t>
-            </a:r>
-            <a:r>
-              <a:rPr lang="en-GB" sz="1600" dirty="0" err="1">
-                <a:latin typeface="Times New Roman" panose="02020603050405020304" pitchFamily="18" charset="0"/>
-                <a:cs typeface="Times New Roman" panose="02020603050405020304" pitchFamily="18" charset="0"/>
-              </a:rPr>
-              <a:t>realizada</a:t>
-            </a:r>
-            <a:r>
-              <a:rPr lang="en-GB" sz="1600" dirty="0">
-                <a:latin typeface="Times New Roman" panose="02020603050405020304" pitchFamily="18" charset="0"/>
-                <a:cs typeface="Times New Roman" panose="02020603050405020304" pitchFamily="18" charset="0"/>
-              </a:rPr>
-              <a:t>.</a:t>
             </a:r>
           </a:p>
           <a:p>
@@ -6555,158 +6776,469 @@
         </p:nvSpPr>
         <p:spPr/>
         <p:txBody>
-          <a:bodyPr/>
+          <a:bodyPr>
+            <a:normAutofit/>
+          </a:bodyPr>
           <a:lstStyle/>
           <a:p>
             <a:r>
-              <a:rPr lang="en-GB" sz="1600" dirty="0" err="1">
+              <a:rPr lang="en-GB" sz="1800" dirty="0" err="1">
+                <a:latin typeface="Times New Roman" panose="02020603050405020304" pitchFamily="18" charset="0"/>
+                <a:cs typeface="Times New Roman" panose="02020603050405020304" pitchFamily="18" charset="0"/>
+              </a:rPr>
+              <a:t>Consultar</a:t>
+            </a:r>
+            <a:r>
+              <a:rPr lang="en-GB" sz="1800" dirty="0">
+                <a:latin typeface="Times New Roman" panose="02020603050405020304" pitchFamily="18" charset="0"/>
+                <a:cs typeface="Times New Roman" panose="02020603050405020304" pitchFamily="18" charset="0"/>
+              </a:rPr>
+              <a:t> </a:t>
+            </a:r>
+            <a:r>
+              <a:rPr lang="en-GB" sz="1800" dirty="0" err="1">
+                <a:latin typeface="Times New Roman" panose="02020603050405020304" pitchFamily="18" charset="0"/>
+                <a:cs typeface="Times New Roman" panose="02020603050405020304" pitchFamily="18" charset="0"/>
+              </a:rPr>
+              <a:t>informações</a:t>
+            </a:r>
+            <a:r>
+              <a:rPr lang="en-GB" sz="1800" dirty="0">
+                <a:latin typeface="Times New Roman" panose="02020603050405020304" pitchFamily="18" charset="0"/>
+                <a:cs typeface="Times New Roman" panose="02020603050405020304" pitchFamily="18" charset="0"/>
+              </a:rPr>
+              <a:t> </a:t>
+            </a:r>
+            <a:r>
+              <a:rPr lang="en-GB" sz="1800" dirty="0" err="1">
+                <a:latin typeface="Times New Roman" panose="02020603050405020304" pitchFamily="18" charset="0"/>
+                <a:cs typeface="Times New Roman" panose="02020603050405020304" pitchFamily="18" charset="0"/>
+              </a:rPr>
+              <a:t>genéricas</a:t>
+            </a:r>
+            <a:r>
+              <a:rPr lang="en-GB" sz="1800" dirty="0">
+                <a:latin typeface="Times New Roman" panose="02020603050405020304" pitchFamily="18" charset="0"/>
+                <a:cs typeface="Times New Roman" panose="02020603050405020304" pitchFamily="18" charset="0"/>
+              </a:rPr>
+              <a:t> de um </a:t>
+            </a:r>
+            <a:r>
+              <a:rPr lang="en-GB" sz="1800" dirty="0" err="1">
+                <a:latin typeface="Times New Roman" panose="02020603050405020304" pitchFamily="18" charset="0"/>
+                <a:cs typeface="Times New Roman" panose="02020603050405020304" pitchFamily="18" charset="0"/>
+              </a:rPr>
+              <a:t>produto</a:t>
+            </a:r>
+            <a:r>
+              <a:rPr lang="en-GB" sz="1800" dirty="0">
+                <a:latin typeface="Times New Roman" panose="02020603050405020304" pitchFamily="18" charset="0"/>
+                <a:cs typeface="Times New Roman" panose="02020603050405020304" pitchFamily="18" charset="0"/>
+              </a:rPr>
+              <a:t>: O comprador </a:t>
+            </a:r>
+            <a:r>
+              <a:rPr lang="en-GB" sz="1800" dirty="0" err="1">
+                <a:latin typeface="Times New Roman" panose="02020603050405020304" pitchFamily="18" charset="0"/>
+                <a:cs typeface="Times New Roman" panose="02020603050405020304" pitchFamily="18" charset="0"/>
+              </a:rPr>
+              <a:t>pode</a:t>
+            </a:r>
+            <a:r>
+              <a:rPr lang="en-GB" sz="1800" dirty="0">
+                <a:latin typeface="Times New Roman" panose="02020603050405020304" pitchFamily="18" charset="0"/>
+                <a:cs typeface="Times New Roman" panose="02020603050405020304" pitchFamily="18" charset="0"/>
+              </a:rPr>
+              <a:t> </a:t>
+            </a:r>
+            <a:r>
+              <a:rPr lang="en-GB" sz="1800" dirty="0" err="1">
+                <a:latin typeface="Times New Roman" panose="02020603050405020304" pitchFamily="18" charset="0"/>
+                <a:cs typeface="Times New Roman" panose="02020603050405020304" pitchFamily="18" charset="0"/>
+              </a:rPr>
+              <a:t>ver</a:t>
+            </a:r>
+            <a:r>
+              <a:rPr lang="en-GB" sz="1800" dirty="0">
+                <a:latin typeface="Times New Roman" panose="02020603050405020304" pitchFamily="18" charset="0"/>
+                <a:cs typeface="Times New Roman" panose="02020603050405020304" pitchFamily="18" charset="0"/>
+              </a:rPr>
+              <a:t> </a:t>
+            </a:r>
+            <a:r>
+              <a:rPr lang="en-GB" sz="1800" dirty="0" err="1">
+                <a:latin typeface="Times New Roman" panose="02020603050405020304" pitchFamily="18" charset="0"/>
+                <a:cs typeface="Times New Roman" panose="02020603050405020304" pitchFamily="18" charset="0"/>
+              </a:rPr>
+              <a:t>os</a:t>
+            </a:r>
+            <a:r>
+              <a:rPr lang="en-GB" sz="1800" dirty="0">
+                <a:latin typeface="Times New Roman" panose="02020603050405020304" pitchFamily="18" charset="0"/>
+                <a:cs typeface="Times New Roman" panose="02020603050405020304" pitchFamily="18" charset="0"/>
+              </a:rPr>
+              <a:t> </a:t>
+            </a:r>
+            <a:r>
+              <a:rPr lang="en-GB" sz="1800" dirty="0" err="1">
+                <a:latin typeface="Times New Roman" panose="02020603050405020304" pitchFamily="18" charset="0"/>
+                <a:cs typeface="Times New Roman" panose="02020603050405020304" pitchFamily="18" charset="0"/>
+              </a:rPr>
+              <a:t>detalhes</a:t>
+            </a:r>
+            <a:r>
+              <a:rPr lang="en-GB" sz="1800" dirty="0">
+                <a:latin typeface="Times New Roman" panose="02020603050405020304" pitchFamily="18" charset="0"/>
+                <a:cs typeface="Times New Roman" panose="02020603050405020304" pitchFamily="18" charset="0"/>
+              </a:rPr>
+              <a:t> de um </a:t>
+            </a:r>
+            <a:r>
+              <a:rPr lang="en-GB" sz="1800" dirty="0" err="1">
+                <a:latin typeface="Times New Roman" panose="02020603050405020304" pitchFamily="18" charset="0"/>
+                <a:cs typeface="Times New Roman" panose="02020603050405020304" pitchFamily="18" charset="0"/>
+              </a:rPr>
+              <a:t>determinado</a:t>
+            </a:r>
+            <a:r>
+              <a:rPr lang="en-GB" sz="1800" dirty="0">
+                <a:latin typeface="Times New Roman" panose="02020603050405020304" pitchFamily="18" charset="0"/>
+                <a:cs typeface="Times New Roman" panose="02020603050405020304" pitchFamily="18" charset="0"/>
+              </a:rPr>
+              <a:t> </a:t>
+            </a:r>
+            <a:r>
+              <a:rPr lang="en-GB" sz="1800" dirty="0" err="1">
+                <a:latin typeface="Times New Roman" panose="02020603050405020304" pitchFamily="18" charset="0"/>
+                <a:cs typeface="Times New Roman" panose="02020603050405020304" pitchFamily="18" charset="0"/>
+              </a:rPr>
+              <a:t>produto</a:t>
+            </a:r>
+            <a:r>
+              <a:rPr lang="en-GB" sz="1800" dirty="0">
+                <a:latin typeface="Times New Roman" panose="02020603050405020304" pitchFamily="18" charset="0"/>
+                <a:cs typeface="Times New Roman" panose="02020603050405020304" pitchFamily="18" charset="0"/>
+              </a:rPr>
+              <a:t> </a:t>
+            </a:r>
+            <a:r>
+              <a:rPr lang="en-GB" sz="1800" dirty="0" err="1">
+                <a:latin typeface="Times New Roman" panose="02020603050405020304" pitchFamily="18" charset="0"/>
+                <a:cs typeface="Times New Roman" panose="02020603050405020304" pitchFamily="18" charset="0"/>
+              </a:rPr>
+              <a:t>desejado</a:t>
+            </a:r>
+            <a:endParaRPr lang="en-GB" sz="1800" dirty="0">
+              <a:latin typeface="Times New Roman" panose="02020603050405020304" pitchFamily="18" charset="0"/>
+              <a:cs typeface="Times New Roman" panose="02020603050405020304" pitchFamily="18" charset="0"/>
+            </a:endParaRPr>
+          </a:p>
+          <a:p>
+            <a:r>
+              <a:rPr lang="en-GB" sz="1800" dirty="0" err="1">
+                <a:latin typeface="Times New Roman" panose="02020603050405020304" pitchFamily="18" charset="0"/>
+                <a:cs typeface="Times New Roman" panose="02020603050405020304" pitchFamily="18" charset="0"/>
+              </a:rPr>
+              <a:t>Atualização</a:t>
+            </a:r>
+            <a:r>
+              <a:rPr lang="en-GB" sz="1800" dirty="0">
+                <a:latin typeface="Times New Roman" panose="02020603050405020304" pitchFamily="18" charset="0"/>
+                <a:cs typeface="Times New Roman" panose="02020603050405020304" pitchFamily="18" charset="0"/>
+              </a:rPr>
+              <a:t> do </a:t>
+            </a:r>
+            <a:r>
+              <a:rPr lang="en-GB" sz="1800" dirty="0" err="1">
+                <a:latin typeface="Times New Roman" panose="02020603050405020304" pitchFamily="18" charset="0"/>
+                <a:cs typeface="Times New Roman" panose="02020603050405020304" pitchFamily="18" charset="0"/>
+              </a:rPr>
+              <a:t>histórico</a:t>
+            </a:r>
+            <a:r>
+              <a:rPr lang="en-GB" sz="1800" dirty="0">
+                <a:latin typeface="Times New Roman" panose="02020603050405020304" pitchFamily="18" charset="0"/>
+                <a:cs typeface="Times New Roman" panose="02020603050405020304" pitchFamily="18" charset="0"/>
+              </a:rPr>
+              <a:t> de </a:t>
+            </a:r>
+            <a:r>
+              <a:rPr lang="en-GB" sz="1800" dirty="0" err="1">
+                <a:latin typeface="Times New Roman" panose="02020603050405020304" pitchFamily="18" charset="0"/>
+                <a:cs typeface="Times New Roman" panose="02020603050405020304" pitchFamily="18" charset="0"/>
+              </a:rPr>
+              <a:t>compras</a:t>
+            </a:r>
+            <a:r>
+              <a:rPr lang="en-GB" sz="1800" dirty="0">
+                <a:latin typeface="Times New Roman" panose="02020603050405020304" pitchFamily="18" charset="0"/>
+                <a:cs typeface="Times New Roman" panose="02020603050405020304" pitchFamily="18" charset="0"/>
+              </a:rPr>
+              <a:t>: O </a:t>
+            </a:r>
+            <a:r>
+              <a:rPr lang="en-GB" sz="1800" dirty="0" err="1">
+                <a:latin typeface="Times New Roman" panose="02020603050405020304" pitchFamily="18" charset="0"/>
+                <a:cs typeface="Times New Roman" panose="02020603050405020304" pitchFamily="18" charset="0"/>
+              </a:rPr>
+              <a:t>histórico</a:t>
+            </a:r>
+            <a:r>
+              <a:rPr lang="en-GB" sz="1800" dirty="0">
+                <a:latin typeface="Times New Roman" panose="02020603050405020304" pitchFamily="18" charset="0"/>
+                <a:cs typeface="Times New Roman" panose="02020603050405020304" pitchFamily="18" charset="0"/>
+              </a:rPr>
+              <a:t> de </a:t>
+            </a:r>
+            <a:r>
+              <a:rPr lang="en-GB" sz="1800" dirty="0" err="1">
+                <a:latin typeface="Times New Roman" panose="02020603050405020304" pitchFamily="18" charset="0"/>
+                <a:cs typeface="Times New Roman" panose="02020603050405020304" pitchFamily="18" charset="0"/>
+              </a:rPr>
+              <a:t>compras</a:t>
+            </a:r>
+            <a:r>
+              <a:rPr lang="en-GB" sz="1800" dirty="0">
+                <a:latin typeface="Times New Roman" panose="02020603050405020304" pitchFamily="18" charset="0"/>
+                <a:cs typeface="Times New Roman" panose="02020603050405020304" pitchFamily="18" charset="0"/>
+              </a:rPr>
+              <a:t> e </a:t>
+            </a:r>
+            <a:r>
+              <a:rPr lang="en-GB" sz="1800" dirty="0" err="1">
+                <a:latin typeface="Times New Roman" panose="02020603050405020304" pitchFamily="18" charset="0"/>
+                <a:cs typeface="Times New Roman" panose="02020603050405020304" pitchFamily="18" charset="0"/>
+              </a:rPr>
+              <a:t>atualizado</a:t>
+            </a:r>
+            <a:r>
+              <a:rPr lang="en-GB" sz="1800" dirty="0">
+                <a:latin typeface="Times New Roman" panose="02020603050405020304" pitchFamily="18" charset="0"/>
+                <a:cs typeface="Times New Roman" panose="02020603050405020304" pitchFamily="18" charset="0"/>
+              </a:rPr>
+              <a:t> </a:t>
+            </a:r>
+            <a:r>
+              <a:rPr lang="en-GB" sz="1800" dirty="0" err="1">
+                <a:latin typeface="Times New Roman" panose="02020603050405020304" pitchFamily="18" charset="0"/>
+                <a:cs typeface="Times New Roman" panose="02020603050405020304" pitchFamily="18" charset="0"/>
+              </a:rPr>
+              <a:t>automaticamente</a:t>
+            </a:r>
+            <a:r>
+              <a:rPr lang="en-GB" sz="1800" dirty="0">
+                <a:latin typeface="Times New Roman" panose="02020603050405020304" pitchFamily="18" charset="0"/>
+                <a:cs typeface="Times New Roman" panose="02020603050405020304" pitchFamily="18" charset="0"/>
+              </a:rPr>
+              <a:t> a </a:t>
+            </a:r>
+            <a:r>
+              <a:rPr lang="en-GB" sz="1800" dirty="0" err="1">
+                <a:latin typeface="Times New Roman" panose="02020603050405020304" pitchFamily="18" charset="0"/>
+                <a:cs typeface="Times New Roman" panose="02020603050405020304" pitchFamily="18" charset="0"/>
+              </a:rPr>
+              <a:t>cada</a:t>
+            </a:r>
+            <a:r>
+              <a:rPr lang="en-GB" sz="1800" dirty="0">
+                <a:latin typeface="Times New Roman" panose="02020603050405020304" pitchFamily="18" charset="0"/>
+                <a:cs typeface="Times New Roman" panose="02020603050405020304" pitchFamily="18" charset="0"/>
+              </a:rPr>
+              <a:t> </a:t>
+            </a:r>
+            <a:r>
+              <a:rPr lang="en-GB" sz="1800" dirty="0" err="1">
+                <a:latin typeface="Times New Roman" panose="02020603050405020304" pitchFamily="18" charset="0"/>
+                <a:cs typeface="Times New Roman" panose="02020603050405020304" pitchFamily="18" charset="0"/>
+              </a:rPr>
+              <a:t>compra</a:t>
+            </a:r>
+            <a:r>
+              <a:rPr lang="en-GB" sz="1800" dirty="0">
+                <a:latin typeface="Times New Roman" panose="02020603050405020304" pitchFamily="18" charset="0"/>
+                <a:cs typeface="Times New Roman" panose="02020603050405020304" pitchFamily="18" charset="0"/>
+              </a:rPr>
+              <a:t> </a:t>
+            </a:r>
+            <a:r>
+              <a:rPr lang="en-GB" sz="1800" dirty="0" err="1">
+                <a:latin typeface="Times New Roman" panose="02020603050405020304" pitchFamily="18" charset="0"/>
+                <a:cs typeface="Times New Roman" panose="02020603050405020304" pitchFamily="18" charset="0"/>
+              </a:rPr>
+              <a:t>realizada</a:t>
+            </a:r>
+            <a:r>
+              <a:rPr lang="en-GB" sz="1800" dirty="0">
+                <a:latin typeface="Times New Roman" panose="02020603050405020304" pitchFamily="18" charset="0"/>
+                <a:cs typeface="Times New Roman" panose="02020603050405020304" pitchFamily="18" charset="0"/>
+              </a:rPr>
+              <a:t>.</a:t>
+            </a:r>
+          </a:p>
+          <a:p>
+            <a:r>
+              <a:rPr lang="en-GB" sz="1800" dirty="0" err="1">
                 <a:latin typeface="Times New Roman" panose="02020603050405020304" pitchFamily="18" charset="0"/>
                 <a:cs typeface="Times New Roman" panose="02020603050405020304" pitchFamily="18" charset="0"/>
               </a:rPr>
               <a:t>Obter</a:t>
             </a:r>
             <a:r>
-              <a:rPr lang="en-GB" sz="1600" dirty="0">
+              <a:rPr lang="en-GB" sz="1800" dirty="0">
                 <a:latin typeface="Times New Roman" panose="02020603050405020304" pitchFamily="18" charset="0"/>
                 <a:cs typeface="Times New Roman" panose="02020603050405020304" pitchFamily="18" charset="0"/>
               </a:rPr>
               <a:t> </a:t>
             </a:r>
             <a:r>
-              <a:rPr lang="en-GB" sz="1600" dirty="0" err="1">
+              <a:rPr lang="en-GB" sz="1800" dirty="0" err="1">
                 <a:latin typeface="Times New Roman" panose="02020603050405020304" pitchFamily="18" charset="0"/>
                 <a:cs typeface="Times New Roman" panose="02020603050405020304" pitchFamily="18" charset="0"/>
               </a:rPr>
               <a:t>estatísticas</a:t>
             </a:r>
             <a:r>
-              <a:rPr lang="en-GB" sz="1600" dirty="0">
-                <a:latin typeface="Times New Roman" panose="02020603050405020304" pitchFamily="18" charset="0"/>
-                <a:cs typeface="Times New Roman" panose="02020603050405020304" pitchFamily="18" charset="0"/>
-              </a:rPr>
-              <a:t>: </a:t>
-            </a:r>
-            <a:r>
-              <a:rPr lang="en-GB" sz="1600" dirty="0" err="1">
-                <a:latin typeface="Times New Roman" panose="02020603050405020304" pitchFamily="18" charset="0"/>
-                <a:cs typeface="Times New Roman" panose="02020603050405020304" pitchFamily="18" charset="0"/>
-              </a:rPr>
-              <a:t>Deve</a:t>
-            </a:r>
-            <a:r>
-              <a:rPr lang="en-GB" sz="1600" dirty="0">
-                <a:latin typeface="Times New Roman" panose="02020603050405020304" pitchFamily="18" charset="0"/>
-                <a:cs typeface="Times New Roman" panose="02020603050405020304" pitchFamily="18" charset="0"/>
-              </a:rPr>
-              <a:t> ser </a:t>
-            </a:r>
-            <a:r>
-              <a:rPr lang="en-GB" sz="1600" dirty="0" err="1">
+              <a:rPr lang="en-GB" sz="1800" dirty="0">
+                <a:latin typeface="Times New Roman" panose="02020603050405020304" pitchFamily="18" charset="0"/>
+                <a:cs typeface="Times New Roman" panose="02020603050405020304" pitchFamily="18" charset="0"/>
+              </a:rPr>
+              <a:t>: Como </a:t>
+            </a:r>
+            <a:r>
+              <a:rPr lang="en-GB" sz="1800" dirty="0" err="1">
+                <a:latin typeface="Times New Roman" panose="02020603050405020304" pitchFamily="18" charset="0"/>
+                <a:cs typeface="Times New Roman" panose="02020603050405020304" pitchFamily="18" charset="0"/>
+              </a:rPr>
+              <a:t>administrador</a:t>
+            </a:r>
+            <a:r>
+              <a:rPr lang="en-GB" sz="1800" dirty="0">
+                <a:latin typeface="Times New Roman" panose="02020603050405020304" pitchFamily="18" charset="0"/>
+                <a:cs typeface="Times New Roman" panose="02020603050405020304" pitchFamily="18" charset="0"/>
+              </a:rPr>
+              <a:t> </a:t>
+            </a:r>
+            <a:r>
+              <a:rPr lang="en-GB" sz="1800" dirty="0" err="1">
+                <a:latin typeface="Times New Roman" panose="02020603050405020304" pitchFamily="18" charset="0"/>
+                <a:cs typeface="Times New Roman" panose="02020603050405020304" pitchFamily="18" charset="0"/>
+              </a:rPr>
+              <a:t>é</a:t>
+            </a:r>
+            <a:r>
+              <a:rPr lang="en-GB" sz="1800" dirty="0">
+                <a:latin typeface="Times New Roman" panose="02020603050405020304" pitchFamily="18" charset="0"/>
+                <a:cs typeface="Times New Roman" panose="02020603050405020304" pitchFamily="18" charset="0"/>
+              </a:rPr>
+              <a:t> </a:t>
+            </a:r>
+            <a:r>
+              <a:rPr lang="en-GB" sz="1800" dirty="0" err="1">
                 <a:latin typeface="Times New Roman" panose="02020603050405020304" pitchFamily="18" charset="0"/>
                 <a:cs typeface="Times New Roman" panose="02020603050405020304" pitchFamily="18" charset="0"/>
               </a:rPr>
               <a:t>possível</a:t>
             </a:r>
             <a:r>
-              <a:rPr lang="en-GB" sz="1600" dirty="0">
+              <a:rPr lang="en-GB" sz="1800" dirty="0">
                 <a:latin typeface="Times New Roman" panose="02020603050405020304" pitchFamily="18" charset="0"/>
                 <a:cs typeface="Times New Roman" panose="02020603050405020304" pitchFamily="18" charset="0"/>
               </a:rPr>
               <a:t> </a:t>
             </a:r>
             <a:r>
-              <a:rPr lang="en-GB" sz="1600" dirty="0" err="1">
+              <a:rPr lang="en-GB" sz="1800" dirty="0" err="1">
                 <a:latin typeface="Times New Roman" panose="02020603050405020304" pitchFamily="18" charset="0"/>
                 <a:cs typeface="Times New Roman" panose="02020603050405020304" pitchFamily="18" charset="0"/>
               </a:rPr>
               <a:t>obter</a:t>
             </a:r>
             <a:r>
-              <a:rPr lang="en-GB" sz="1600" dirty="0">
+              <a:rPr lang="en-GB" sz="1800" dirty="0">
                 <a:latin typeface="Times New Roman" panose="02020603050405020304" pitchFamily="18" charset="0"/>
                 <a:cs typeface="Times New Roman" panose="02020603050405020304" pitchFamily="18" charset="0"/>
               </a:rPr>
               <a:t> </a:t>
             </a:r>
             <a:r>
-              <a:rPr lang="en-GB" sz="1600" dirty="0" err="1">
+              <a:rPr lang="en-GB" sz="1800" dirty="0" err="1">
                 <a:latin typeface="Times New Roman" panose="02020603050405020304" pitchFamily="18" charset="0"/>
                 <a:cs typeface="Times New Roman" panose="02020603050405020304" pitchFamily="18" charset="0"/>
               </a:rPr>
               <a:t>os</a:t>
             </a:r>
             <a:r>
-              <a:rPr lang="en-GB" sz="1600" dirty="0">
+              <a:rPr lang="en-GB" sz="1800" dirty="0">
                 <a:latin typeface="Times New Roman" panose="02020603050405020304" pitchFamily="18" charset="0"/>
                 <a:cs typeface="Times New Roman" panose="02020603050405020304" pitchFamily="18" charset="0"/>
               </a:rPr>
               <a:t> </a:t>
             </a:r>
             <a:r>
-              <a:rPr lang="en-GB" sz="1600" dirty="0" err="1">
+              <a:rPr lang="en-GB" sz="1800" dirty="0" err="1">
                 <a:latin typeface="Times New Roman" panose="02020603050405020304" pitchFamily="18" charset="0"/>
                 <a:cs typeface="Times New Roman" panose="02020603050405020304" pitchFamily="18" charset="0"/>
               </a:rPr>
               <a:t>detalhes</a:t>
             </a:r>
             <a:r>
-              <a:rPr lang="en-GB" sz="1600" dirty="0">
+              <a:rPr lang="en-GB" sz="1800" dirty="0">
                 <a:latin typeface="Times New Roman" panose="02020603050405020304" pitchFamily="18" charset="0"/>
                 <a:cs typeface="Times New Roman" panose="02020603050405020304" pitchFamily="18" charset="0"/>
               </a:rPr>
               <a:t> das </a:t>
             </a:r>
             <a:r>
-              <a:rPr lang="en-GB" sz="1600" dirty="0" err="1">
+              <a:rPr lang="en-GB" sz="1800" dirty="0" err="1">
                 <a:latin typeface="Times New Roman" panose="02020603050405020304" pitchFamily="18" charset="0"/>
                 <a:cs typeface="Times New Roman" panose="02020603050405020304" pitchFamily="18" charset="0"/>
               </a:rPr>
               <a:t>vendas</a:t>
             </a:r>
             <a:r>
-              <a:rPr lang="en-GB" sz="1600" dirty="0">
+              <a:rPr lang="en-GB" sz="1800" dirty="0">
                 <a:latin typeface="Times New Roman" panose="02020603050405020304" pitchFamily="18" charset="0"/>
                 <a:cs typeface="Times New Roman" panose="02020603050405020304" pitchFamily="18" charset="0"/>
               </a:rPr>
               <a:t> por </a:t>
             </a:r>
             <a:r>
-              <a:rPr lang="en-GB" sz="1600" dirty="0" err="1">
+              <a:rPr lang="en-GB" sz="1800" dirty="0" err="1">
                 <a:latin typeface="Times New Roman" panose="02020603050405020304" pitchFamily="18" charset="0"/>
                 <a:cs typeface="Times New Roman" panose="02020603050405020304" pitchFamily="18" charset="0"/>
               </a:rPr>
               <a:t>mês</a:t>
             </a:r>
             <a:r>
-              <a:rPr lang="en-GB" sz="1600" dirty="0">
+              <a:rPr lang="en-GB" sz="1800" dirty="0">
                 <a:latin typeface="Times New Roman" panose="02020603050405020304" pitchFamily="18" charset="0"/>
                 <a:cs typeface="Times New Roman" panose="02020603050405020304" pitchFamily="18" charset="0"/>
               </a:rPr>
               <a:t> </a:t>
             </a:r>
             <a:r>
-              <a:rPr lang="en-GB" sz="1600" dirty="0" err="1">
+              <a:rPr lang="en-GB" sz="1800" dirty="0" err="1">
                 <a:latin typeface="Times New Roman" panose="02020603050405020304" pitchFamily="18" charset="0"/>
                 <a:cs typeface="Times New Roman" panose="02020603050405020304" pitchFamily="18" charset="0"/>
               </a:rPr>
               <a:t>nos</a:t>
             </a:r>
             <a:r>
-              <a:rPr lang="en-GB" sz="1600" dirty="0">
+              <a:rPr lang="en-GB" sz="1800" dirty="0">
                 <a:latin typeface="Times New Roman" panose="02020603050405020304" pitchFamily="18" charset="0"/>
                 <a:cs typeface="Times New Roman" panose="02020603050405020304" pitchFamily="18" charset="0"/>
               </a:rPr>
               <a:t> </a:t>
             </a:r>
             <a:r>
-              <a:rPr lang="en-GB" sz="1600" dirty="0" err="1">
+              <a:rPr lang="en-GB" sz="1800" dirty="0" err="1">
                 <a:latin typeface="Times New Roman" panose="02020603050405020304" pitchFamily="18" charset="0"/>
                 <a:cs typeface="Times New Roman" panose="02020603050405020304" pitchFamily="18" charset="0"/>
               </a:rPr>
               <a:t>últimos</a:t>
             </a:r>
             <a:r>
-              <a:rPr lang="en-GB" sz="1600" dirty="0">
+              <a:rPr lang="en-GB" sz="1800" dirty="0">
                 <a:latin typeface="Times New Roman" panose="02020603050405020304" pitchFamily="18" charset="0"/>
                 <a:cs typeface="Times New Roman" panose="02020603050405020304" pitchFamily="18" charset="0"/>
               </a:rPr>
@@ -6715,112 +7247,98 @@
           </a:p>
           <a:p>
             <a:r>
-              <a:rPr lang="en-GB" sz="1600" dirty="0" err="1">
+              <a:rPr lang="en-GB" sz="1800" dirty="0" err="1">
                 <a:latin typeface="Times New Roman" panose="02020603050405020304" pitchFamily="18" charset="0"/>
                 <a:cs typeface="Times New Roman" panose="02020603050405020304" pitchFamily="18" charset="0"/>
               </a:rPr>
               <a:t>Criar</a:t>
             </a:r>
             <a:r>
-              <a:rPr lang="en-GB" sz="1600" dirty="0">
+              <a:rPr lang="en-GB" sz="1800" dirty="0">
                 <a:latin typeface="Times New Roman" panose="02020603050405020304" pitchFamily="18" charset="0"/>
                 <a:cs typeface="Times New Roman" panose="02020603050405020304" pitchFamily="18" charset="0"/>
               </a:rPr>
               <a:t> nova </a:t>
             </a:r>
             <a:r>
-              <a:rPr lang="en-GB" sz="1600" dirty="0" err="1">
+              <a:rPr lang="en-GB" sz="1800" dirty="0" err="1">
                 <a:latin typeface="Times New Roman" panose="02020603050405020304" pitchFamily="18" charset="0"/>
                 <a:cs typeface="Times New Roman" panose="02020603050405020304" pitchFamily="18" charset="0"/>
               </a:rPr>
               <a:t>campanha:Um</a:t>
             </a:r>
             <a:r>
-              <a:rPr lang="en-GB" sz="1600" dirty="0">
+              <a:rPr lang="en-GB" sz="1800" dirty="0">
                 <a:latin typeface="Times New Roman" panose="02020603050405020304" pitchFamily="18" charset="0"/>
                 <a:cs typeface="Times New Roman" panose="02020603050405020304" pitchFamily="18" charset="0"/>
               </a:rPr>
               <a:t> </a:t>
             </a:r>
             <a:r>
-              <a:rPr lang="en-GB" sz="1600" dirty="0" err="1">
+              <a:rPr lang="en-GB" sz="1800" dirty="0" err="1">
                 <a:latin typeface="Times New Roman" panose="02020603050405020304" pitchFamily="18" charset="0"/>
                 <a:cs typeface="Times New Roman" panose="02020603050405020304" pitchFamily="18" charset="0"/>
               </a:rPr>
               <a:t>administrador</a:t>
             </a:r>
             <a:r>
-              <a:rPr lang="en-GB" sz="1600" dirty="0">
+              <a:rPr lang="en-GB" sz="1800" dirty="0">
                 <a:latin typeface="Times New Roman" panose="02020603050405020304" pitchFamily="18" charset="0"/>
                 <a:cs typeface="Times New Roman" panose="02020603050405020304" pitchFamily="18" charset="0"/>
               </a:rPr>
               <a:t> </a:t>
             </a:r>
             <a:r>
-              <a:rPr lang="en-GB" sz="1600" dirty="0" err="1">
-                <a:latin typeface="Times New Roman" panose="02020603050405020304" pitchFamily="18" charset="0"/>
-                <a:cs typeface="Times New Roman" panose="02020603050405020304" pitchFamily="18" charset="0"/>
-              </a:rPr>
-              <a:t>devera</a:t>
-            </a:r>
-            <a:r>
-              <a:rPr lang="en-GB" sz="1600" dirty="0">
-                <a:latin typeface="Times New Roman" panose="02020603050405020304" pitchFamily="18" charset="0"/>
-                <a:cs typeface="Times New Roman" panose="02020603050405020304" pitchFamily="18" charset="0"/>
-              </a:rPr>
-              <a:t>́ </a:t>
-            </a:r>
-            <a:r>
-              <a:rPr lang="en-GB" sz="1600" dirty="0" err="1">
-                <a:latin typeface="Times New Roman" panose="02020603050405020304" pitchFamily="18" charset="0"/>
-                <a:cs typeface="Times New Roman" panose="02020603050405020304" pitchFamily="18" charset="0"/>
-              </a:rPr>
-              <a:t>poder</a:t>
-            </a:r>
-            <a:r>
-              <a:rPr lang="en-GB" sz="1600" dirty="0">
+              <a:rPr lang="en-GB" sz="1800" dirty="0" err="1">
+                <a:latin typeface="Times New Roman" panose="02020603050405020304" pitchFamily="18" charset="0"/>
+                <a:cs typeface="Times New Roman" panose="02020603050405020304" pitchFamily="18" charset="0"/>
+              </a:rPr>
+              <a:t>pode</a:t>
+            </a:r>
+            <a:r>
+              <a:rPr lang="en-GB" sz="1800" dirty="0">
                 <a:latin typeface="Times New Roman" panose="02020603050405020304" pitchFamily="18" charset="0"/>
                 <a:cs typeface="Times New Roman" panose="02020603050405020304" pitchFamily="18" charset="0"/>
               </a:rPr>
               <a:t> </a:t>
             </a:r>
             <a:r>
-              <a:rPr lang="en-GB" sz="1600" dirty="0" err="1">
+              <a:rPr lang="en-GB" sz="1800" dirty="0" err="1">
                 <a:latin typeface="Times New Roman" panose="02020603050405020304" pitchFamily="18" charset="0"/>
                 <a:cs typeface="Times New Roman" panose="02020603050405020304" pitchFamily="18" charset="0"/>
               </a:rPr>
               <a:t>criar</a:t>
             </a:r>
             <a:r>
-              <a:rPr lang="en-GB" sz="1600" dirty="0">
+              <a:rPr lang="en-GB" sz="1800" dirty="0">
                 <a:latin typeface="Times New Roman" panose="02020603050405020304" pitchFamily="18" charset="0"/>
                 <a:cs typeface="Times New Roman" panose="02020603050405020304" pitchFamily="18" charset="0"/>
               </a:rPr>
               <a:t> </a:t>
             </a:r>
             <a:r>
-              <a:rPr lang="en-GB" sz="1600" dirty="0" err="1">
+              <a:rPr lang="en-GB" sz="1800" dirty="0" err="1">
                 <a:latin typeface="Times New Roman" panose="02020603050405020304" pitchFamily="18" charset="0"/>
                 <a:cs typeface="Times New Roman" panose="02020603050405020304" pitchFamily="18" charset="0"/>
               </a:rPr>
               <a:t>novas</a:t>
             </a:r>
             <a:r>
-              <a:rPr lang="en-GB" sz="1600" dirty="0">
+              <a:rPr lang="en-GB" sz="1800" dirty="0">
                 <a:latin typeface="Times New Roman" panose="02020603050405020304" pitchFamily="18" charset="0"/>
                 <a:cs typeface="Times New Roman" panose="02020603050405020304" pitchFamily="18" charset="0"/>
               </a:rPr>
               <a:t> </a:t>
             </a:r>
             <a:r>
-              <a:rPr lang="en-GB" sz="1600" dirty="0" err="1">
+              <a:rPr lang="en-GB" sz="1800" dirty="0" err="1">
                 <a:latin typeface="Times New Roman" panose="02020603050405020304" pitchFamily="18" charset="0"/>
                 <a:cs typeface="Times New Roman" panose="02020603050405020304" pitchFamily="18" charset="0"/>
               </a:rPr>
               <a:t>campanhas</a:t>
             </a:r>
             <a:r>
-              <a:rPr lang="en-GB" sz="1600" dirty="0">
+              <a:rPr lang="en-GB" sz="1800" dirty="0">
                 <a:latin typeface="Times New Roman" panose="02020603050405020304" pitchFamily="18" charset="0"/>
                 <a:cs typeface="Times New Roman" panose="02020603050405020304" pitchFamily="18" charset="0"/>
               </a:rPr>
@@ -6829,682 +7347,130 @@
           </a:p>
           <a:p>
             <a:r>
-              <a:rPr lang="en-GB" sz="1600" dirty="0" err="1">
+              <a:rPr lang="en-GB" sz="1800" dirty="0" err="1">
                 <a:latin typeface="Times New Roman" panose="02020603050405020304" pitchFamily="18" charset="0"/>
                 <a:cs typeface="Times New Roman" panose="02020603050405020304" pitchFamily="18" charset="0"/>
               </a:rPr>
               <a:t>Subscrever</a:t>
             </a:r>
             <a:r>
-              <a:rPr lang="en-GB" sz="1600" dirty="0">
+              <a:rPr lang="en-GB" sz="1800" dirty="0">
                 <a:latin typeface="Times New Roman" panose="02020603050405020304" pitchFamily="18" charset="0"/>
                 <a:cs typeface="Times New Roman" panose="02020603050405020304" pitchFamily="18" charset="0"/>
               </a:rPr>
               <a:t> </a:t>
             </a:r>
             <a:r>
-              <a:rPr lang="en-GB" sz="1600" dirty="0" err="1">
+              <a:rPr lang="en-GB" sz="1800" dirty="0" err="1">
                 <a:latin typeface="Times New Roman" panose="02020603050405020304" pitchFamily="18" charset="0"/>
                 <a:cs typeface="Times New Roman" panose="02020603050405020304" pitchFamily="18" charset="0"/>
               </a:rPr>
               <a:t>campanha</a:t>
             </a:r>
             <a:r>
-              <a:rPr lang="en-GB" sz="1600" dirty="0">
+              <a:rPr lang="en-GB" sz="1800" dirty="0">
                 <a:latin typeface="Times New Roman" panose="02020603050405020304" pitchFamily="18" charset="0"/>
                 <a:cs typeface="Times New Roman" panose="02020603050405020304" pitchFamily="18" charset="0"/>
               </a:rPr>
               <a:t>/</a:t>
             </a:r>
             <a:r>
-              <a:rPr lang="en-GB" sz="1600" dirty="0" err="1">
+              <a:rPr lang="en-GB" sz="1800" dirty="0" err="1">
                 <a:latin typeface="Times New Roman" panose="02020603050405020304" pitchFamily="18" charset="0"/>
                 <a:cs typeface="Times New Roman" panose="02020603050405020304" pitchFamily="18" charset="0"/>
               </a:rPr>
               <a:t>cupões</a:t>
             </a:r>
             <a:r>
-              <a:rPr lang="en-GB" sz="1600" dirty="0">
-                <a:latin typeface="Times New Roman" panose="02020603050405020304" pitchFamily="18" charset="0"/>
-                <a:cs typeface="Times New Roman" panose="02020603050405020304" pitchFamily="18" charset="0"/>
-              </a:rPr>
-              <a:t>: </a:t>
-            </a:r>
-            <a:r>
-              <a:rPr lang="en-GB" sz="1600" dirty="0" err="1">
-                <a:latin typeface="Times New Roman" panose="02020603050405020304" pitchFamily="18" charset="0"/>
-                <a:cs typeface="Times New Roman" panose="02020603050405020304" pitchFamily="18" charset="0"/>
-              </a:rPr>
-              <a:t>Deve</a:t>
-            </a:r>
-            <a:r>
-              <a:rPr lang="en-GB" sz="1600" dirty="0">
-                <a:latin typeface="Times New Roman" panose="02020603050405020304" pitchFamily="18" charset="0"/>
-                <a:cs typeface="Times New Roman" panose="02020603050405020304" pitchFamily="18" charset="0"/>
-              </a:rPr>
-              <a:t> ser </a:t>
-            </a:r>
-            <a:r>
-              <a:rPr lang="en-GB" sz="1600" dirty="0" err="1">
-                <a:latin typeface="Times New Roman" panose="02020603050405020304" pitchFamily="18" charset="0"/>
-                <a:cs typeface="Times New Roman" panose="02020603050405020304" pitchFamily="18" charset="0"/>
-              </a:rPr>
-              <a:t>possível</a:t>
-            </a:r>
-            <a:r>
-              <a:rPr lang="en-GB" sz="1600" dirty="0">
-                <a:latin typeface="Times New Roman" panose="02020603050405020304" pitchFamily="18" charset="0"/>
-                <a:cs typeface="Times New Roman" panose="02020603050405020304" pitchFamily="18" charset="0"/>
-              </a:rPr>
-              <a:t> um comprador </a:t>
-            </a:r>
-            <a:r>
-              <a:rPr lang="en-GB" sz="1600" dirty="0" err="1">
+              <a:rPr lang="en-GB" sz="1800" dirty="0">
+                <a:latin typeface="Times New Roman" panose="02020603050405020304" pitchFamily="18" charset="0"/>
+                <a:cs typeface="Times New Roman" panose="02020603050405020304" pitchFamily="18" charset="0"/>
+              </a:rPr>
+              <a:t>: Um comprador </a:t>
+            </a:r>
+            <a:r>
+              <a:rPr lang="en-GB" sz="1800" dirty="0" err="1">
+                <a:latin typeface="Times New Roman" panose="02020603050405020304" pitchFamily="18" charset="0"/>
+                <a:cs typeface="Times New Roman" panose="02020603050405020304" pitchFamily="18" charset="0"/>
+              </a:rPr>
+              <a:t>pode</a:t>
+            </a:r>
+            <a:r>
+              <a:rPr lang="en-GB" sz="1800" dirty="0">
+                <a:latin typeface="Times New Roman" panose="02020603050405020304" pitchFamily="18" charset="0"/>
+                <a:cs typeface="Times New Roman" panose="02020603050405020304" pitchFamily="18" charset="0"/>
+              </a:rPr>
+              <a:t> </a:t>
+            </a:r>
+            <a:r>
+              <a:rPr lang="en-GB" sz="1800" dirty="0" err="1">
                 <a:latin typeface="Times New Roman" panose="02020603050405020304" pitchFamily="18" charset="0"/>
                 <a:cs typeface="Times New Roman" panose="02020603050405020304" pitchFamily="18" charset="0"/>
               </a:rPr>
               <a:t>subscrever</a:t>
             </a:r>
             <a:r>
-              <a:rPr lang="en-GB" sz="1600" dirty="0">
+              <a:rPr lang="en-GB" sz="1800" dirty="0">
+                <a:latin typeface="Times New Roman" panose="02020603050405020304" pitchFamily="18" charset="0"/>
+                <a:cs typeface="Times New Roman" panose="02020603050405020304" pitchFamily="18" charset="0"/>
+              </a:rPr>
+              <a:t> a </a:t>
+            </a:r>
+            <a:r>
+              <a:rPr lang="en-GB" sz="1800" dirty="0" err="1">
+                <a:latin typeface="Times New Roman" panose="02020603050405020304" pitchFamily="18" charset="0"/>
+                <a:cs typeface="Times New Roman" panose="02020603050405020304" pitchFamily="18" charset="0"/>
+              </a:rPr>
+              <a:t>uma</a:t>
+            </a:r>
+            <a:r>
+              <a:rPr lang="en-GB" sz="1800" dirty="0">
                 <a:latin typeface="Times New Roman" panose="02020603050405020304" pitchFamily="18" charset="0"/>
                 <a:cs typeface="Times New Roman" panose="02020603050405020304" pitchFamily="18" charset="0"/>
               </a:rPr>
               <a:t> </a:t>
             </a:r>
             <a:r>
-              <a:rPr lang="en-GB" sz="1600" dirty="0" err="1">
-                <a:latin typeface="Times New Roman" panose="02020603050405020304" pitchFamily="18" charset="0"/>
-                <a:cs typeface="Times New Roman" panose="02020603050405020304" pitchFamily="18" charset="0"/>
-              </a:rPr>
-              <a:t>uma</a:t>
-            </a:r>
-            <a:r>
-              <a:rPr lang="en-GB" sz="1600" dirty="0">
-                <a:latin typeface="Times New Roman" panose="02020603050405020304" pitchFamily="18" charset="0"/>
-                <a:cs typeface="Times New Roman" panose="02020603050405020304" pitchFamily="18" charset="0"/>
-              </a:rPr>
-              <a:t> </a:t>
-            </a:r>
-            <a:r>
-              <a:rPr lang="en-GB" sz="1600" dirty="0" err="1">
+              <a:rPr lang="en-GB" sz="1800" dirty="0" err="1">
                 <a:latin typeface="Times New Roman" panose="02020603050405020304" pitchFamily="18" charset="0"/>
                 <a:cs typeface="Times New Roman" panose="02020603050405020304" pitchFamily="18" charset="0"/>
               </a:rPr>
               <a:t>campanha</a:t>
             </a:r>
             <a:r>
-              <a:rPr lang="en-GB" sz="1600" dirty="0">
+              <a:rPr lang="en-GB" sz="1800" dirty="0">
                 <a:latin typeface="Times New Roman" panose="02020603050405020304" pitchFamily="18" charset="0"/>
                 <a:cs typeface="Times New Roman" panose="02020603050405020304" pitchFamily="18" charset="0"/>
               </a:rPr>
               <a:t> de </a:t>
             </a:r>
             <a:r>
-              <a:rPr lang="en-GB" sz="1600" dirty="0" err="1">
+              <a:rPr lang="en-GB" sz="1800" dirty="0" err="1">
                 <a:latin typeface="Times New Roman" panose="02020603050405020304" pitchFamily="18" charset="0"/>
                 <a:cs typeface="Times New Roman" panose="02020603050405020304" pitchFamily="18" charset="0"/>
               </a:rPr>
               <a:t>atribuição</a:t>
             </a:r>
             <a:r>
-              <a:rPr lang="en-GB" sz="1600" dirty="0">
+              <a:rPr lang="en-GB" sz="1800" dirty="0">
                 <a:latin typeface="Times New Roman" panose="02020603050405020304" pitchFamily="18" charset="0"/>
                 <a:cs typeface="Times New Roman" panose="02020603050405020304" pitchFamily="18" charset="0"/>
               </a:rPr>
               <a:t> de </a:t>
             </a:r>
             <a:r>
-              <a:rPr lang="en-GB" sz="1600" dirty="0" err="1">
+              <a:rPr lang="en-GB" sz="1800" dirty="0" err="1">
                 <a:latin typeface="Times New Roman" panose="02020603050405020304" pitchFamily="18" charset="0"/>
                 <a:cs typeface="Times New Roman" panose="02020603050405020304" pitchFamily="18" charset="0"/>
               </a:rPr>
               <a:t>cupões</a:t>
             </a:r>
             <a:r>
-              <a:rPr lang="en-GB" sz="1600" dirty="0">
+              <a:rPr lang="en-GB" sz="1800" dirty="0">
                 <a:latin typeface="Times New Roman" panose="02020603050405020304" pitchFamily="18" charset="0"/>
                 <a:cs typeface="Times New Roman" panose="02020603050405020304" pitchFamily="18" charset="0"/>
               </a:rPr>
               <a:t>. </a:t>
-            </a:r>
-          </a:p>
-          <a:p>
-            <a:r>
-              <a:rPr lang="en-GB" sz="1600" dirty="0" err="1">
-                <a:latin typeface="Times New Roman" panose="02020603050405020304" pitchFamily="18" charset="0"/>
-                <a:cs typeface="Times New Roman" panose="02020603050405020304" pitchFamily="18" charset="0"/>
-              </a:rPr>
-              <a:t>Obter</a:t>
-            </a:r>
-            <a:r>
-              <a:rPr lang="en-GB" sz="1600" dirty="0">
-                <a:latin typeface="Times New Roman" panose="02020603050405020304" pitchFamily="18" charset="0"/>
-                <a:cs typeface="Times New Roman" panose="02020603050405020304" pitchFamily="18" charset="0"/>
-              </a:rPr>
-              <a:t> </a:t>
-            </a:r>
-            <a:r>
-              <a:rPr lang="en-GB" sz="1600" dirty="0" err="1">
-                <a:latin typeface="Times New Roman" panose="02020603050405020304" pitchFamily="18" charset="0"/>
-                <a:cs typeface="Times New Roman" panose="02020603050405020304" pitchFamily="18" charset="0"/>
-              </a:rPr>
-              <a:t>estatísticas</a:t>
-            </a:r>
-            <a:r>
-              <a:rPr lang="en-GB" sz="1600" dirty="0">
-                <a:latin typeface="Times New Roman" panose="02020603050405020304" pitchFamily="18" charset="0"/>
-                <a:cs typeface="Times New Roman" panose="02020603050405020304" pitchFamily="18" charset="0"/>
-              </a:rPr>
-              <a:t> dos </a:t>
-            </a:r>
-            <a:r>
-              <a:rPr lang="en-GB" sz="1600" dirty="0" err="1">
-                <a:latin typeface="Times New Roman" panose="02020603050405020304" pitchFamily="18" charset="0"/>
-                <a:cs typeface="Times New Roman" panose="02020603050405020304" pitchFamily="18" charset="0"/>
-              </a:rPr>
-              <a:t>descontos</a:t>
-            </a:r>
-            <a:r>
-              <a:rPr lang="en-GB" sz="1600" dirty="0">
-                <a:latin typeface="Times New Roman" panose="02020603050405020304" pitchFamily="18" charset="0"/>
-                <a:cs typeface="Times New Roman" panose="02020603050405020304" pitchFamily="18" charset="0"/>
-              </a:rPr>
-              <a:t> </a:t>
-            </a:r>
-            <a:r>
-              <a:rPr lang="en-GB" sz="1600" dirty="0" err="1">
-                <a:latin typeface="Times New Roman" panose="02020603050405020304" pitchFamily="18" charset="0"/>
-                <a:cs typeface="Times New Roman" panose="02020603050405020304" pitchFamily="18" charset="0"/>
-              </a:rPr>
-              <a:t>aplicados</a:t>
-            </a:r>
-            <a:r>
-              <a:rPr lang="en-GB" sz="1600" dirty="0">
-                <a:latin typeface="Times New Roman" panose="02020603050405020304" pitchFamily="18" charset="0"/>
-                <a:cs typeface="Times New Roman" panose="02020603050405020304" pitchFamily="18" charset="0"/>
-              </a:rPr>
-              <a:t> por </a:t>
-            </a:r>
-            <a:r>
-              <a:rPr lang="en-GB" sz="1600" dirty="0" err="1">
-                <a:latin typeface="Times New Roman" panose="02020603050405020304" pitchFamily="18" charset="0"/>
-                <a:cs typeface="Times New Roman" panose="02020603050405020304" pitchFamily="18" charset="0"/>
-              </a:rPr>
-              <a:t>campanha</a:t>
-            </a:r>
-            <a:r>
-              <a:rPr lang="en-GB" sz="1600" dirty="0">
-                <a:latin typeface="Times New Roman" panose="02020603050405020304" pitchFamily="18" charset="0"/>
-                <a:cs typeface="Times New Roman" panose="02020603050405020304" pitchFamily="18" charset="0"/>
-              </a:rPr>
-              <a:t>: </a:t>
-            </a:r>
-            <a:r>
-              <a:rPr lang="en-GB" sz="1600" dirty="0" err="1">
-                <a:latin typeface="Times New Roman" panose="02020603050405020304" pitchFamily="18" charset="0"/>
-                <a:cs typeface="Times New Roman" panose="02020603050405020304" pitchFamily="18" charset="0"/>
-              </a:rPr>
-              <a:t>Deve</a:t>
-            </a:r>
-            <a:r>
-              <a:rPr lang="en-GB" sz="1600" dirty="0">
-                <a:latin typeface="Times New Roman" panose="02020603050405020304" pitchFamily="18" charset="0"/>
-                <a:cs typeface="Times New Roman" panose="02020603050405020304" pitchFamily="18" charset="0"/>
-              </a:rPr>
-              <a:t> ser </a:t>
-            </a:r>
-            <a:r>
-              <a:rPr lang="en-GB" sz="1600" dirty="0" err="1">
-                <a:latin typeface="Times New Roman" panose="02020603050405020304" pitchFamily="18" charset="0"/>
-                <a:cs typeface="Times New Roman" panose="02020603050405020304" pitchFamily="18" charset="0"/>
-              </a:rPr>
-              <a:t>possível</a:t>
-            </a:r>
-            <a:r>
-              <a:rPr lang="en-GB" sz="1600" dirty="0">
-                <a:latin typeface="Times New Roman" panose="02020603050405020304" pitchFamily="18" charset="0"/>
-                <a:cs typeface="Times New Roman" panose="02020603050405020304" pitchFamily="18" charset="0"/>
-              </a:rPr>
-              <a:t> </a:t>
-            </a:r>
-            <a:r>
-              <a:rPr lang="en-GB" sz="1600" dirty="0" err="1">
-                <a:latin typeface="Times New Roman" panose="02020603050405020304" pitchFamily="18" charset="0"/>
-                <a:cs typeface="Times New Roman" panose="02020603050405020304" pitchFamily="18" charset="0"/>
-              </a:rPr>
-              <a:t>obter</a:t>
-            </a:r>
-            <a:r>
-              <a:rPr lang="en-GB" sz="1600" dirty="0">
-                <a:latin typeface="Times New Roman" panose="02020603050405020304" pitchFamily="18" charset="0"/>
-                <a:cs typeface="Times New Roman" panose="02020603050405020304" pitchFamily="18" charset="0"/>
-              </a:rPr>
-              <a:t> </a:t>
-            </a:r>
-            <a:r>
-              <a:rPr lang="en-GB" sz="1600" dirty="0" err="1">
-                <a:latin typeface="Times New Roman" panose="02020603050405020304" pitchFamily="18" charset="0"/>
-                <a:cs typeface="Times New Roman" panose="02020603050405020304" pitchFamily="18" charset="0"/>
-              </a:rPr>
-              <a:t>uma</a:t>
-            </a:r>
-            <a:r>
-              <a:rPr lang="en-GB" sz="1600" dirty="0">
-                <a:latin typeface="Times New Roman" panose="02020603050405020304" pitchFamily="18" charset="0"/>
-                <a:cs typeface="Times New Roman" panose="02020603050405020304" pitchFamily="18" charset="0"/>
-              </a:rPr>
-              <a:t> </a:t>
-            </a:r>
-            <a:r>
-              <a:rPr lang="en-GB" sz="1600" dirty="0" err="1">
-                <a:latin typeface="Times New Roman" panose="02020603050405020304" pitchFamily="18" charset="0"/>
-                <a:cs typeface="Times New Roman" panose="02020603050405020304" pitchFamily="18" charset="0"/>
-              </a:rPr>
-              <a:t>lista</a:t>
-            </a:r>
-            <a:r>
-              <a:rPr lang="en-GB" sz="1600" dirty="0">
-                <a:latin typeface="Times New Roman" panose="02020603050405020304" pitchFamily="18" charset="0"/>
-                <a:cs typeface="Times New Roman" panose="02020603050405020304" pitchFamily="18" charset="0"/>
-              </a:rPr>
-              <a:t> das </a:t>
-            </a:r>
-            <a:r>
-              <a:rPr lang="en-GB" sz="1600" dirty="0" err="1">
-                <a:latin typeface="Times New Roman" panose="02020603050405020304" pitchFamily="18" charset="0"/>
-                <a:cs typeface="Times New Roman" panose="02020603050405020304" pitchFamily="18" charset="0"/>
-              </a:rPr>
-              <a:t>diversas</a:t>
-            </a:r>
-            <a:r>
-              <a:rPr lang="en-GB" sz="1600" dirty="0">
-                <a:latin typeface="Times New Roman" panose="02020603050405020304" pitchFamily="18" charset="0"/>
-                <a:cs typeface="Times New Roman" panose="02020603050405020304" pitchFamily="18" charset="0"/>
-              </a:rPr>
-              <a:t> </a:t>
-            </a:r>
-            <a:r>
-              <a:rPr lang="en-GB" sz="1600" dirty="0" err="1">
-                <a:latin typeface="Times New Roman" panose="02020603050405020304" pitchFamily="18" charset="0"/>
-                <a:cs typeface="Times New Roman" panose="02020603050405020304" pitchFamily="18" charset="0"/>
-              </a:rPr>
-              <a:t>campanhas</a:t>
-            </a:r>
-            <a:r>
-              <a:rPr lang="en-GB" sz="1600" dirty="0">
-                <a:latin typeface="Times New Roman" panose="02020603050405020304" pitchFamily="18" charset="0"/>
-                <a:cs typeface="Times New Roman" panose="02020603050405020304" pitchFamily="18" charset="0"/>
-              </a:rPr>
-              <a:t>, </a:t>
-            </a:r>
-            <a:r>
-              <a:rPr lang="en-GB" sz="1600" dirty="0" err="1">
-                <a:latin typeface="Times New Roman" panose="02020603050405020304" pitchFamily="18" charset="0"/>
-                <a:cs typeface="Times New Roman" panose="02020603050405020304" pitchFamily="18" charset="0"/>
-              </a:rPr>
-              <a:t>número</a:t>
-            </a:r>
-            <a:r>
-              <a:rPr lang="en-GB" sz="1600" dirty="0">
-                <a:latin typeface="Times New Roman" panose="02020603050405020304" pitchFamily="18" charset="0"/>
-                <a:cs typeface="Times New Roman" panose="02020603050405020304" pitchFamily="18" charset="0"/>
-              </a:rPr>
-              <a:t> de </a:t>
-            </a:r>
-            <a:r>
-              <a:rPr lang="en-GB" sz="1600" dirty="0" err="1">
-                <a:latin typeface="Times New Roman" panose="02020603050405020304" pitchFamily="18" charset="0"/>
-                <a:cs typeface="Times New Roman" panose="02020603050405020304" pitchFamily="18" charset="0"/>
-              </a:rPr>
-              <a:t>cupões</a:t>
-            </a:r>
-            <a:r>
-              <a:rPr lang="en-GB" sz="1600" dirty="0">
-                <a:latin typeface="Times New Roman" panose="02020603050405020304" pitchFamily="18" charset="0"/>
-                <a:cs typeface="Times New Roman" panose="02020603050405020304" pitchFamily="18" charset="0"/>
-              </a:rPr>
-              <a:t> </a:t>
-            </a:r>
-            <a:r>
-              <a:rPr lang="en-GB" sz="1600" dirty="0" err="1">
-                <a:latin typeface="Times New Roman" panose="02020603050405020304" pitchFamily="18" charset="0"/>
-                <a:cs typeface="Times New Roman" panose="02020603050405020304" pitchFamily="18" charset="0"/>
-              </a:rPr>
-              <a:t>emitidos</a:t>
-            </a:r>
-            <a:r>
-              <a:rPr lang="en-GB" sz="1600" dirty="0">
-                <a:latin typeface="Times New Roman" panose="02020603050405020304" pitchFamily="18" charset="0"/>
-                <a:cs typeface="Times New Roman" panose="02020603050405020304" pitchFamily="18" charset="0"/>
-              </a:rPr>
-              <a:t> e </a:t>
-            </a:r>
-            <a:r>
-              <a:rPr lang="en-GB" sz="1600" dirty="0" err="1">
-                <a:latin typeface="Times New Roman" panose="02020603050405020304" pitchFamily="18" charset="0"/>
-                <a:cs typeface="Times New Roman" panose="02020603050405020304" pitchFamily="18" charset="0"/>
-              </a:rPr>
-              <a:t>utilizados</a:t>
-            </a:r>
-            <a:r>
-              <a:rPr lang="en-GB" sz="1600" dirty="0">
-                <a:latin typeface="Times New Roman" panose="02020603050405020304" pitchFamily="18" charset="0"/>
-                <a:cs typeface="Times New Roman" panose="02020603050405020304" pitchFamily="18" charset="0"/>
-              </a:rPr>
-              <a:t>, </a:t>
-            </a:r>
-            <a:r>
-              <a:rPr lang="en-GB" sz="1600" dirty="0" err="1">
-                <a:latin typeface="Times New Roman" panose="02020603050405020304" pitchFamily="18" charset="0"/>
-                <a:cs typeface="Times New Roman" panose="02020603050405020304" pitchFamily="18" charset="0"/>
-              </a:rPr>
-              <a:t>bem</a:t>
-            </a:r>
-            <a:r>
-              <a:rPr lang="en-GB" sz="1600" dirty="0">
-                <a:latin typeface="Times New Roman" panose="02020603050405020304" pitchFamily="18" charset="0"/>
-                <a:cs typeface="Times New Roman" panose="02020603050405020304" pitchFamily="18" charset="0"/>
-              </a:rPr>
-              <a:t> </a:t>
-            </a:r>
-            <a:r>
-              <a:rPr lang="en-GB" sz="1600" dirty="0" err="1">
-                <a:latin typeface="Times New Roman" panose="02020603050405020304" pitchFamily="18" charset="0"/>
-                <a:cs typeface="Times New Roman" panose="02020603050405020304" pitchFamily="18" charset="0"/>
-              </a:rPr>
-              <a:t>como</a:t>
-            </a:r>
-            <a:r>
-              <a:rPr lang="en-GB" sz="1600" dirty="0">
-                <a:latin typeface="Times New Roman" panose="02020603050405020304" pitchFamily="18" charset="0"/>
-                <a:cs typeface="Times New Roman" panose="02020603050405020304" pitchFamily="18" charset="0"/>
-              </a:rPr>
-              <a:t> o </a:t>
-            </a:r>
-            <a:r>
-              <a:rPr lang="en-GB" sz="1600" dirty="0" err="1">
-                <a:latin typeface="Times New Roman" panose="02020603050405020304" pitchFamily="18" charset="0"/>
-                <a:cs typeface="Times New Roman" panose="02020603050405020304" pitchFamily="18" charset="0"/>
-              </a:rPr>
-              <a:t>valor</a:t>
-            </a:r>
-            <a:r>
-              <a:rPr lang="en-GB" sz="1600" dirty="0">
-                <a:latin typeface="Times New Roman" panose="02020603050405020304" pitchFamily="18" charset="0"/>
-                <a:cs typeface="Times New Roman" panose="02020603050405020304" pitchFamily="18" charset="0"/>
-              </a:rPr>
-              <a:t> total dos </a:t>
-            </a:r>
-            <a:r>
-              <a:rPr lang="en-GB" sz="1600" dirty="0" err="1">
-                <a:latin typeface="Times New Roman" panose="02020603050405020304" pitchFamily="18" charset="0"/>
-                <a:cs typeface="Times New Roman" panose="02020603050405020304" pitchFamily="18" charset="0"/>
-              </a:rPr>
-              <a:t>descontos</a:t>
-            </a:r>
-            <a:r>
-              <a:rPr lang="en-GB" sz="1600" dirty="0">
-                <a:latin typeface="Times New Roman" panose="02020603050405020304" pitchFamily="18" charset="0"/>
-                <a:cs typeface="Times New Roman" panose="02020603050405020304" pitchFamily="18" charset="0"/>
-              </a:rPr>
-              <a:t> </a:t>
-            </a:r>
-            <a:r>
-              <a:rPr lang="en-GB" sz="1600" dirty="0" err="1">
-                <a:latin typeface="Times New Roman" panose="02020603050405020304" pitchFamily="18" charset="0"/>
-                <a:cs typeface="Times New Roman" panose="02020603050405020304" pitchFamily="18" charset="0"/>
-              </a:rPr>
-              <a:t>aplicados</a:t>
-            </a:r>
-            <a:r>
-              <a:rPr lang="en-GB" sz="1600" dirty="0">
-                <a:latin typeface="Times New Roman" panose="02020603050405020304" pitchFamily="18" charset="0"/>
-                <a:cs typeface="Times New Roman" panose="02020603050405020304" pitchFamily="18" charset="0"/>
-              </a:rPr>
-              <a:t>. </a:t>
-            </a:r>
-          </a:p>
-          <a:p>
-            <a:r>
-              <a:rPr lang="en-GB" sz="1600" dirty="0" err="1">
-                <a:latin typeface="Times New Roman" panose="02020603050405020304" pitchFamily="18" charset="0"/>
-                <a:cs typeface="Times New Roman" panose="02020603050405020304" pitchFamily="18" charset="0"/>
-              </a:rPr>
-              <a:t>Filtros</a:t>
-            </a:r>
-            <a:r>
-              <a:rPr lang="en-GB" sz="1600" dirty="0">
-                <a:latin typeface="Times New Roman" panose="02020603050405020304" pitchFamily="18" charset="0"/>
-                <a:cs typeface="Times New Roman" panose="02020603050405020304" pitchFamily="18" charset="0"/>
-              </a:rPr>
-              <a:t> de </a:t>
-            </a:r>
-            <a:r>
-              <a:rPr lang="en-GB" sz="1600" dirty="0" err="1">
-                <a:latin typeface="Times New Roman" panose="02020603050405020304" pitchFamily="18" charset="0"/>
-                <a:cs typeface="Times New Roman" panose="02020603050405020304" pitchFamily="18" charset="0"/>
-              </a:rPr>
-              <a:t>pesquisa</a:t>
-            </a:r>
-            <a:r>
-              <a:rPr lang="en-GB" sz="1600" dirty="0">
-                <a:latin typeface="Times New Roman" panose="02020603050405020304" pitchFamily="18" charset="0"/>
-                <a:cs typeface="Times New Roman" panose="02020603050405020304" pitchFamily="18" charset="0"/>
-              </a:rPr>
-              <a:t>: O </a:t>
-            </a:r>
-            <a:r>
-              <a:rPr lang="en-GB" sz="1600" dirty="0" err="1">
-                <a:latin typeface="Times New Roman" panose="02020603050405020304" pitchFamily="18" charset="0"/>
-                <a:cs typeface="Times New Roman" panose="02020603050405020304" pitchFamily="18" charset="0"/>
-              </a:rPr>
-              <a:t>utilizador</a:t>
-            </a:r>
-            <a:r>
-              <a:rPr lang="en-GB" sz="1600" dirty="0">
-                <a:latin typeface="Times New Roman" panose="02020603050405020304" pitchFamily="18" charset="0"/>
-                <a:cs typeface="Times New Roman" panose="02020603050405020304" pitchFamily="18" charset="0"/>
-              </a:rPr>
-              <a:t> </a:t>
-            </a:r>
-            <a:r>
-              <a:rPr lang="en-GB" sz="1600" dirty="0" err="1">
-                <a:latin typeface="Times New Roman" panose="02020603050405020304" pitchFamily="18" charset="0"/>
-                <a:cs typeface="Times New Roman" panose="02020603050405020304" pitchFamily="18" charset="0"/>
-              </a:rPr>
-              <a:t>pode</a:t>
-            </a:r>
-            <a:r>
-              <a:rPr lang="en-GB" sz="1600" dirty="0">
-                <a:latin typeface="Times New Roman" panose="02020603050405020304" pitchFamily="18" charset="0"/>
-                <a:cs typeface="Times New Roman" panose="02020603050405020304" pitchFamily="18" charset="0"/>
-              </a:rPr>
-              <a:t> </a:t>
-            </a:r>
-            <a:r>
-              <a:rPr lang="en-GB" sz="1600" dirty="0" err="1">
-                <a:latin typeface="Times New Roman" panose="02020603050405020304" pitchFamily="18" charset="0"/>
-                <a:cs typeface="Times New Roman" panose="02020603050405020304" pitchFamily="18" charset="0"/>
-              </a:rPr>
-              <a:t>pesquisar</a:t>
-            </a:r>
-            <a:r>
-              <a:rPr lang="en-GB" sz="1600" dirty="0">
-                <a:latin typeface="Times New Roman" panose="02020603050405020304" pitchFamily="18" charset="0"/>
-                <a:cs typeface="Times New Roman" panose="02020603050405020304" pitchFamily="18" charset="0"/>
-              </a:rPr>
-              <a:t> </a:t>
-            </a:r>
-            <a:r>
-              <a:rPr lang="en-GB" sz="1600" dirty="0" err="1">
-                <a:latin typeface="Times New Roman" panose="02020603050405020304" pitchFamily="18" charset="0"/>
-                <a:cs typeface="Times New Roman" panose="02020603050405020304" pitchFamily="18" charset="0"/>
-              </a:rPr>
-              <a:t>produtos</a:t>
-            </a:r>
-            <a:r>
-              <a:rPr lang="en-GB" sz="1600" dirty="0">
-                <a:latin typeface="Times New Roman" panose="02020603050405020304" pitchFamily="18" charset="0"/>
-                <a:cs typeface="Times New Roman" panose="02020603050405020304" pitchFamily="18" charset="0"/>
-              </a:rPr>
-              <a:t> por </a:t>
-            </a:r>
-            <a:r>
-              <a:rPr lang="en-GB" sz="1600" dirty="0" err="1">
-                <a:latin typeface="Times New Roman" panose="02020603050405020304" pitchFamily="18" charset="0"/>
-                <a:cs typeface="Times New Roman" panose="02020603050405020304" pitchFamily="18" charset="0"/>
-              </a:rPr>
-              <a:t>filtros</a:t>
-            </a:r>
-            <a:r>
-              <a:rPr lang="en-GB" sz="1600" dirty="0">
-                <a:latin typeface="Times New Roman" panose="02020603050405020304" pitchFamily="18" charset="0"/>
-                <a:cs typeface="Times New Roman" panose="02020603050405020304" pitchFamily="18" charset="0"/>
-              </a:rPr>
-              <a:t>, </a:t>
-            </a:r>
-            <a:r>
-              <a:rPr lang="en-GB" sz="1600" dirty="0" err="1">
-                <a:latin typeface="Times New Roman" panose="02020603050405020304" pitchFamily="18" charset="0"/>
-                <a:cs typeface="Times New Roman" panose="02020603050405020304" pitchFamily="18" charset="0"/>
-              </a:rPr>
-              <a:t>ou</a:t>
-            </a:r>
-            <a:r>
-              <a:rPr lang="en-GB" sz="1600" dirty="0">
-                <a:latin typeface="Times New Roman" panose="02020603050405020304" pitchFamily="18" charset="0"/>
-                <a:cs typeface="Times New Roman" panose="02020603050405020304" pitchFamily="18" charset="0"/>
-              </a:rPr>
-              <a:t> </a:t>
-            </a:r>
-            <a:r>
-              <a:rPr lang="en-GB" sz="1600" dirty="0" err="1">
-                <a:latin typeface="Times New Roman" panose="02020603050405020304" pitchFamily="18" charset="0"/>
-                <a:cs typeface="Times New Roman" panose="02020603050405020304" pitchFamily="18" charset="0"/>
-              </a:rPr>
-              <a:t>seja</a:t>
-            </a:r>
-            <a:r>
-              <a:rPr lang="en-GB" sz="1600" dirty="0">
-                <a:latin typeface="Times New Roman" panose="02020603050405020304" pitchFamily="18" charset="0"/>
-                <a:cs typeface="Times New Roman" panose="02020603050405020304" pitchFamily="18" charset="0"/>
-              </a:rPr>
-              <a:t>, </a:t>
-            </a:r>
-            <a:r>
-              <a:rPr lang="en-GB" sz="1600" dirty="0" err="1">
-                <a:latin typeface="Times New Roman" panose="02020603050405020304" pitchFamily="18" charset="0"/>
-                <a:cs typeface="Times New Roman" panose="02020603050405020304" pitchFamily="18" charset="0"/>
-              </a:rPr>
-              <a:t>características</a:t>
-            </a:r>
-            <a:r>
-              <a:rPr lang="en-GB" sz="1600" dirty="0">
-                <a:latin typeface="Times New Roman" panose="02020603050405020304" pitchFamily="18" charset="0"/>
-                <a:cs typeface="Times New Roman" panose="02020603050405020304" pitchFamily="18" charset="0"/>
-              </a:rPr>
-              <a:t> </a:t>
-            </a:r>
-            <a:r>
-              <a:rPr lang="en-GB" sz="1600" dirty="0" err="1">
-                <a:latin typeface="Times New Roman" panose="02020603050405020304" pitchFamily="18" charset="0"/>
-                <a:cs typeface="Times New Roman" panose="02020603050405020304" pitchFamily="18" charset="0"/>
-              </a:rPr>
-              <a:t>associadas</a:t>
-            </a:r>
-            <a:r>
-              <a:rPr lang="en-GB" sz="1600" dirty="0">
-                <a:latin typeface="Times New Roman" panose="02020603050405020304" pitchFamily="18" charset="0"/>
-                <a:cs typeface="Times New Roman" panose="02020603050405020304" pitchFamily="18" charset="0"/>
-              </a:rPr>
-              <a:t> a </a:t>
-            </a:r>
-            <a:r>
-              <a:rPr lang="en-GB" sz="1600" dirty="0" err="1">
-                <a:latin typeface="Times New Roman" panose="02020603050405020304" pitchFamily="18" charset="0"/>
-                <a:cs typeface="Times New Roman" panose="02020603050405020304" pitchFamily="18" charset="0"/>
-              </a:rPr>
-              <a:t>produtos</a:t>
-            </a:r>
-            <a:r>
-              <a:rPr lang="en-GB" sz="1600" dirty="0">
-                <a:latin typeface="Times New Roman" panose="02020603050405020304" pitchFamily="18" charset="0"/>
-                <a:cs typeface="Times New Roman" panose="02020603050405020304" pitchFamily="18" charset="0"/>
-              </a:rPr>
-              <a:t>.</a:t>
-            </a:r>
-          </a:p>
-          <a:p>
-            <a:r>
-              <a:rPr lang="en-GB" sz="1600" dirty="0" err="1">
-                <a:latin typeface="Times New Roman" panose="02020603050405020304" pitchFamily="18" charset="0"/>
-                <a:cs typeface="Times New Roman" panose="02020603050405020304" pitchFamily="18" charset="0"/>
-              </a:rPr>
-              <a:t>Comparação</a:t>
-            </a:r>
-            <a:r>
-              <a:rPr lang="en-GB" sz="1600" dirty="0">
-                <a:latin typeface="Times New Roman" panose="02020603050405020304" pitchFamily="18" charset="0"/>
-                <a:cs typeface="Times New Roman" panose="02020603050405020304" pitchFamily="18" charset="0"/>
-              </a:rPr>
-              <a:t> de </a:t>
-            </a:r>
-            <a:r>
-              <a:rPr lang="en-GB" sz="1600" dirty="0" err="1">
-                <a:latin typeface="Times New Roman" panose="02020603050405020304" pitchFamily="18" charset="0"/>
-                <a:cs typeface="Times New Roman" panose="02020603050405020304" pitchFamily="18" charset="0"/>
-              </a:rPr>
-              <a:t>produtor</a:t>
-            </a:r>
-            <a:r>
-              <a:rPr lang="en-GB" sz="1600" dirty="0">
-                <a:latin typeface="Times New Roman" panose="02020603050405020304" pitchFamily="18" charset="0"/>
-                <a:cs typeface="Times New Roman" panose="02020603050405020304" pitchFamily="18" charset="0"/>
-              </a:rPr>
-              <a:t>: </a:t>
-            </a:r>
-            <a:r>
-              <a:rPr lang="en-GB" sz="1600" dirty="0" err="1">
-                <a:latin typeface="Times New Roman" panose="02020603050405020304" pitchFamily="18" charset="0"/>
-                <a:cs typeface="Times New Roman" panose="02020603050405020304" pitchFamily="18" charset="0"/>
-              </a:rPr>
-              <a:t>Comparação</a:t>
-            </a:r>
-            <a:r>
-              <a:rPr lang="en-GB" sz="1600" dirty="0">
-                <a:latin typeface="Times New Roman" panose="02020603050405020304" pitchFamily="18" charset="0"/>
-                <a:cs typeface="Times New Roman" panose="02020603050405020304" pitchFamily="18" charset="0"/>
-              </a:rPr>
-              <a:t> de </a:t>
-            </a:r>
-            <a:r>
-              <a:rPr lang="en-GB" sz="1600" dirty="0" err="1">
-                <a:latin typeface="Times New Roman" panose="02020603050405020304" pitchFamily="18" charset="0"/>
-                <a:cs typeface="Times New Roman" panose="02020603050405020304" pitchFamily="18" charset="0"/>
-              </a:rPr>
-              <a:t>preços</a:t>
-            </a:r>
-            <a:r>
-              <a:rPr lang="en-GB" sz="1600" dirty="0">
-                <a:latin typeface="Times New Roman" panose="02020603050405020304" pitchFamily="18" charset="0"/>
-                <a:cs typeface="Times New Roman" panose="02020603050405020304" pitchFamily="18" charset="0"/>
-              </a:rPr>
-              <a:t>, ratings, etc. entre </a:t>
-            </a:r>
-            <a:r>
-              <a:rPr lang="en-GB" sz="1600" dirty="0" err="1">
-                <a:latin typeface="Times New Roman" panose="02020603050405020304" pitchFamily="18" charset="0"/>
-                <a:cs typeface="Times New Roman" panose="02020603050405020304" pitchFamily="18" charset="0"/>
-              </a:rPr>
-              <a:t>produtos</a:t>
-            </a:r>
-            <a:r>
-              <a:rPr lang="en-GB" sz="1600" dirty="0">
-                <a:latin typeface="Times New Roman" panose="02020603050405020304" pitchFamily="18" charset="0"/>
-                <a:cs typeface="Times New Roman" panose="02020603050405020304" pitchFamily="18" charset="0"/>
-              </a:rPr>
-              <a:t>.</a:t>
             </a:r>
           </a:p>
           <a:p>
@@ -7553,7 +7519,7 @@
           <p:cNvPr id="2" name="Title 1">
             <a:extLst>
               <a:ext uri="{FF2B5EF4-FFF2-40B4-BE49-F238E27FC236}">
-                <a16:creationId xmlns:a16="http://schemas.microsoft.com/office/drawing/2014/main" id="{BEC2627F-D56F-DE42-9ECB-7811C7348BAC}"/>
+                <a16:creationId xmlns:a16="http://schemas.microsoft.com/office/drawing/2014/main" id="{469EEA79-8FF7-DB93-AF4D-8B15D8057B9B}"/>
               </a:ext>
             </a:extLst>
           </p:cNvPr>
@@ -7574,8 +7540,9 @@
                 <a:latin typeface="Times New Roman" panose="02020603050405020304" pitchFamily="18" charset="0"/>
                 <a:cs typeface="Times New Roman" panose="02020603050405020304" pitchFamily="18" charset="0"/>
               </a:rPr>
-              <a:t>Histórico de Compras</a:t>
-            </a:r>
+              <a:t>Principais Operações</a:t>
+            </a:r>
+            <a:endParaRPr lang="pt-PT" dirty="0"/>
           </a:p>
         </p:txBody>
       </p:sp>
@@ -7584,7 +7551,7 @@
           <p:cNvPr id="3" name="Content Placeholder 2">
             <a:extLst>
               <a:ext uri="{FF2B5EF4-FFF2-40B4-BE49-F238E27FC236}">
-                <a16:creationId xmlns:a16="http://schemas.microsoft.com/office/drawing/2014/main" id="{A93045B5-1F72-984C-9C34-A244C1486E24}"/>
+                <a16:creationId xmlns:a16="http://schemas.microsoft.com/office/drawing/2014/main" id="{AEBE1E92-4670-7522-FD54-F4353D81800E}"/>
               </a:ext>
             </a:extLst>
           </p:cNvPr>
@@ -7601,45 +7568,699 @@
           <a:lstStyle/>
           <a:p>
             <a:r>
+              <a:rPr lang="en-GB" dirty="0" err="1">
+                <a:latin typeface="Times New Roman" panose="02020603050405020304" pitchFamily="18" charset="0"/>
+                <a:cs typeface="Times New Roman" panose="02020603050405020304" pitchFamily="18" charset="0"/>
+              </a:rPr>
+              <a:t>Obter</a:t>
+            </a:r>
+            <a:r>
+              <a:rPr lang="en-GB" dirty="0">
+                <a:latin typeface="Times New Roman" panose="02020603050405020304" pitchFamily="18" charset="0"/>
+                <a:cs typeface="Times New Roman" panose="02020603050405020304" pitchFamily="18" charset="0"/>
+              </a:rPr>
+              <a:t> </a:t>
+            </a:r>
+            <a:r>
+              <a:rPr lang="en-GB" dirty="0" err="1">
+                <a:latin typeface="Times New Roman" panose="02020603050405020304" pitchFamily="18" charset="0"/>
+                <a:cs typeface="Times New Roman" panose="02020603050405020304" pitchFamily="18" charset="0"/>
+              </a:rPr>
+              <a:t>estatísticas</a:t>
+            </a:r>
+            <a:r>
+              <a:rPr lang="en-GB" dirty="0">
+                <a:latin typeface="Times New Roman" panose="02020603050405020304" pitchFamily="18" charset="0"/>
+                <a:cs typeface="Times New Roman" panose="02020603050405020304" pitchFamily="18" charset="0"/>
+              </a:rPr>
+              <a:t> dos </a:t>
+            </a:r>
+            <a:r>
+              <a:rPr lang="en-GB" dirty="0" err="1">
+                <a:latin typeface="Times New Roman" panose="02020603050405020304" pitchFamily="18" charset="0"/>
+                <a:cs typeface="Times New Roman" panose="02020603050405020304" pitchFamily="18" charset="0"/>
+              </a:rPr>
+              <a:t>descontos</a:t>
+            </a:r>
+            <a:r>
+              <a:rPr lang="en-GB" dirty="0">
+                <a:latin typeface="Times New Roman" panose="02020603050405020304" pitchFamily="18" charset="0"/>
+                <a:cs typeface="Times New Roman" panose="02020603050405020304" pitchFamily="18" charset="0"/>
+              </a:rPr>
+              <a:t> </a:t>
+            </a:r>
+            <a:r>
+              <a:rPr lang="en-GB" dirty="0" err="1">
+                <a:latin typeface="Times New Roman" panose="02020603050405020304" pitchFamily="18" charset="0"/>
+                <a:cs typeface="Times New Roman" panose="02020603050405020304" pitchFamily="18" charset="0"/>
+              </a:rPr>
+              <a:t>aplicados</a:t>
+            </a:r>
+            <a:r>
+              <a:rPr lang="en-GB" dirty="0">
+                <a:latin typeface="Times New Roman" panose="02020603050405020304" pitchFamily="18" charset="0"/>
+                <a:cs typeface="Times New Roman" panose="02020603050405020304" pitchFamily="18" charset="0"/>
+              </a:rPr>
+              <a:t> </a:t>
+            </a:r>
+            <a:r>
+              <a:rPr lang="en-GB" dirty="0" err="1">
+                <a:latin typeface="Times New Roman" panose="02020603050405020304" pitchFamily="18" charset="0"/>
+                <a:cs typeface="Times New Roman" panose="02020603050405020304" pitchFamily="18" charset="0"/>
+              </a:rPr>
+              <a:t>por</a:t>
+            </a:r>
+            <a:r>
+              <a:rPr lang="en-GB" dirty="0">
+                <a:latin typeface="Times New Roman" panose="02020603050405020304" pitchFamily="18" charset="0"/>
+                <a:cs typeface="Times New Roman" panose="02020603050405020304" pitchFamily="18" charset="0"/>
+              </a:rPr>
+              <a:t> </a:t>
+            </a:r>
+            <a:r>
+              <a:rPr lang="en-GB" dirty="0" err="1">
+                <a:latin typeface="Times New Roman" panose="02020603050405020304" pitchFamily="18" charset="0"/>
+                <a:cs typeface="Times New Roman" panose="02020603050405020304" pitchFamily="18" charset="0"/>
+              </a:rPr>
+              <a:t>campanha</a:t>
+            </a:r>
+            <a:r>
+              <a:rPr lang="en-GB" dirty="0">
+                <a:latin typeface="Times New Roman" panose="02020603050405020304" pitchFamily="18" charset="0"/>
+                <a:cs typeface="Times New Roman" panose="02020603050405020304" pitchFamily="18" charset="0"/>
+              </a:rPr>
+              <a:t>: Um </a:t>
+            </a:r>
+            <a:r>
+              <a:rPr lang="en-GB" dirty="0" err="1">
+                <a:latin typeface="Times New Roman" panose="02020603050405020304" pitchFamily="18" charset="0"/>
+                <a:cs typeface="Times New Roman" panose="02020603050405020304" pitchFamily="18" charset="0"/>
+              </a:rPr>
+              <a:t>administrador</a:t>
+            </a:r>
+            <a:r>
+              <a:rPr lang="en-GB" dirty="0">
+                <a:latin typeface="Times New Roman" panose="02020603050405020304" pitchFamily="18" charset="0"/>
+                <a:cs typeface="Times New Roman" panose="02020603050405020304" pitchFamily="18" charset="0"/>
+              </a:rPr>
+              <a:t> </a:t>
+            </a:r>
+            <a:r>
+              <a:rPr lang="en-GB" dirty="0" err="1">
+                <a:latin typeface="Times New Roman" panose="02020603050405020304" pitchFamily="18" charset="0"/>
+                <a:cs typeface="Times New Roman" panose="02020603050405020304" pitchFamily="18" charset="0"/>
+              </a:rPr>
+              <a:t>consegue</a:t>
+            </a:r>
+            <a:r>
+              <a:rPr lang="en-GB" dirty="0">
+                <a:latin typeface="Times New Roman" panose="02020603050405020304" pitchFamily="18" charset="0"/>
+                <a:cs typeface="Times New Roman" panose="02020603050405020304" pitchFamily="18" charset="0"/>
+              </a:rPr>
+              <a:t> </a:t>
+            </a:r>
+            <a:r>
+              <a:rPr lang="en-GB" dirty="0" err="1">
+                <a:latin typeface="Times New Roman" panose="02020603050405020304" pitchFamily="18" charset="0"/>
+                <a:cs typeface="Times New Roman" panose="02020603050405020304" pitchFamily="18" charset="0"/>
+              </a:rPr>
+              <a:t>obter</a:t>
+            </a:r>
+            <a:r>
+              <a:rPr lang="en-GB" dirty="0">
+                <a:latin typeface="Times New Roman" panose="02020603050405020304" pitchFamily="18" charset="0"/>
+                <a:cs typeface="Times New Roman" panose="02020603050405020304" pitchFamily="18" charset="0"/>
+              </a:rPr>
+              <a:t> </a:t>
+            </a:r>
+            <a:r>
+              <a:rPr lang="en-GB" dirty="0" err="1">
+                <a:latin typeface="Times New Roman" panose="02020603050405020304" pitchFamily="18" charset="0"/>
+                <a:cs typeface="Times New Roman" panose="02020603050405020304" pitchFamily="18" charset="0"/>
+              </a:rPr>
+              <a:t>uma</a:t>
+            </a:r>
+            <a:r>
+              <a:rPr lang="en-GB" dirty="0">
+                <a:latin typeface="Times New Roman" panose="02020603050405020304" pitchFamily="18" charset="0"/>
+                <a:cs typeface="Times New Roman" panose="02020603050405020304" pitchFamily="18" charset="0"/>
+              </a:rPr>
+              <a:t> </a:t>
+            </a:r>
+            <a:r>
+              <a:rPr lang="en-GB" dirty="0" err="1">
+                <a:latin typeface="Times New Roman" panose="02020603050405020304" pitchFamily="18" charset="0"/>
+                <a:cs typeface="Times New Roman" panose="02020603050405020304" pitchFamily="18" charset="0"/>
+              </a:rPr>
+              <a:t>lista</a:t>
+            </a:r>
+            <a:r>
+              <a:rPr lang="en-GB" dirty="0">
+                <a:latin typeface="Times New Roman" panose="02020603050405020304" pitchFamily="18" charset="0"/>
+                <a:cs typeface="Times New Roman" panose="02020603050405020304" pitchFamily="18" charset="0"/>
+              </a:rPr>
+              <a:t> das </a:t>
+            </a:r>
+            <a:r>
+              <a:rPr lang="en-GB" dirty="0" err="1">
+                <a:latin typeface="Times New Roman" panose="02020603050405020304" pitchFamily="18" charset="0"/>
+                <a:cs typeface="Times New Roman" panose="02020603050405020304" pitchFamily="18" charset="0"/>
+              </a:rPr>
+              <a:t>diversas</a:t>
+            </a:r>
+            <a:r>
+              <a:rPr lang="en-GB" dirty="0">
+                <a:latin typeface="Times New Roman" panose="02020603050405020304" pitchFamily="18" charset="0"/>
+                <a:cs typeface="Times New Roman" panose="02020603050405020304" pitchFamily="18" charset="0"/>
+              </a:rPr>
+              <a:t> </a:t>
+            </a:r>
+            <a:r>
+              <a:rPr lang="en-GB" dirty="0" err="1">
+                <a:latin typeface="Times New Roman" panose="02020603050405020304" pitchFamily="18" charset="0"/>
+                <a:cs typeface="Times New Roman" panose="02020603050405020304" pitchFamily="18" charset="0"/>
+              </a:rPr>
+              <a:t>campanhas</a:t>
+            </a:r>
+            <a:r>
+              <a:rPr lang="en-GB" dirty="0">
+                <a:latin typeface="Times New Roman" panose="02020603050405020304" pitchFamily="18" charset="0"/>
+                <a:cs typeface="Times New Roman" panose="02020603050405020304" pitchFamily="18" charset="0"/>
+              </a:rPr>
+              <a:t>, </a:t>
+            </a:r>
+            <a:r>
+              <a:rPr lang="en-GB" dirty="0" err="1">
+                <a:latin typeface="Times New Roman" panose="02020603050405020304" pitchFamily="18" charset="0"/>
+                <a:cs typeface="Times New Roman" panose="02020603050405020304" pitchFamily="18" charset="0"/>
+              </a:rPr>
+              <a:t>número</a:t>
+            </a:r>
+            <a:r>
+              <a:rPr lang="en-GB" dirty="0">
+                <a:latin typeface="Times New Roman" panose="02020603050405020304" pitchFamily="18" charset="0"/>
+                <a:cs typeface="Times New Roman" panose="02020603050405020304" pitchFamily="18" charset="0"/>
+              </a:rPr>
+              <a:t> de </a:t>
+            </a:r>
+            <a:r>
+              <a:rPr lang="en-GB" dirty="0" err="1">
+                <a:latin typeface="Times New Roman" panose="02020603050405020304" pitchFamily="18" charset="0"/>
+                <a:cs typeface="Times New Roman" panose="02020603050405020304" pitchFamily="18" charset="0"/>
+              </a:rPr>
+              <a:t>cupões</a:t>
+            </a:r>
+            <a:r>
+              <a:rPr lang="en-GB" dirty="0">
+                <a:latin typeface="Times New Roman" panose="02020603050405020304" pitchFamily="18" charset="0"/>
+                <a:cs typeface="Times New Roman" panose="02020603050405020304" pitchFamily="18" charset="0"/>
+              </a:rPr>
+              <a:t> </a:t>
+            </a:r>
+            <a:r>
+              <a:rPr lang="en-GB" dirty="0" err="1">
+                <a:latin typeface="Times New Roman" panose="02020603050405020304" pitchFamily="18" charset="0"/>
+                <a:cs typeface="Times New Roman" panose="02020603050405020304" pitchFamily="18" charset="0"/>
+              </a:rPr>
+              <a:t>emitidos</a:t>
+            </a:r>
+            <a:r>
+              <a:rPr lang="en-GB" dirty="0">
+                <a:latin typeface="Times New Roman" panose="02020603050405020304" pitchFamily="18" charset="0"/>
+                <a:cs typeface="Times New Roman" panose="02020603050405020304" pitchFamily="18" charset="0"/>
+              </a:rPr>
+              <a:t> e </a:t>
+            </a:r>
+            <a:r>
+              <a:rPr lang="en-GB" dirty="0" err="1">
+                <a:latin typeface="Times New Roman" panose="02020603050405020304" pitchFamily="18" charset="0"/>
+                <a:cs typeface="Times New Roman" panose="02020603050405020304" pitchFamily="18" charset="0"/>
+              </a:rPr>
+              <a:t>utilizados</a:t>
+            </a:r>
+            <a:r>
+              <a:rPr lang="en-GB" dirty="0">
+                <a:latin typeface="Times New Roman" panose="02020603050405020304" pitchFamily="18" charset="0"/>
+                <a:cs typeface="Times New Roman" panose="02020603050405020304" pitchFamily="18" charset="0"/>
+              </a:rPr>
+              <a:t>, </a:t>
+            </a:r>
+            <a:r>
+              <a:rPr lang="en-GB" dirty="0" err="1">
+                <a:latin typeface="Times New Roman" panose="02020603050405020304" pitchFamily="18" charset="0"/>
+                <a:cs typeface="Times New Roman" panose="02020603050405020304" pitchFamily="18" charset="0"/>
+              </a:rPr>
+              <a:t>bem</a:t>
+            </a:r>
+            <a:r>
+              <a:rPr lang="en-GB" dirty="0">
+                <a:latin typeface="Times New Roman" panose="02020603050405020304" pitchFamily="18" charset="0"/>
+                <a:cs typeface="Times New Roman" panose="02020603050405020304" pitchFamily="18" charset="0"/>
+              </a:rPr>
+              <a:t> </a:t>
+            </a:r>
+            <a:r>
+              <a:rPr lang="en-GB" dirty="0" err="1">
+                <a:latin typeface="Times New Roman" panose="02020603050405020304" pitchFamily="18" charset="0"/>
+                <a:cs typeface="Times New Roman" panose="02020603050405020304" pitchFamily="18" charset="0"/>
+              </a:rPr>
+              <a:t>como</a:t>
+            </a:r>
+            <a:r>
+              <a:rPr lang="en-GB" dirty="0">
+                <a:latin typeface="Times New Roman" panose="02020603050405020304" pitchFamily="18" charset="0"/>
+                <a:cs typeface="Times New Roman" panose="02020603050405020304" pitchFamily="18" charset="0"/>
+              </a:rPr>
+              <a:t> o </a:t>
+            </a:r>
+            <a:r>
+              <a:rPr lang="en-GB" dirty="0" err="1">
+                <a:latin typeface="Times New Roman" panose="02020603050405020304" pitchFamily="18" charset="0"/>
+                <a:cs typeface="Times New Roman" panose="02020603050405020304" pitchFamily="18" charset="0"/>
+              </a:rPr>
+              <a:t>valor</a:t>
+            </a:r>
+            <a:r>
+              <a:rPr lang="en-GB" dirty="0">
+                <a:latin typeface="Times New Roman" panose="02020603050405020304" pitchFamily="18" charset="0"/>
+                <a:cs typeface="Times New Roman" panose="02020603050405020304" pitchFamily="18" charset="0"/>
+              </a:rPr>
+              <a:t> total dos </a:t>
+            </a:r>
+            <a:r>
+              <a:rPr lang="en-GB" dirty="0" err="1">
+                <a:latin typeface="Times New Roman" panose="02020603050405020304" pitchFamily="18" charset="0"/>
+                <a:cs typeface="Times New Roman" panose="02020603050405020304" pitchFamily="18" charset="0"/>
+              </a:rPr>
+              <a:t>descontos</a:t>
+            </a:r>
+            <a:r>
+              <a:rPr lang="en-GB" dirty="0">
+                <a:latin typeface="Times New Roman" panose="02020603050405020304" pitchFamily="18" charset="0"/>
+                <a:cs typeface="Times New Roman" panose="02020603050405020304" pitchFamily="18" charset="0"/>
+              </a:rPr>
+              <a:t> </a:t>
+            </a:r>
+            <a:r>
+              <a:rPr lang="en-GB" dirty="0" err="1">
+                <a:latin typeface="Times New Roman" panose="02020603050405020304" pitchFamily="18" charset="0"/>
+                <a:cs typeface="Times New Roman" panose="02020603050405020304" pitchFamily="18" charset="0"/>
+              </a:rPr>
+              <a:t>aplicados</a:t>
+            </a:r>
+            <a:r>
+              <a:rPr lang="en-GB" dirty="0">
+                <a:latin typeface="Times New Roman" panose="02020603050405020304" pitchFamily="18" charset="0"/>
+                <a:cs typeface="Times New Roman" panose="02020603050405020304" pitchFamily="18" charset="0"/>
+              </a:rPr>
+              <a:t>. </a:t>
+            </a:r>
+          </a:p>
+          <a:p>
+            <a:r>
+              <a:rPr lang="en-GB" dirty="0" err="1">
+                <a:latin typeface="Times New Roman" panose="02020603050405020304" pitchFamily="18" charset="0"/>
+                <a:cs typeface="Times New Roman" panose="02020603050405020304" pitchFamily="18" charset="0"/>
+              </a:rPr>
+              <a:t>Filtros</a:t>
+            </a:r>
+            <a:r>
+              <a:rPr lang="en-GB" dirty="0">
+                <a:latin typeface="Times New Roman" panose="02020603050405020304" pitchFamily="18" charset="0"/>
+                <a:cs typeface="Times New Roman" panose="02020603050405020304" pitchFamily="18" charset="0"/>
+              </a:rPr>
+              <a:t> de </a:t>
+            </a:r>
+            <a:r>
+              <a:rPr lang="en-GB" dirty="0" err="1">
+                <a:latin typeface="Times New Roman" panose="02020603050405020304" pitchFamily="18" charset="0"/>
+                <a:cs typeface="Times New Roman" panose="02020603050405020304" pitchFamily="18" charset="0"/>
+              </a:rPr>
+              <a:t>pesquisa</a:t>
+            </a:r>
+            <a:r>
+              <a:rPr lang="en-GB" dirty="0">
+                <a:latin typeface="Times New Roman" panose="02020603050405020304" pitchFamily="18" charset="0"/>
+                <a:cs typeface="Times New Roman" panose="02020603050405020304" pitchFamily="18" charset="0"/>
+              </a:rPr>
+              <a:t>: O </a:t>
+            </a:r>
+            <a:r>
+              <a:rPr lang="en-GB" dirty="0" err="1">
+                <a:latin typeface="Times New Roman" panose="02020603050405020304" pitchFamily="18" charset="0"/>
+                <a:cs typeface="Times New Roman" panose="02020603050405020304" pitchFamily="18" charset="0"/>
+              </a:rPr>
+              <a:t>utilizador</a:t>
+            </a:r>
+            <a:r>
+              <a:rPr lang="en-GB" dirty="0">
+                <a:latin typeface="Times New Roman" panose="02020603050405020304" pitchFamily="18" charset="0"/>
+                <a:cs typeface="Times New Roman" panose="02020603050405020304" pitchFamily="18" charset="0"/>
+              </a:rPr>
+              <a:t> </a:t>
+            </a:r>
+            <a:r>
+              <a:rPr lang="en-GB" dirty="0" err="1">
+                <a:latin typeface="Times New Roman" panose="02020603050405020304" pitchFamily="18" charset="0"/>
+                <a:cs typeface="Times New Roman" panose="02020603050405020304" pitchFamily="18" charset="0"/>
+              </a:rPr>
+              <a:t>pode</a:t>
+            </a:r>
+            <a:r>
+              <a:rPr lang="en-GB" dirty="0">
+                <a:latin typeface="Times New Roman" panose="02020603050405020304" pitchFamily="18" charset="0"/>
+                <a:cs typeface="Times New Roman" panose="02020603050405020304" pitchFamily="18" charset="0"/>
+              </a:rPr>
+              <a:t> </a:t>
+            </a:r>
+            <a:r>
+              <a:rPr lang="en-GB" dirty="0" err="1">
+                <a:latin typeface="Times New Roman" panose="02020603050405020304" pitchFamily="18" charset="0"/>
+                <a:cs typeface="Times New Roman" panose="02020603050405020304" pitchFamily="18" charset="0"/>
+              </a:rPr>
+              <a:t>pesquisar</a:t>
+            </a:r>
+            <a:r>
+              <a:rPr lang="en-GB" dirty="0">
+                <a:latin typeface="Times New Roman" panose="02020603050405020304" pitchFamily="18" charset="0"/>
+                <a:cs typeface="Times New Roman" panose="02020603050405020304" pitchFamily="18" charset="0"/>
+              </a:rPr>
+              <a:t> </a:t>
+            </a:r>
+            <a:r>
+              <a:rPr lang="en-GB" dirty="0" err="1">
+                <a:latin typeface="Times New Roman" panose="02020603050405020304" pitchFamily="18" charset="0"/>
+                <a:cs typeface="Times New Roman" panose="02020603050405020304" pitchFamily="18" charset="0"/>
+              </a:rPr>
+              <a:t>produtos</a:t>
+            </a:r>
+            <a:r>
+              <a:rPr lang="en-GB" dirty="0">
+                <a:latin typeface="Times New Roman" panose="02020603050405020304" pitchFamily="18" charset="0"/>
+                <a:cs typeface="Times New Roman" panose="02020603050405020304" pitchFamily="18" charset="0"/>
+              </a:rPr>
+              <a:t> </a:t>
+            </a:r>
+            <a:r>
+              <a:rPr lang="en-GB" dirty="0" err="1">
+                <a:latin typeface="Times New Roman" panose="02020603050405020304" pitchFamily="18" charset="0"/>
+                <a:cs typeface="Times New Roman" panose="02020603050405020304" pitchFamily="18" charset="0"/>
+              </a:rPr>
+              <a:t>por</a:t>
+            </a:r>
+            <a:r>
+              <a:rPr lang="en-GB" dirty="0">
+                <a:latin typeface="Times New Roman" panose="02020603050405020304" pitchFamily="18" charset="0"/>
+                <a:cs typeface="Times New Roman" panose="02020603050405020304" pitchFamily="18" charset="0"/>
+              </a:rPr>
+              <a:t> </a:t>
+            </a:r>
+            <a:r>
+              <a:rPr lang="en-GB" dirty="0" err="1">
+                <a:latin typeface="Times New Roman" panose="02020603050405020304" pitchFamily="18" charset="0"/>
+                <a:cs typeface="Times New Roman" panose="02020603050405020304" pitchFamily="18" charset="0"/>
+              </a:rPr>
+              <a:t>filtros</a:t>
+            </a:r>
+            <a:r>
+              <a:rPr lang="en-GB" dirty="0">
+                <a:latin typeface="Times New Roman" panose="02020603050405020304" pitchFamily="18" charset="0"/>
+                <a:cs typeface="Times New Roman" panose="02020603050405020304" pitchFamily="18" charset="0"/>
+              </a:rPr>
+              <a:t>, </a:t>
+            </a:r>
+            <a:r>
+              <a:rPr lang="en-GB" dirty="0" err="1">
+                <a:latin typeface="Times New Roman" panose="02020603050405020304" pitchFamily="18" charset="0"/>
+                <a:cs typeface="Times New Roman" panose="02020603050405020304" pitchFamily="18" charset="0"/>
+              </a:rPr>
+              <a:t>mais</a:t>
+            </a:r>
+            <a:r>
+              <a:rPr lang="en-GB" dirty="0">
+                <a:latin typeface="Times New Roman" panose="02020603050405020304" pitchFamily="18" charset="0"/>
+                <a:cs typeface="Times New Roman" panose="02020603050405020304" pitchFamily="18" charset="0"/>
+              </a:rPr>
+              <a:t> </a:t>
+            </a:r>
+            <a:r>
+              <a:rPr lang="en-GB" dirty="0" err="1">
+                <a:latin typeface="Times New Roman" panose="02020603050405020304" pitchFamily="18" charset="0"/>
+                <a:cs typeface="Times New Roman" panose="02020603050405020304" pitchFamily="18" charset="0"/>
+              </a:rPr>
+              <a:t>especificamente</a:t>
+            </a:r>
+            <a:r>
+              <a:rPr lang="en-GB" dirty="0">
+                <a:latin typeface="Times New Roman" panose="02020603050405020304" pitchFamily="18" charset="0"/>
+                <a:cs typeface="Times New Roman" panose="02020603050405020304" pitchFamily="18" charset="0"/>
+              </a:rPr>
+              <a:t>, </a:t>
+            </a:r>
+            <a:r>
+              <a:rPr lang="en-GB" dirty="0" err="1">
+                <a:latin typeface="Times New Roman" panose="02020603050405020304" pitchFamily="18" charset="0"/>
+                <a:cs typeface="Times New Roman" panose="02020603050405020304" pitchFamily="18" charset="0"/>
+              </a:rPr>
+              <a:t>pode</a:t>
+            </a:r>
+            <a:r>
+              <a:rPr lang="en-GB" dirty="0">
+                <a:latin typeface="Times New Roman" panose="02020603050405020304" pitchFamily="18" charset="0"/>
+                <a:cs typeface="Times New Roman" panose="02020603050405020304" pitchFamily="18" charset="0"/>
+              </a:rPr>
+              <a:t> </a:t>
+            </a:r>
+            <a:r>
+              <a:rPr lang="en-GB" dirty="0" err="1">
+                <a:latin typeface="Times New Roman" panose="02020603050405020304" pitchFamily="18" charset="0"/>
+                <a:cs typeface="Times New Roman" panose="02020603050405020304" pitchFamily="18" charset="0"/>
+              </a:rPr>
+              <a:t>escolher</a:t>
+            </a:r>
+            <a:r>
+              <a:rPr lang="en-GB" dirty="0">
+                <a:latin typeface="Times New Roman" panose="02020603050405020304" pitchFamily="18" charset="0"/>
+                <a:cs typeface="Times New Roman" panose="02020603050405020304" pitchFamily="18" charset="0"/>
+              </a:rPr>
+              <a:t> o </a:t>
+            </a:r>
+            <a:r>
+              <a:rPr lang="en-GB" dirty="0" err="1">
+                <a:latin typeface="Times New Roman" panose="02020603050405020304" pitchFamily="18" charset="0"/>
+                <a:cs typeface="Times New Roman" panose="02020603050405020304" pitchFamily="18" charset="0"/>
+              </a:rPr>
+              <a:t>tipo</a:t>
+            </a:r>
+            <a:r>
+              <a:rPr lang="en-GB" dirty="0">
+                <a:latin typeface="Times New Roman" panose="02020603050405020304" pitchFamily="18" charset="0"/>
+                <a:cs typeface="Times New Roman" panose="02020603050405020304" pitchFamily="18" charset="0"/>
+              </a:rPr>
+              <a:t> de </a:t>
+            </a:r>
+            <a:r>
+              <a:rPr lang="en-GB" dirty="0" err="1">
+                <a:latin typeface="Times New Roman" panose="02020603050405020304" pitchFamily="18" charset="0"/>
+                <a:cs typeface="Times New Roman" panose="02020603050405020304" pitchFamily="18" charset="0"/>
+              </a:rPr>
+              <a:t>produto</a:t>
+            </a:r>
+            <a:r>
+              <a:rPr lang="en-GB" dirty="0">
+                <a:latin typeface="Times New Roman" panose="02020603050405020304" pitchFamily="18" charset="0"/>
+                <a:cs typeface="Times New Roman" panose="02020603050405020304" pitchFamily="18" charset="0"/>
+              </a:rPr>
+              <a:t> que </a:t>
+            </a:r>
+            <a:r>
+              <a:rPr lang="en-GB" dirty="0" err="1">
+                <a:latin typeface="Times New Roman" panose="02020603050405020304" pitchFamily="18" charset="0"/>
+                <a:cs typeface="Times New Roman" panose="02020603050405020304" pitchFamily="18" charset="0"/>
+              </a:rPr>
+              <a:t>quer</a:t>
+            </a:r>
+            <a:r>
+              <a:rPr lang="en-GB" dirty="0">
+                <a:latin typeface="Times New Roman" panose="02020603050405020304" pitchFamily="18" charset="0"/>
+                <a:cs typeface="Times New Roman" panose="02020603050405020304" pitchFamily="18" charset="0"/>
+              </a:rPr>
+              <a:t> ver.</a:t>
+            </a:r>
+          </a:p>
+          <a:p>
+            <a:r>
+              <a:rPr lang="en-GB" dirty="0" err="1">
+                <a:latin typeface="Times New Roman" panose="02020603050405020304" pitchFamily="18" charset="0"/>
+                <a:cs typeface="Times New Roman" panose="02020603050405020304" pitchFamily="18" charset="0"/>
+              </a:rPr>
+              <a:t>Comparação</a:t>
+            </a:r>
+            <a:r>
+              <a:rPr lang="en-GB" dirty="0">
+                <a:latin typeface="Times New Roman" panose="02020603050405020304" pitchFamily="18" charset="0"/>
+                <a:cs typeface="Times New Roman" panose="02020603050405020304" pitchFamily="18" charset="0"/>
+              </a:rPr>
+              <a:t> de </a:t>
+            </a:r>
+            <a:r>
+              <a:rPr lang="en-GB" dirty="0" err="1">
+                <a:latin typeface="Times New Roman" panose="02020603050405020304" pitchFamily="18" charset="0"/>
+                <a:cs typeface="Times New Roman" panose="02020603050405020304" pitchFamily="18" charset="0"/>
+              </a:rPr>
+              <a:t>produtos</a:t>
+            </a:r>
+            <a:r>
+              <a:rPr lang="en-GB" dirty="0">
+                <a:latin typeface="Times New Roman" panose="02020603050405020304" pitchFamily="18" charset="0"/>
+                <a:cs typeface="Times New Roman" panose="02020603050405020304" pitchFamily="18" charset="0"/>
+              </a:rPr>
+              <a:t>: O comprador </a:t>
+            </a:r>
+            <a:r>
+              <a:rPr lang="en-GB" dirty="0" err="1">
+                <a:latin typeface="Times New Roman" panose="02020603050405020304" pitchFamily="18" charset="0"/>
+                <a:cs typeface="Times New Roman" panose="02020603050405020304" pitchFamily="18" charset="0"/>
+              </a:rPr>
+              <a:t>pode</a:t>
+            </a:r>
+            <a:r>
+              <a:rPr lang="en-GB" dirty="0">
+                <a:latin typeface="Times New Roman" panose="02020603050405020304" pitchFamily="18" charset="0"/>
+                <a:cs typeface="Times New Roman" panose="02020603050405020304" pitchFamily="18" charset="0"/>
+              </a:rPr>
+              <a:t> </a:t>
+            </a:r>
+            <a:r>
+              <a:rPr lang="en-GB" dirty="0" err="1">
+                <a:latin typeface="Times New Roman" panose="02020603050405020304" pitchFamily="18" charset="0"/>
+                <a:cs typeface="Times New Roman" panose="02020603050405020304" pitchFamily="18" charset="0"/>
+              </a:rPr>
+              <a:t>selecionar</a:t>
+            </a:r>
+            <a:r>
+              <a:rPr lang="en-GB" dirty="0">
+                <a:latin typeface="Times New Roman" panose="02020603050405020304" pitchFamily="18" charset="0"/>
+                <a:cs typeface="Times New Roman" panose="02020603050405020304" pitchFamily="18" charset="0"/>
+              </a:rPr>
+              <a:t> </a:t>
+            </a:r>
+            <a:r>
+              <a:rPr lang="en-GB" dirty="0" err="1">
+                <a:latin typeface="Times New Roman" panose="02020603050405020304" pitchFamily="18" charset="0"/>
+                <a:cs typeface="Times New Roman" panose="02020603050405020304" pitchFamily="18" charset="0"/>
+              </a:rPr>
+              <a:t>dois</a:t>
+            </a:r>
+            <a:r>
+              <a:rPr lang="en-GB" dirty="0">
+                <a:latin typeface="Times New Roman" panose="02020603050405020304" pitchFamily="18" charset="0"/>
+                <a:cs typeface="Times New Roman" panose="02020603050405020304" pitchFamily="18" charset="0"/>
+              </a:rPr>
+              <a:t> </a:t>
+            </a:r>
+            <a:r>
+              <a:rPr lang="en-GB" dirty="0" err="1">
+                <a:latin typeface="Times New Roman" panose="02020603050405020304" pitchFamily="18" charset="0"/>
+                <a:cs typeface="Times New Roman" panose="02020603050405020304" pitchFamily="18" charset="0"/>
+              </a:rPr>
+              <a:t>produtos</a:t>
+            </a:r>
+            <a:r>
+              <a:rPr lang="en-GB" dirty="0">
+                <a:latin typeface="Times New Roman" panose="02020603050405020304" pitchFamily="18" charset="0"/>
+                <a:cs typeface="Times New Roman" panose="02020603050405020304" pitchFamily="18" charset="0"/>
+              </a:rPr>
+              <a:t> e o </a:t>
+            </a:r>
+            <a:r>
+              <a:rPr lang="en-GB" dirty="0" err="1">
+                <a:latin typeface="Times New Roman" panose="02020603050405020304" pitchFamily="18" charset="0"/>
+                <a:cs typeface="Times New Roman" panose="02020603050405020304" pitchFamily="18" charset="0"/>
+              </a:rPr>
+              <a:t>programa</a:t>
+            </a:r>
+            <a:r>
+              <a:rPr lang="en-GB" dirty="0">
+                <a:latin typeface="Times New Roman" panose="02020603050405020304" pitchFamily="18" charset="0"/>
+                <a:cs typeface="Times New Roman" panose="02020603050405020304" pitchFamily="18" charset="0"/>
+              </a:rPr>
+              <a:t> </a:t>
+            </a:r>
+            <a:r>
+              <a:rPr lang="en-GB" dirty="0" err="1">
+                <a:latin typeface="Times New Roman" panose="02020603050405020304" pitchFamily="18" charset="0"/>
+                <a:cs typeface="Times New Roman" panose="02020603050405020304" pitchFamily="18" charset="0"/>
+              </a:rPr>
+              <a:t>mostra</a:t>
+            </a:r>
+            <a:r>
+              <a:rPr lang="en-GB" dirty="0">
+                <a:latin typeface="Times New Roman" panose="02020603050405020304" pitchFamily="18" charset="0"/>
+                <a:cs typeface="Times New Roman" panose="02020603050405020304" pitchFamily="18" charset="0"/>
+              </a:rPr>
+              <a:t> </a:t>
+            </a:r>
+            <a:r>
+              <a:rPr lang="en-GB" dirty="0" err="1">
+                <a:latin typeface="Times New Roman" panose="02020603050405020304" pitchFamily="18" charset="0"/>
+                <a:cs typeface="Times New Roman" panose="02020603050405020304" pitchFamily="18" charset="0"/>
+              </a:rPr>
+              <a:t>todas</a:t>
+            </a:r>
+            <a:r>
+              <a:rPr lang="en-GB" dirty="0">
+                <a:latin typeface="Times New Roman" panose="02020603050405020304" pitchFamily="18" charset="0"/>
+                <a:cs typeface="Times New Roman" panose="02020603050405020304" pitchFamily="18" charset="0"/>
+              </a:rPr>
+              <a:t> as </a:t>
+            </a:r>
+            <a:r>
+              <a:rPr lang="en-GB" dirty="0" err="1">
+                <a:latin typeface="Times New Roman" panose="02020603050405020304" pitchFamily="18" charset="0"/>
+                <a:cs typeface="Times New Roman" panose="02020603050405020304" pitchFamily="18" charset="0"/>
+              </a:rPr>
+              <a:t>suas</a:t>
+            </a:r>
+            <a:r>
+              <a:rPr lang="en-GB" dirty="0">
+                <a:latin typeface="Times New Roman" panose="02020603050405020304" pitchFamily="18" charset="0"/>
+                <a:cs typeface="Times New Roman" panose="02020603050405020304" pitchFamily="18" charset="0"/>
+              </a:rPr>
+              <a:t> </a:t>
+            </a:r>
+            <a:r>
+              <a:rPr lang="en-GB" dirty="0" err="1">
+                <a:latin typeface="Times New Roman" panose="02020603050405020304" pitchFamily="18" charset="0"/>
+                <a:cs typeface="Times New Roman" panose="02020603050405020304" pitchFamily="18" charset="0"/>
+              </a:rPr>
+              <a:t>características</a:t>
+            </a:r>
+            <a:r>
+              <a:rPr lang="en-GB" dirty="0">
+                <a:latin typeface="Times New Roman" panose="02020603050405020304" pitchFamily="18" charset="0"/>
+                <a:cs typeface="Times New Roman" panose="02020603050405020304" pitchFamily="18" charset="0"/>
+              </a:rPr>
+              <a:t> </a:t>
+            </a:r>
+            <a:r>
               <a:rPr lang="pt-PT" dirty="0">
                 <a:latin typeface="Times New Roman" panose="02020603050405020304" pitchFamily="18" charset="0"/>
                 <a:cs typeface="Times New Roman" panose="02020603050405020304" pitchFamily="18" charset="0"/>
               </a:rPr>
-              <a:t>Para desenvolvimento de um histórico de compras surgiram várias opções:</a:t>
-            </a:r>
-          </a:p>
-          <a:p>
-            <a:pPr marL="514350" lvl="1" indent="-285750">
-              <a:buFont typeface="Arial" panose="020B0604020202020204" pitchFamily="34" charset="0"/>
-              <a:buChar char="•"/>
-            </a:pPr>
-            <a:r>
-              <a:rPr lang="pt-PT" i="0" dirty="0">
-                <a:latin typeface="Times New Roman" panose="02020603050405020304" pitchFamily="18" charset="0"/>
-                <a:cs typeface="Times New Roman" panose="02020603050405020304" pitchFamily="18" charset="0"/>
-              </a:rPr>
-              <a:t>Criação de uma tabela própria que guarda todas as compras realizadas e os produtos associados a cada uma delas</a:t>
-            </a:r>
-          </a:p>
-          <a:p>
-            <a:pPr marL="514350" lvl="1" indent="-285750">
-              <a:buFont typeface="Arial" panose="020B0604020202020204" pitchFamily="34" charset="0"/>
-              <a:buChar char="•"/>
-            </a:pPr>
-            <a:r>
-              <a:rPr lang="pt-PT" i="0" dirty="0">
-                <a:latin typeface="Times New Roman" panose="02020603050405020304" pitchFamily="18" charset="0"/>
-                <a:cs typeface="Times New Roman" panose="02020603050405020304" pitchFamily="18" charset="0"/>
-              </a:rPr>
-              <a:t>Uma coluna na tabela Compras que guarda todos os produtos de cada compras</a:t>
-            </a:r>
+              <a:t>.</a:t>
+            </a:r>
+            <a:endParaRPr lang="en-GB" dirty="0">
+              <a:latin typeface="Times New Roman" panose="02020603050405020304" pitchFamily="18" charset="0"/>
+              <a:cs typeface="Times New Roman" panose="02020603050405020304" pitchFamily="18" charset="0"/>
+            </a:endParaRPr>
           </a:p>
         </p:txBody>
       </p:sp>
     </p:spTree>
     <p:extLst>
       <p:ext uri="{BB962C8B-B14F-4D97-AF65-F5344CB8AC3E}">
-        <p14:creationId xmlns:p14="http://schemas.microsoft.com/office/powerpoint/2010/main" val="2580117245"/>
+        <p14:creationId xmlns:p14="http://schemas.microsoft.com/office/powerpoint/2010/main" val="2079782892"/>
       </p:ext>
     </p:extLst>
   </p:cSld>
@@ -7671,7 +8292,7 @@
           <p:cNvPr id="2" name="Title 1">
             <a:extLst>
               <a:ext uri="{FF2B5EF4-FFF2-40B4-BE49-F238E27FC236}">
-                <a16:creationId xmlns:a16="http://schemas.microsoft.com/office/drawing/2014/main" id="{D9D3D0C5-7C48-0B42-9987-3BF1D1B6A5A9}"/>
+                <a16:creationId xmlns:a16="http://schemas.microsoft.com/office/drawing/2014/main" id="{BEC2627F-D56F-DE42-9ECB-7811C7348BAC}"/>
               </a:ext>
             </a:extLst>
           </p:cNvPr>
@@ -7692,7 +8313,7 @@
                 <a:latin typeface="Times New Roman" panose="02020603050405020304" pitchFamily="18" charset="0"/>
                 <a:cs typeface="Times New Roman" panose="02020603050405020304" pitchFamily="18" charset="0"/>
               </a:rPr>
-              <a:t>Tecnologias</a:t>
+              <a:t>Histórico de Compras</a:t>
             </a:r>
           </a:p>
         </p:txBody>
@@ -7702,7 +8323,7 @@
           <p:cNvPr id="3" name="Content Placeholder 2">
             <a:extLst>
               <a:ext uri="{FF2B5EF4-FFF2-40B4-BE49-F238E27FC236}">
-                <a16:creationId xmlns:a16="http://schemas.microsoft.com/office/drawing/2014/main" id="{F7F87325-795B-6B4E-B327-5735624C1C4B}"/>
+                <a16:creationId xmlns:a16="http://schemas.microsoft.com/office/drawing/2014/main" id="{A93045B5-1F72-984C-9C34-A244C1486E24}"/>
               </a:ext>
             </a:extLst>
           </p:cNvPr>
@@ -7719,78 +8340,37 @@
           <a:lstStyle/>
           <a:p>
             <a:r>
-              <a:rPr lang="pt-PT" dirty="0"/>
-              <a:t>Linguagens: </a:t>
-            </a:r>
-            <a:r>
-              <a:rPr lang="pt-PT" dirty="0" err="1"/>
-              <a:t>Python</a:t>
-            </a:r>
-            <a:r>
-              <a:rPr lang="pt-PT" dirty="0"/>
-              <a:t>, SQL</a:t>
-            </a:r>
-          </a:p>
-          <a:p>
-            <a:r>
-              <a:rPr lang="en-GB" dirty="0">
-                <a:latin typeface="Times New Roman" panose="02020603050405020304" pitchFamily="18" charset="0"/>
-                <a:cs typeface="Times New Roman" panose="02020603050405020304" pitchFamily="18" charset="0"/>
-              </a:rPr>
-              <a:t>DBMS: PostgreSQL</a:t>
-            </a:r>
-          </a:p>
-          <a:p>
-            <a:r>
-              <a:rPr lang="en-GB" dirty="0">
-                <a:latin typeface="Times New Roman" panose="02020603050405020304" pitchFamily="18" charset="0"/>
-                <a:cs typeface="Times New Roman" panose="02020603050405020304" pitchFamily="18" charset="0"/>
-              </a:rPr>
-              <a:t>ONDA (</a:t>
-            </a:r>
-            <a:r>
-              <a:rPr lang="en-GB" dirty="0" err="1">
-                <a:latin typeface="Times New Roman" panose="02020603050405020304" pitchFamily="18" charset="0"/>
-                <a:cs typeface="Times New Roman" panose="02020603050405020304" pitchFamily="18" charset="0"/>
-              </a:rPr>
-              <a:t>Onlinde</a:t>
-            </a:r>
-            <a:r>
-              <a:rPr lang="en-GB" dirty="0">
-                <a:latin typeface="Times New Roman" panose="02020603050405020304" pitchFamily="18" charset="0"/>
-                <a:cs typeface="Times New Roman" panose="02020603050405020304" pitchFamily="18" charset="0"/>
-              </a:rPr>
-              <a:t> Database Architecture)</a:t>
-            </a:r>
-          </a:p>
-          <a:p>
-            <a:r>
-              <a:rPr lang="en-GB" dirty="0">
-                <a:latin typeface="Times New Roman" panose="02020603050405020304" pitchFamily="18" charset="0"/>
-                <a:cs typeface="Times New Roman" panose="02020603050405020304" pitchFamily="18" charset="0"/>
-              </a:rPr>
-              <a:t>Postman</a:t>
-            </a:r>
-            <a:br>
-              <a:rPr lang="en-GB" dirty="0">
-                <a:latin typeface="Times New Roman" panose="02020603050405020304" pitchFamily="18" charset="0"/>
-                <a:cs typeface="Times New Roman" panose="02020603050405020304" pitchFamily="18" charset="0"/>
-              </a:rPr>
-            </a:br>
-            <a:endParaRPr lang="en-GB" dirty="0">
-              <a:latin typeface="Times New Roman" panose="02020603050405020304" pitchFamily="18" charset="0"/>
-              <a:cs typeface="Times New Roman" panose="02020603050405020304" pitchFamily="18" charset="0"/>
-            </a:endParaRPr>
-          </a:p>
-          <a:p>
-            <a:endParaRPr lang="pt-PT" dirty="0"/>
+              <a:rPr lang="pt-PT" dirty="0">
+                <a:latin typeface="Times New Roman" panose="02020603050405020304" pitchFamily="18" charset="0"/>
+                <a:cs typeface="Times New Roman" panose="02020603050405020304" pitchFamily="18" charset="0"/>
+              </a:rPr>
+              <a:t>Para desenvolvimento de um histórico de compras foi criada uma tabela na base de dados com os ids das compras e dos produtos.</a:t>
+            </a:r>
+          </a:p>
+          <a:p>
+            <a:r>
+              <a:rPr lang="pt-PT" dirty="0">
+                <a:latin typeface="Times New Roman" panose="02020603050405020304" pitchFamily="18" charset="0"/>
+                <a:cs typeface="Times New Roman" panose="02020603050405020304" pitchFamily="18" charset="0"/>
+              </a:rPr>
+              <a:t>Esta tabela faz a conexão entre todos os produtos comprados e as respetivas compras as que estão associados.</a:t>
+            </a:r>
+          </a:p>
+          <a:p>
+            <a:r>
+              <a:rPr lang="pt-PT" dirty="0">
+                <a:latin typeface="Times New Roman" panose="02020603050405020304" pitchFamily="18" charset="0"/>
+                <a:cs typeface="Times New Roman" panose="02020603050405020304" pitchFamily="18" charset="0"/>
+              </a:rPr>
+              <a:t>Isto permite aceder tanto as compras como a cada produto de uma compra de forma eficiente.</a:t>
+            </a:r>
           </a:p>
         </p:txBody>
       </p:sp>
     </p:spTree>
     <p:extLst>
       <p:ext uri="{BB962C8B-B14F-4D97-AF65-F5344CB8AC3E}">
-        <p14:creationId xmlns:p14="http://schemas.microsoft.com/office/powerpoint/2010/main" val="1929442924"/>
+        <p14:creationId xmlns:p14="http://schemas.microsoft.com/office/powerpoint/2010/main" val="2580117245"/>
       </p:ext>
     </p:extLst>
   </p:cSld>
@@ -7822,7 +8402,7 @@
           <p:cNvPr id="2" name="Title 1">
             <a:extLst>
               <a:ext uri="{FF2B5EF4-FFF2-40B4-BE49-F238E27FC236}">
-                <a16:creationId xmlns:a16="http://schemas.microsoft.com/office/drawing/2014/main" id="{B8C1F836-6F5F-194C-B393-529E2A41CBC0}"/>
+                <a16:creationId xmlns:a16="http://schemas.microsoft.com/office/drawing/2014/main" id="{D9D3D0C5-7C48-0B42-9987-3BF1D1B6A5A9}"/>
               </a:ext>
             </a:extLst>
           </p:cNvPr>
@@ -7843,7 +8423,7 @@
                 <a:latin typeface="Times New Roman" panose="02020603050405020304" pitchFamily="18" charset="0"/>
                 <a:cs typeface="Times New Roman" panose="02020603050405020304" pitchFamily="18" charset="0"/>
               </a:rPr>
-              <a:t>Planeamento</a:t>
+              <a:t>Tecnologias</a:t>
             </a:r>
           </a:p>
         </p:txBody>
@@ -7853,7 +8433,7 @@
           <p:cNvPr id="3" name="Content Placeholder 2">
             <a:extLst>
               <a:ext uri="{FF2B5EF4-FFF2-40B4-BE49-F238E27FC236}">
-                <a16:creationId xmlns:a16="http://schemas.microsoft.com/office/drawing/2014/main" id="{87B1789E-D4ED-C04E-B30D-1D8E122EBD59}"/>
+                <a16:creationId xmlns:a16="http://schemas.microsoft.com/office/drawing/2014/main" id="{F7F87325-795B-6B4E-B327-5735624C1C4B}"/>
               </a:ext>
             </a:extLst>
           </p:cNvPr>
@@ -7870,50 +8450,78 @@
           <a:lstStyle/>
           <a:p>
             <a:r>
-              <a:rPr lang="pt-PT" dirty="0">
-                <a:latin typeface="Times New Roman" panose="02020603050405020304" pitchFamily="18" charset="0"/>
-                <a:cs typeface="Times New Roman" panose="02020603050405020304" pitchFamily="18" charset="0"/>
-              </a:rPr>
-              <a:t>5 horas semanais</a:t>
-            </a:r>
-          </a:p>
-          <a:p>
-            <a:r>
-              <a:rPr lang="pt-PT" dirty="0">
-                <a:latin typeface="Times New Roman" panose="02020603050405020304" pitchFamily="18" charset="0"/>
-                <a:cs typeface="Times New Roman" panose="02020603050405020304" pitchFamily="18" charset="0"/>
-              </a:rPr>
-              <a:t>Períodos semanais de desenvolvimento conjunto do projeto</a:t>
-            </a:r>
-          </a:p>
-          <a:p>
-            <a:r>
-              <a:rPr lang="pt-PT" dirty="0" err="1">
-                <a:latin typeface="Times New Roman" panose="02020603050405020304" pitchFamily="18" charset="0"/>
-                <a:cs typeface="Times New Roman" panose="02020603050405020304" pitchFamily="18" charset="0"/>
-              </a:rPr>
-              <a:t>Github</a:t>
-            </a:r>
-            <a:endParaRPr lang="pt-PT" dirty="0">
+              <a:rPr lang="pt-PT" dirty="0"/>
+              <a:t>Linguagens: </a:t>
+            </a:r>
+            <a:r>
+              <a:rPr lang="pt-PT" dirty="0" err="1"/>
+              <a:t>Python</a:t>
+            </a:r>
+            <a:r>
+              <a:rPr lang="pt-PT" dirty="0"/>
+              <a:t>, SQL</a:t>
+            </a:r>
+          </a:p>
+          <a:p>
+            <a:r>
+              <a:rPr lang="en-GB" dirty="0">
+                <a:latin typeface="Times New Roman" panose="02020603050405020304" pitchFamily="18" charset="0"/>
+                <a:cs typeface="Times New Roman" panose="02020603050405020304" pitchFamily="18" charset="0"/>
+              </a:rPr>
+              <a:t>DBMS: PostgreSQL</a:t>
+            </a:r>
+          </a:p>
+          <a:p>
+            <a:r>
+              <a:rPr lang="en-GB" dirty="0">
+                <a:latin typeface="Times New Roman" panose="02020603050405020304" pitchFamily="18" charset="0"/>
+                <a:cs typeface="Times New Roman" panose="02020603050405020304" pitchFamily="18" charset="0"/>
+              </a:rPr>
+              <a:t>ONDA (</a:t>
+            </a:r>
+            <a:r>
+              <a:rPr lang="en-GB" dirty="0" err="1">
+                <a:latin typeface="Times New Roman" panose="02020603050405020304" pitchFamily="18" charset="0"/>
+                <a:cs typeface="Times New Roman" panose="02020603050405020304" pitchFamily="18" charset="0"/>
+              </a:rPr>
+              <a:t>Onlinde</a:t>
+            </a:r>
+            <a:r>
+              <a:rPr lang="en-GB" dirty="0">
+                <a:latin typeface="Times New Roman" panose="02020603050405020304" pitchFamily="18" charset="0"/>
+                <a:cs typeface="Times New Roman" panose="02020603050405020304" pitchFamily="18" charset="0"/>
+              </a:rPr>
+              <a:t> Database Architecture)</a:t>
+            </a:r>
+          </a:p>
+          <a:p>
+            <a:r>
+              <a:rPr lang="en-GB" dirty="0">
+                <a:latin typeface="Times New Roman" panose="02020603050405020304" pitchFamily="18" charset="0"/>
+                <a:cs typeface="Times New Roman" panose="02020603050405020304" pitchFamily="18" charset="0"/>
+              </a:rPr>
+              <a:t>Postman</a:t>
+            </a:r>
+            <a:br>
+              <a:rPr lang="en-GB" dirty="0">
+                <a:latin typeface="Times New Roman" panose="02020603050405020304" pitchFamily="18" charset="0"/>
+                <a:cs typeface="Times New Roman" panose="02020603050405020304" pitchFamily="18" charset="0"/>
+              </a:rPr>
+            </a:br>
+            <a:endParaRPr lang="en-GB" dirty="0">
               <a:latin typeface="Times New Roman" panose="02020603050405020304" pitchFamily="18" charset="0"/>
               <a:cs typeface="Times New Roman" panose="02020603050405020304" pitchFamily="18" charset="0"/>
             </a:endParaRPr>
           </a:p>
           <a:p>
-            <a:r>
-              <a:rPr lang="pt-PT" dirty="0">
-                <a:latin typeface="Times New Roman" panose="02020603050405020304" pitchFamily="18" charset="0"/>
-                <a:cs typeface="Times New Roman" panose="02020603050405020304" pitchFamily="18" charset="0"/>
-              </a:rPr>
-              <a:t>Reuniões semanais para decisão das tarefas de cada membro do grupo</a:t>
-            </a:r>
+            <a:endParaRPr lang="pt-PT" dirty="0"/>
           </a:p>
         </p:txBody>
       </p:sp>
     </p:spTree>
     <p:extLst>
       <p:ext uri="{BB962C8B-B14F-4D97-AF65-F5344CB8AC3E}">
-        <p14:creationId xmlns:p14="http://schemas.microsoft.com/office/powerpoint/2010/main" val="4268069007"/>
+        <p14:creationId xmlns:p14="http://schemas.microsoft.com/office/powerpoint/2010/main" val="1929442924"/>
       </p:ext>
     </p:extLst>
   </p:cSld>
@@ -7945,7 +8553,7 @@
           <p:cNvPr id="2" name="Title 1">
             <a:extLst>
               <a:ext uri="{FF2B5EF4-FFF2-40B4-BE49-F238E27FC236}">
-                <a16:creationId xmlns:a16="http://schemas.microsoft.com/office/drawing/2014/main" id="{ED294E78-F880-C8C1-4672-C2C86416B6A9}"/>
+                <a16:creationId xmlns:a16="http://schemas.microsoft.com/office/drawing/2014/main" id="{B8C1F836-6F5F-194C-B393-529E2A41CBC0}"/>
               </a:ext>
             </a:extLst>
           </p:cNvPr>
@@ -7966,7 +8574,7 @@
                 <a:latin typeface="Times New Roman" panose="02020603050405020304" pitchFamily="18" charset="0"/>
                 <a:cs typeface="Times New Roman" panose="02020603050405020304" pitchFamily="18" charset="0"/>
               </a:rPr>
-              <a:t>Retrospetiva</a:t>
+              <a:t>Planeamento</a:t>
             </a:r>
           </a:p>
         </p:txBody>
@@ -7976,7 +8584,7 @@
           <p:cNvPr id="3" name="Content Placeholder 2">
             <a:extLst>
               <a:ext uri="{FF2B5EF4-FFF2-40B4-BE49-F238E27FC236}">
-                <a16:creationId xmlns:a16="http://schemas.microsoft.com/office/drawing/2014/main" id="{6E73D821-F9F1-3169-7E2E-6DA3F5033270}"/>
+                <a16:creationId xmlns:a16="http://schemas.microsoft.com/office/drawing/2014/main" id="{87B1789E-D4ED-C04E-B30D-1D8E122EBD59}"/>
               </a:ext>
             </a:extLst>
           </p:cNvPr>
@@ -7997,7 +8605,7 @@
                 <a:latin typeface="Times New Roman" panose="02020603050405020304" pitchFamily="18" charset="0"/>
                 <a:cs typeface="Times New Roman" panose="02020603050405020304" pitchFamily="18" charset="0"/>
               </a:rPr>
-              <a:t>O desenvolvimento do projeto teve um avanço bastante assimétrico em questão de tempo.</a:t>
+              <a:t>5 horas semanais</a:t>
             </a:r>
           </a:p>
           <a:p>
@@ -8006,58 +8614,37 @@
                 <a:latin typeface="Times New Roman" panose="02020603050405020304" pitchFamily="18" charset="0"/>
                 <a:cs typeface="Times New Roman" panose="02020603050405020304" pitchFamily="18" charset="0"/>
               </a:rPr>
-              <a:t>A escrita de código demorou cerca de 8 horas cada um.</a:t>
-            </a:r>
-          </a:p>
-          <a:p>
-            <a:r>
-              <a:rPr lang="pt-PT" dirty="0">
-                <a:latin typeface="Times New Roman" panose="02020603050405020304" pitchFamily="18" charset="0"/>
-                <a:cs typeface="Times New Roman" panose="02020603050405020304" pitchFamily="18" charset="0"/>
-              </a:rPr>
-              <a:t>Porém a conexão da base de dados e da API utilizada ao </a:t>
-            </a:r>
+              <a:t>Períodos semanais de desenvolvimento conjunto do projeto</a:t>
+            </a:r>
+          </a:p>
+          <a:p>
             <a:r>
               <a:rPr lang="pt-PT" dirty="0" err="1">
                 <a:latin typeface="Times New Roman" panose="02020603050405020304" pitchFamily="18" charset="0"/>
                 <a:cs typeface="Times New Roman" panose="02020603050405020304" pitchFamily="18" charset="0"/>
               </a:rPr>
-              <a:t>Postman</a:t>
-            </a:r>
-            <a:r>
-              <a:rPr lang="pt-PT" dirty="0">
-                <a:latin typeface="Times New Roman" panose="02020603050405020304" pitchFamily="18" charset="0"/>
-                <a:cs typeface="Times New Roman" panose="02020603050405020304" pitchFamily="18" charset="0"/>
-              </a:rPr>
-              <a:t> demorou bastante mais.</a:t>
-            </a:r>
-          </a:p>
-          <a:p>
-            <a:r>
-              <a:rPr lang="pt-PT" dirty="0">
-                <a:latin typeface="Times New Roman" panose="02020603050405020304" pitchFamily="18" charset="0"/>
-                <a:cs typeface="Times New Roman" panose="02020603050405020304" pitchFamily="18" charset="0"/>
-              </a:rPr>
-              <a:t>A conexão foi bastante difícil de realizar, depois de muitos erros e reinstalar e inicializar toda a base de dado mais que uma vez, finalmente obtivemos um feedback positivo do </a:t>
-            </a:r>
-            <a:r>
-              <a:rPr lang="pt-PT">
-                <a:latin typeface="Times New Roman" panose="02020603050405020304" pitchFamily="18" charset="0"/>
-                <a:cs typeface="Times New Roman" panose="02020603050405020304" pitchFamily="18" charset="0"/>
-              </a:rPr>
-              <a:t>Postman. </a:t>
+              <a:t>Github</a:t>
             </a:r>
             <a:endParaRPr lang="pt-PT" dirty="0">
               <a:latin typeface="Times New Roman" panose="02020603050405020304" pitchFamily="18" charset="0"/>
               <a:cs typeface="Times New Roman" panose="02020603050405020304" pitchFamily="18" charset="0"/>
             </a:endParaRPr>
           </a:p>
+          <a:p>
+            <a:r>
+              <a:rPr lang="pt-PT" dirty="0">
+                <a:latin typeface="Times New Roman" panose="02020603050405020304" pitchFamily="18" charset="0"/>
+                <a:cs typeface="Times New Roman" panose="02020603050405020304" pitchFamily="18" charset="0"/>
+              </a:rPr>
+              <a:t>Reuniões semanais para decisão das tarefas de cada membro do grupo</a:t>
+            </a:r>
+          </a:p>
         </p:txBody>
       </p:sp>
     </p:spTree>
     <p:extLst>
       <p:ext uri="{BB962C8B-B14F-4D97-AF65-F5344CB8AC3E}">
-        <p14:creationId xmlns:p14="http://schemas.microsoft.com/office/powerpoint/2010/main" val="1583969914"/>
+        <p14:creationId xmlns:p14="http://schemas.microsoft.com/office/powerpoint/2010/main" val="4268069007"/>
       </p:ext>
     </p:extLst>
   </p:cSld>

</xml_diff>